<commit_message>
added pilot campaign analysis
</commit_message>
<xml_diff>
--- a/my_project/iFood CRM Data Analyst Case.pptx
+++ b/my_project/iFood CRM Data Analyst Case.pptx
@@ -25,6 +25,15 @@
     <p:sldId id="272" r:id="rId19"/>
     <p:sldId id="277" r:id="rId20"/>
     <p:sldId id="270" r:id="rId21"/>
+    <p:sldId id="279" r:id="rId22"/>
+    <p:sldId id="280" r:id="rId23"/>
+    <p:sldId id="281" r:id="rId24"/>
+    <p:sldId id="282" r:id="rId25"/>
+    <p:sldId id="284" r:id="rId26"/>
+    <p:sldId id="283" r:id="rId27"/>
+    <p:sldId id="285" r:id="rId28"/>
+    <p:sldId id="286" r:id="rId29"/>
+    <p:sldId id="287" r:id="rId30"/>
   </p:sldIdLst>
   <p:sldSz cx="12192000" cy="6858000"/>
   <p:notesSz cx="6858000" cy="9144000"/>
@@ -165,7 +174,7 @@
           <p:cNvPr id="2" name="Título 1">
             <a:extLst>
               <a:ext uri="{FF2B5EF4-FFF2-40B4-BE49-F238E27FC236}">
-                <a16:creationId xmlns:a16="http://schemas.microsoft.com/office/drawing/2014/main" id="{8D9763C8-9F8C-41FA-9A51-419CCE7C889F}"/>
+                <a16:creationId xmlns:a16="http://schemas.microsoft.com/office/drawing/2014/main" xmlns="" id="{8D9763C8-9F8C-41FA-9A51-419CCE7C889F}"/>
               </a:ext>
             </a:extLst>
           </p:cNvPr>
@@ -202,7 +211,7 @@
           <p:cNvPr id="3" name="Subtítulo 2">
             <a:extLst>
               <a:ext uri="{FF2B5EF4-FFF2-40B4-BE49-F238E27FC236}">
-                <a16:creationId xmlns:a16="http://schemas.microsoft.com/office/drawing/2014/main" id="{F0098CC7-E9AA-46C7-B721-F46C7EC41046}"/>
+                <a16:creationId xmlns:a16="http://schemas.microsoft.com/office/drawing/2014/main" xmlns="" id="{F0098CC7-E9AA-46C7-B721-F46C7EC41046}"/>
               </a:ext>
             </a:extLst>
           </p:cNvPr>
@@ -272,7 +281,7 @@
           <p:cNvPr id="4" name="Espaço Reservado para Data 3">
             <a:extLst>
               <a:ext uri="{FF2B5EF4-FFF2-40B4-BE49-F238E27FC236}">
-                <a16:creationId xmlns:a16="http://schemas.microsoft.com/office/drawing/2014/main" id="{9AE6CF52-4018-4890-B8BA-6A68F9835E44}"/>
+                <a16:creationId xmlns:a16="http://schemas.microsoft.com/office/drawing/2014/main" xmlns="" id="{9AE6CF52-4018-4890-B8BA-6A68F9835E44}"/>
               </a:ext>
             </a:extLst>
           </p:cNvPr>
@@ -290,7 +299,7 @@
           <a:p>
             <a:fld id="{3D2C61AF-1E92-4EB4-9D6D-3A595082C15F}" type="datetimeFigureOut">
               <a:rPr lang="pt-BR" smtClean="0"/>
-              <a:t>02/11/2020</a:t>
+              <a:t>03/11/2020</a:t>
             </a:fld>
             <a:endParaRPr lang="pt-BR"/>
           </a:p>
@@ -301,7 +310,7 @@
           <p:cNvPr id="5" name="Espaço Reservado para Rodapé 4">
             <a:extLst>
               <a:ext uri="{FF2B5EF4-FFF2-40B4-BE49-F238E27FC236}">
-                <a16:creationId xmlns:a16="http://schemas.microsoft.com/office/drawing/2014/main" id="{D63FA6E6-19CE-4D58-8083-172A16D62800}"/>
+                <a16:creationId xmlns:a16="http://schemas.microsoft.com/office/drawing/2014/main" xmlns="" id="{D63FA6E6-19CE-4D58-8083-172A16D62800}"/>
               </a:ext>
             </a:extLst>
           </p:cNvPr>
@@ -326,7 +335,7 @@
           <p:cNvPr id="6" name="Espaço Reservado para Número de Slide 5">
             <a:extLst>
               <a:ext uri="{FF2B5EF4-FFF2-40B4-BE49-F238E27FC236}">
-                <a16:creationId xmlns:a16="http://schemas.microsoft.com/office/drawing/2014/main" id="{EB272F95-56FC-4E74-B351-9988ECB8316F}"/>
+                <a16:creationId xmlns:a16="http://schemas.microsoft.com/office/drawing/2014/main" xmlns="" id="{EB272F95-56FC-4E74-B351-9988ECB8316F}"/>
               </a:ext>
             </a:extLst>
           </p:cNvPr>
@@ -385,7 +394,7 @@
           <p:cNvPr id="2" name="Título 1">
             <a:extLst>
               <a:ext uri="{FF2B5EF4-FFF2-40B4-BE49-F238E27FC236}">
-                <a16:creationId xmlns:a16="http://schemas.microsoft.com/office/drawing/2014/main" id="{D850EF63-89FC-4219-9D88-649542855C95}"/>
+                <a16:creationId xmlns:a16="http://schemas.microsoft.com/office/drawing/2014/main" xmlns="" id="{D850EF63-89FC-4219-9D88-649542855C95}"/>
               </a:ext>
             </a:extLst>
           </p:cNvPr>
@@ -413,7 +422,7 @@
           <p:cNvPr id="3" name="Espaço Reservado para Texto Vertical 2">
             <a:extLst>
               <a:ext uri="{FF2B5EF4-FFF2-40B4-BE49-F238E27FC236}">
-                <a16:creationId xmlns:a16="http://schemas.microsoft.com/office/drawing/2014/main" id="{73F8B6B9-186F-494D-8629-642076235379}"/>
+                <a16:creationId xmlns:a16="http://schemas.microsoft.com/office/drawing/2014/main" xmlns="" id="{73F8B6B9-186F-494D-8629-642076235379}"/>
               </a:ext>
             </a:extLst>
           </p:cNvPr>
@@ -470,7 +479,7 @@
           <p:cNvPr id="4" name="Espaço Reservado para Data 3">
             <a:extLst>
               <a:ext uri="{FF2B5EF4-FFF2-40B4-BE49-F238E27FC236}">
-                <a16:creationId xmlns:a16="http://schemas.microsoft.com/office/drawing/2014/main" id="{4459591A-3026-49A3-B787-6BD6AA315BE0}"/>
+                <a16:creationId xmlns:a16="http://schemas.microsoft.com/office/drawing/2014/main" xmlns="" id="{4459591A-3026-49A3-B787-6BD6AA315BE0}"/>
               </a:ext>
             </a:extLst>
           </p:cNvPr>
@@ -488,7 +497,7 @@
           <a:p>
             <a:fld id="{3D2C61AF-1E92-4EB4-9D6D-3A595082C15F}" type="datetimeFigureOut">
               <a:rPr lang="pt-BR" smtClean="0"/>
-              <a:t>02/11/2020</a:t>
+              <a:t>03/11/2020</a:t>
             </a:fld>
             <a:endParaRPr lang="pt-BR"/>
           </a:p>
@@ -499,7 +508,7 @@
           <p:cNvPr id="5" name="Espaço Reservado para Rodapé 4">
             <a:extLst>
               <a:ext uri="{FF2B5EF4-FFF2-40B4-BE49-F238E27FC236}">
-                <a16:creationId xmlns:a16="http://schemas.microsoft.com/office/drawing/2014/main" id="{A7FB01C2-4271-45AF-A7E5-8925084C3743}"/>
+                <a16:creationId xmlns:a16="http://schemas.microsoft.com/office/drawing/2014/main" xmlns="" id="{A7FB01C2-4271-45AF-A7E5-8925084C3743}"/>
               </a:ext>
             </a:extLst>
           </p:cNvPr>
@@ -524,7 +533,7 @@
           <p:cNvPr id="6" name="Espaço Reservado para Número de Slide 5">
             <a:extLst>
               <a:ext uri="{FF2B5EF4-FFF2-40B4-BE49-F238E27FC236}">
-                <a16:creationId xmlns:a16="http://schemas.microsoft.com/office/drawing/2014/main" id="{6A6D3CCE-360C-43ED-BA40-ACDCA48480F4}"/>
+                <a16:creationId xmlns:a16="http://schemas.microsoft.com/office/drawing/2014/main" xmlns="" id="{6A6D3CCE-360C-43ED-BA40-ACDCA48480F4}"/>
               </a:ext>
             </a:extLst>
           </p:cNvPr>
@@ -583,7 +592,7 @@
           <p:cNvPr id="2" name="Título Vertical 1">
             <a:extLst>
               <a:ext uri="{FF2B5EF4-FFF2-40B4-BE49-F238E27FC236}">
-                <a16:creationId xmlns:a16="http://schemas.microsoft.com/office/drawing/2014/main" id="{DD2F87CB-AD62-4C72-91C9-151267C29E2D}"/>
+                <a16:creationId xmlns:a16="http://schemas.microsoft.com/office/drawing/2014/main" xmlns="" id="{DD2F87CB-AD62-4C72-91C9-151267C29E2D}"/>
               </a:ext>
             </a:extLst>
           </p:cNvPr>
@@ -616,7 +625,7 @@
           <p:cNvPr id="3" name="Espaço Reservado para Texto Vertical 2">
             <a:extLst>
               <a:ext uri="{FF2B5EF4-FFF2-40B4-BE49-F238E27FC236}">
-                <a16:creationId xmlns:a16="http://schemas.microsoft.com/office/drawing/2014/main" id="{C858D104-4EF9-482B-B9FC-8B8EA584C4FE}"/>
+                <a16:creationId xmlns:a16="http://schemas.microsoft.com/office/drawing/2014/main" xmlns="" id="{C858D104-4EF9-482B-B9FC-8B8EA584C4FE}"/>
               </a:ext>
             </a:extLst>
           </p:cNvPr>
@@ -678,7 +687,7 @@
           <p:cNvPr id="4" name="Espaço Reservado para Data 3">
             <a:extLst>
               <a:ext uri="{FF2B5EF4-FFF2-40B4-BE49-F238E27FC236}">
-                <a16:creationId xmlns:a16="http://schemas.microsoft.com/office/drawing/2014/main" id="{B773512C-44CD-43EE-ACFA-48DBBF328FF7}"/>
+                <a16:creationId xmlns:a16="http://schemas.microsoft.com/office/drawing/2014/main" xmlns="" id="{B773512C-44CD-43EE-ACFA-48DBBF328FF7}"/>
               </a:ext>
             </a:extLst>
           </p:cNvPr>
@@ -696,7 +705,7 @@
           <a:p>
             <a:fld id="{3D2C61AF-1E92-4EB4-9D6D-3A595082C15F}" type="datetimeFigureOut">
               <a:rPr lang="pt-BR" smtClean="0"/>
-              <a:t>02/11/2020</a:t>
+              <a:t>03/11/2020</a:t>
             </a:fld>
             <a:endParaRPr lang="pt-BR"/>
           </a:p>
@@ -707,7 +716,7 @@
           <p:cNvPr id="5" name="Espaço Reservado para Rodapé 4">
             <a:extLst>
               <a:ext uri="{FF2B5EF4-FFF2-40B4-BE49-F238E27FC236}">
-                <a16:creationId xmlns:a16="http://schemas.microsoft.com/office/drawing/2014/main" id="{AD32A4A7-AC71-4E20-8FF4-4AC2529BF76F}"/>
+                <a16:creationId xmlns:a16="http://schemas.microsoft.com/office/drawing/2014/main" xmlns="" id="{AD32A4A7-AC71-4E20-8FF4-4AC2529BF76F}"/>
               </a:ext>
             </a:extLst>
           </p:cNvPr>
@@ -732,7 +741,7 @@
           <p:cNvPr id="6" name="Espaço Reservado para Número de Slide 5">
             <a:extLst>
               <a:ext uri="{FF2B5EF4-FFF2-40B4-BE49-F238E27FC236}">
-                <a16:creationId xmlns:a16="http://schemas.microsoft.com/office/drawing/2014/main" id="{6A9B0FAA-A961-45CC-9E83-FA5E659F1F11}"/>
+                <a16:creationId xmlns:a16="http://schemas.microsoft.com/office/drawing/2014/main" xmlns="" id="{6A9B0FAA-A961-45CC-9E83-FA5E659F1F11}"/>
               </a:ext>
             </a:extLst>
           </p:cNvPr>
@@ -791,7 +800,7 @@
           <p:cNvPr id="2" name="Título 1">
             <a:extLst>
               <a:ext uri="{FF2B5EF4-FFF2-40B4-BE49-F238E27FC236}">
-                <a16:creationId xmlns:a16="http://schemas.microsoft.com/office/drawing/2014/main" id="{ABE511FA-8C8B-471D-A765-F3C517EFAEA2}"/>
+                <a16:creationId xmlns:a16="http://schemas.microsoft.com/office/drawing/2014/main" xmlns="" id="{ABE511FA-8C8B-471D-A765-F3C517EFAEA2}"/>
               </a:ext>
             </a:extLst>
           </p:cNvPr>
@@ -819,7 +828,7 @@
           <p:cNvPr id="3" name="Espaço Reservado para Conteúdo 2">
             <a:extLst>
               <a:ext uri="{FF2B5EF4-FFF2-40B4-BE49-F238E27FC236}">
-                <a16:creationId xmlns:a16="http://schemas.microsoft.com/office/drawing/2014/main" id="{3EBE6CE4-174E-4631-B392-91FAEB39158F}"/>
+                <a16:creationId xmlns:a16="http://schemas.microsoft.com/office/drawing/2014/main" xmlns="" id="{3EBE6CE4-174E-4631-B392-91FAEB39158F}"/>
               </a:ext>
             </a:extLst>
           </p:cNvPr>
@@ -876,7 +885,7 @@
           <p:cNvPr id="4" name="Espaço Reservado para Data 3">
             <a:extLst>
               <a:ext uri="{FF2B5EF4-FFF2-40B4-BE49-F238E27FC236}">
-                <a16:creationId xmlns:a16="http://schemas.microsoft.com/office/drawing/2014/main" id="{607D842F-36E7-4977-89A0-B273031EABC5}"/>
+                <a16:creationId xmlns:a16="http://schemas.microsoft.com/office/drawing/2014/main" xmlns="" id="{607D842F-36E7-4977-89A0-B273031EABC5}"/>
               </a:ext>
             </a:extLst>
           </p:cNvPr>
@@ -894,7 +903,7 @@
           <a:p>
             <a:fld id="{3D2C61AF-1E92-4EB4-9D6D-3A595082C15F}" type="datetimeFigureOut">
               <a:rPr lang="pt-BR" smtClean="0"/>
-              <a:t>02/11/2020</a:t>
+              <a:t>03/11/2020</a:t>
             </a:fld>
             <a:endParaRPr lang="pt-BR"/>
           </a:p>
@@ -905,7 +914,7 @@
           <p:cNvPr id="5" name="Espaço Reservado para Rodapé 4">
             <a:extLst>
               <a:ext uri="{FF2B5EF4-FFF2-40B4-BE49-F238E27FC236}">
-                <a16:creationId xmlns:a16="http://schemas.microsoft.com/office/drawing/2014/main" id="{E03EFF79-D7C2-4E9E-8EFA-2DAF7E9DEE24}"/>
+                <a16:creationId xmlns:a16="http://schemas.microsoft.com/office/drawing/2014/main" xmlns="" id="{E03EFF79-D7C2-4E9E-8EFA-2DAF7E9DEE24}"/>
               </a:ext>
             </a:extLst>
           </p:cNvPr>
@@ -930,7 +939,7 @@
           <p:cNvPr id="6" name="Espaço Reservado para Número de Slide 5">
             <a:extLst>
               <a:ext uri="{FF2B5EF4-FFF2-40B4-BE49-F238E27FC236}">
-                <a16:creationId xmlns:a16="http://schemas.microsoft.com/office/drawing/2014/main" id="{18E1D854-5314-47C2-86FC-9FDF34FDB02E}"/>
+                <a16:creationId xmlns:a16="http://schemas.microsoft.com/office/drawing/2014/main" xmlns="" id="{18E1D854-5314-47C2-86FC-9FDF34FDB02E}"/>
               </a:ext>
             </a:extLst>
           </p:cNvPr>
@@ -989,7 +998,7 @@
           <p:cNvPr id="2" name="Título 1">
             <a:extLst>
               <a:ext uri="{FF2B5EF4-FFF2-40B4-BE49-F238E27FC236}">
-                <a16:creationId xmlns:a16="http://schemas.microsoft.com/office/drawing/2014/main" id="{C6B73C00-2CC8-4BB4-A5C7-169CEFFEB444}"/>
+                <a16:creationId xmlns:a16="http://schemas.microsoft.com/office/drawing/2014/main" xmlns="" id="{C6B73C00-2CC8-4BB4-A5C7-169CEFFEB444}"/>
               </a:ext>
             </a:extLst>
           </p:cNvPr>
@@ -1026,7 +1035,7 @@
           <p:cNvPr id="3" name="Espaço Reservado para Texto 2">
             <a:extLst>
               <a:ext uri="{FF2B5EF4-FFF2-40B4-BE49-F238E27FC236}">
-                <a16:creationId xmlns:a16="http://schemas.microsoft.com/office/drawing/2014/main" id="{0ADFB121-00A5-4298-A2F1-68F3C6B6B470}"/>
+                <a16:creationId xmlns:a16="http://schemas.microsoft.com/office/drawing/2014/main" xmlns="" id="{0ADFB121-00A5-4298-A2F1-68F3C6B6B470}"/>
               </a:ext>
             </a:extLst>
           </p:cNvPr>
@@ -1151,7 +1160,7 @@
           <p:cNvPr id="4" name="Espaço Reservado para Data 3">
             <a:extLst>
               <a:ext uri="{FF2B5EF4-FFF2-40B4-BE49-F238E27FC236}">
-                <a16:creationId xmlns:a16="http://schemas.microsoft.com/office/drawing/2014/main" id="{86B88F51-4126-4213-8DEC-14124FB742F5}"/>
+                <a16:creationId xmlns:a16="http://schemas.microsoft.com/office/drawing/2014/main" xmlns="" id="{86B88F51-4126-4213-8DEC-14124FB742F5}"/>
               </a:ext>
             </a:extLst>
           </p:cNvPr>
@@ -1169,7 +1178,7 @@
           <a:p>
             <a:fld id="{3D2C61AF-1E92-4EB4-9D6D-3A595082C15F}" type="datetimeFigureOut">
               <a:rPr lang="pt-BR" smtClean="0"/>
-              <a:t>02/11/2020</a:t>
+              <a:t>03/11/2020</a:t>
             </a:fld>
             <a:endParaRPr lang="pt-BR"/>
           </a:p>
@@ -1180,7 +1189,7 @@
           <p:cNvPr id="5" name="Espaço Reservado para Rodapé 4">
             <a:extLst>
               <a:ext uri="{FF2B5EF4-FFF2-40B4-BE49-F238E27FC236}">
-                <a16:creationId xmlns:a16="http://schemas.microsoft.com/office/drawing/2014/main" id="{42036905-73A9-4D57-8442-4C19E48CDA68}"/>
+                <a16:creationId xmlns:a16="http://schemas.microsoft.com/office/drawing/2014/main" xmlns="" id="{42036905-73A9-4D57-8442-4C19E48CDA68}"/>
               </a:ext>
             </a:extLst>
           </p:cNvPr>
@@ -1205,7 +1214,7 @@
           <p:cNvPr id="6" name="Espaço Reservado para Número de Slide 5">
             <a:extLst>
               <a:ext uri="{FF2B5EF4-FFF2-40B4-BE49-F238E27FC236}">
-                <a16:creationId xmlns:a16="http://schemas.microsoft.com/office/drawing/2014/main" id="{D3434277-A17A-4AA9-9A01-69B27FEC4D61}"/>
+                <a16:creationId xmlns:a16="http://schemas.microsoft.com/office/drawing/2014/main" xmlns="" id="{D3434277-A17A-4AA9-9A01-69B27FEC4D61}"/>
               </a:ext>
             </a:extLst>
           </p:cNvPr>
@@ -1264,7 +1273,7 @@
           <p:cNvPr id="2" name="Título 1">
             <a:extLst>
               <a:ext uri="{FF2B5EF4-FFF2-40B4-BE49-F238E27FC236}">
-                <a16:creationId xmlns:a16="http://schemas.microsoft.com/office/drawing/2014/main" id="{43455437-9D09-412B-BB8F-44A58EABC600}"/>
+                <a16:creationId xmlns:a16="http://schemas.microsoft.com/office/drawing/2014/main" xmlns="" id="{43455437-9D09-412B-BB8F-44A58EABC600}"/>
               </a:ext>
             </a:extLst>
           </p:cNvPr>
@@ -1292,7 +1301,7 @@
           <p:cNvPr id="3" name="Espaço Reservado para Conteúdo 2">
             <a:extLst>
               <a:ext uri="{FF2B5EF4-FFF2-40B4-BE49-F238E27FC236}">
-                <a16:creationId xmlns:a16="http://schemas.microsoft.com/office/drawing/2014/main" id="{C70E9272-7506-479C-AB81-E562F4307826}"/>
+                <a16:creationId xmlns:a16="http://schemas.microsoft.com/office/drawing/2014/main" xmlns="" id="{C70E9272-7506-479C-AB81-E562F4307826}"/>
               </a:ext>
             </a:extLst>
           </p:cNvPr>
@@ -1354,7 +1363,7 @@
           <p:cNvPr id="4" name="Espaço Reservado para Conteúdo 3">
             <a:extLst>
               <a:ext uri="{FF2B5EF4-FFF2-40B4-BE49-F238E27FC236}">
-                <a16:creationId xmlns:a16="http://schemas.microsoft.com/office/drawing/2014/main" id="{47C410DD-41B9-4A4D-ABCF-D0C29BF1E137}"/>
+                <a16:creationId xmlns:a16="http://schemas.microsoft.com/office/drawing/2014/main" xmlns="" id="{47C410DD-41B9-4A4D-ABCF-D0C29BF1E137}"/>
               </a:ext>
             </a:extLst>
           </p:cNvPr>
@@ -1416,7 +1425,7 @@
           <p:cNvPr id="5" name="Espaço Reservado para Data 4">
             <a:extLst>
               <a:ext uri="{FF2B5EF4-FFF2-40B4-BE49-F238E27FC236}">
-                <a16:creationId xmlns:a16="http://schemas.microsoft.com/office/drawing/2014/main" id="{BBBDAD9E-617C-45EC-B5B2-15851B4F5F6E}"/>
+                <a16:creationId xmlns:a16="http://schemas.microsoft.com/office/drawing/2014/main" xmlns="" id="{BBBDAD9E-617C-45EC-B5B2-15851B4F5F6E}"/>
               </a:ext>
             </a:extLst>
           </p:cNvPr>
@@ -1434,7 +1443,7 @@
           <a:p>
             <a:fld id="{3D2C61AF-1E92-4EB4-9D6D-3A595082C15F}" type="datetimeFigureOut">
               <a:rPr lang="pt-BR" smtClean="0"/>
-              <a:t>02/11/2020</a:t>
+              <a:t>03/11/2020</a:t>
             </a:fld>
             <a:endParaRPr lang="pt-BR"/>
           </a:p>
@@ -1445,7 +1454,7 @@
           <p:cNvPr id="6" name="Espaço Reservado para Rodapé 5">
             <a:extLst>
               <a:ext uri="{FF2B5EF4-FFF2-40B4-BE49-F238E27FC236}">
-                <a16:creationId xmlns:a16="http://schemas.microsoft.com/office/drawing/2014/main" id="{6B118B11-92C9-4194-8FC6-9C43937464A3}"/>
+                <a16:creationId xmlns:a16="http://schemas.microsoft.com/office/drawing/2014/main" xmlns="" id="{6B118B11-92C9-4194-8FC6-9C43937464A3}"/>
               </a:ext>
             </a:extLst>
           </p:cNvPr>
@@ -1470,7 +1479,7 @@
           <p:cNvPr id="7" name="Espaço Reservado para Número de Slide 6">
             <a:extLst>
               <a:ext uri="{FF2B5EF4-FFF2-40B4-BE49-F238E27FC236}">
-                <a16:creationId xmlns:a16="http://schemas.microsoft.com/office/drawing/2014/main" id="{F92ABD55-3369-45B3-BD05-D4EF5E2C4F78}"/>
+                <a16:creationId xmlns:a16="http://schemas.microsoft.com/office/drawing/2014/main" xmlns="" id="{F92ABD55-3369-45B3-BD05-D4EF5E2C4F78}"/>
               </a:ext>
             </a:extLst>
           </p:cNvPr>
@@ -1529,7 +1538,7 @@
           <p:cNvPr id="2" name="Título 1">
             <a:extLst>
               <a:ext uri="{FF2B5EF4-FFF2-40B4-BE49-F238E27FC236}">
-                <a16:creationId xmlns:a16="http://schemas.microsoft.com/office/drawing/2014/main" id="{EE3217E2-AD5B-4711-B67A-44C7564CC951}"/>
+                <a16:creationId xmlns:a16="http://schemas.microsoft.com/office/drawing/2014/main" xmlns="" id="{EE3217E2-AD5B-4711-B67A-44C7564CC951}"/>
               </a:ext>
             </a:extLst>
           </p:cNvPr>
@@ -1562,7 +1571,7 @@
           <p:cNvPr id="3" name="Espaço Reservado para Texto 2">
             <a:extLst>
               <a:ext uri="{FF2B5EF4-FFF2-40B4-BE49-F238E27FC236}">
-                <a16:creationId xmlns:a16="http://schemas.microsoft.com/office/drawing/2014/main" id="{FFF31231-6030-4202-BF28-D5E042200025}"/>
+                <a16:creationId xmlns:a16="http://schemas.microsoft.com/office/drawing/2014/main" xmlns="" id="{FFF31231-6030-4202-BF28-D5E042200025}"/>
               </a:ext>
             </a:extLst>
           </p:cNvPr>
@@ -1633,7 +1642,7 @@
           <p:cNvPr id="4" name="Espaço Reservado para Conteúdo 3">
             <a:extLst>
               <a:ext uri="{FF2B5EF4-FFF2-40B4-BE49-F238E27FC236}">
-                <a16:creationId xmlns:a16="http://schemas.microsoft.com/office/drawing/2014/main" id="{E5FD2E17-EB44-4943-84B8-6F570A57B12C}"/>
+                <a16:creationId xmlns:a16="http://schemas.microsoft.com/office/drawing/2014/main" xmlns="" id="{E5FD2E17-EB44-4943-84B8-6F570A57B12C}"/>
               </a:ext>
             </a:extLst>
           </p:cNvPr>
@@ -1695,7 +1704,7 @@
           <p:cNvPr id="5" name="Espaço Reservado para Texto 4">
             <a:extLst>
               <a:ext uri="{FF2B5EF4-FFF2-40B4-BE49-F238E27FC236}">
-                <a16:creationId xmlns:a16="http://schemas.microsoft.com/office/drawing/2014/main" id="{63008FBF-0363-42C6-AC16-FD16AE912FF5}"/>
+                <a16:creationId xmlns:a16="http://schemas.microsoft.com/office/drawing/2014/main" xmlns="" id="{63008FBF-0363-42C6-AC16-FD16AE912FF5}"/>
               </a:ext>
             </a:extLst>
           </p:cNvPr>
@@ -1766,7 +1775,7 @@
           <p:cNvPr id="6" name="Espaço Reservado para Conteúdo 5">
             <a:extLst>
               <a:ext uri="{FF2B5EF4-FFF2-40B4-BE49-F238E27FC236}">
-                <a16:creationId xmlns:a16="http://schemas.microsoft.com/office/drawing/2014/main" id="{A163D4E3-D779-4B5B-8131-1AC396F0ECEB}"/>
+                <a16:creationId xmlns:a16="http://schemas.microsoft.com/office/drawing/2014/main" xmlns="" id="{A163D4E3-D779-4B5B-8131-1AC396F0ECEB}"/>
               </a:ext>
             </a:extLst>
           </p:cNvPr>
@@ -1828,7 +1837,7 @@
           <p:cNvPr id="7" name="Espaço Reservado para Data 6">
             <a:extLst>
               <a:ext uri="{FF2B5EF4-FFF2-40B4-BE49-F238E27FC236}">
-                <a16:creationId xmlns:a16="http://schemas.microsoft.com/office/drawing/2014/main" id="{5A35CA7D-5DDD-4259-B0E5-66DF6B2D8D62}"/>
+                <a16:creationId xmlns:a16="http://schemas.microsoft.com/office/drawing/2014/main" xmlns="" id="{5A35CA7D-5DDD-4259-B0E5-66DF6B2D8D62}"/>
               </a:ext>
             </a:extLst>
           </p:cNvPr>
@@ -1846,7 +1855,7 @@
           <a:p>
             <a:fld id="{3D2C61AF-1E92-4EB4-9D6D-3A595082C15F}" type="datetimeFigureOut">
               <a:rPr lang="pt-BR" smtClean="0"/>
-              <a:t>02/11/2020</a:t>
+              <a:t>03/11/2020</a:t>
             </a:fld>
             <a:endParaRPr lang="pt-BR"/>
           </a:p>
@@ -1857,7 +1866,7 @@
           <p:cNvPr id="8" name="Espaço Reservado para Rodapé 7">
             <a:extLst>
               <a:ext uri="{FF2B5EF4-FFF2-40B4-BE49-F238E27FC236}">
-                <a16:creationId xmlns:a16="http://schemas.microsoft.com/office/drawing/2014/main" id="{AD8F5696-2F8D-47D8-B08B-2C7B1052EB66}"/>
+                <a16:creationId xmlns:a16="http://schemas.microsoft.com/office/drawing/2014/main" xmlns="" id="{AD8F5696-2F8D-47D8-B08B-2C7B1052EB66}"/>
               </a:ext>
             </a:extLst>
           </p:cNvPr>
@@ -1882,7 +1891,7 @@
           <p:cNvPr id="9" name="Espaço Reservado para Número de Slide 8">
             <a:extLst>
               <a:ext uri="{FF2B5EF4-FFF2-40B4-BE49-F238E27FC236}">
-                <a16:creationId xmlns:a16="http://schemas.microsoft.com/office/drawing/2014/main" id="{E15517D8-6119-4E41-8533-4F854196AA20}"/>
+                <a16:creationId xmlns:a16="http://schemas.microsoft.com/office/drawing/2014/main" xmlns="" id="{E15517D8-6119-4E41-8533-4F854196AA20}"/>
               </a:ext>
             </a:extLst>
           </p:cNvPr>
@@ -1941,7 +1950,7 @@
           <p:cNvPr id="2" name="Título 1">
             <a:extLst>
               <a:ext uri="{FF2B5EF4-FFF2-40B4-BE49-F238E27FC236}">
-                <a16:creationId xmlns:a16="http://schemas.microsoft.com/office/drawing/2014/main" id="{7057341F-10E4-4950-93B6-6A0A9244E11E}"/>
+                <a16:creationId xmlns:a16="http://schemas.microsoft.com/office/drawing/2014/main" xmlns="" id="{7057341F-10E4-4950-93B6-6A0A9244E11E}"/>
               </a:ext>
             </a:extLst>
           </p:cNvPr>
@@ -1969,7 +1978,7 @@
           <p:cNvPr id="3" name="Espaço Reservado para Data 2">
             <a:extLst>
               <a:ext uri="{FF2B5EF4-FFF2-40B4-BE49-F238E27FC236}">
-                <a16:creationId xmlns:a16="http://schemas.microsoft.com/office/drawing/2014/main" id="{251D4F1F-6578-4C14-8820-321831CCE14F}"/>
+                <a16:creationId xmlns:a16="http://schemas.microsoft.com/office/drawing/2014/main" xmlns="" id="{251D4F1F-6578-4C14-8820-321831CCE14F}"/>
               </a:ext>
             </a:extLst>
           </p:cNvPr>
@@ -1987,7 +1996,7 @@
           <a:p>
             <a:fld id="{3D2C61AF-1E92-4EB4-9D6D-3A595082C15F}" type="datetimeFigureOut">
               <a:rPr lang="pt-BR" smtClean="0"/>
-              <a:t>02/11/2020</a:t>
+              <a:t>03/11/2020</a:t>
             </a:fld>
             <a:endParaRPr lang="pt-BR"/>
           </a:p>
@@ -1998,7 +2007,7 @@
           <p:cNvPr id="4" name="Espaço Reservado para Rodapé 3">
             <a:extLst>
               <a:ext uri="{FF2B5EF4-FFF2-40B4-BE49-F238E27FC236}">
-                <a16:creationId xmlns:a16="http://schemas.microsoft.com/office/drawing/2014/main" id="{DB4937DD-7557-4B5C-B388-5A2E0013DD71}"/>
+                <a16:creationId xmlns:a16="http://schemas.microsoft.com/office/drawing/2014/main" xmlns="" id="{DB4937DD-7557-4B5C-B388-5A2E0013DD71}"/>
               </a:ext>
             </a:extLst>
           </p:cNvPr>
@@ -2023,7 +2032,7 @@
           <p:cNvPr id="5" name="Espaço Reservado para Número de Slide 4">
             <a:extLst>
               <a:ext uri="{FF2B5EF4-FFF2-40B4-BE49-F238E27FC236}">
-                <a16:creationId xmlns:a16="http://schemas.microsoft.com/office/drawing/2014/main" id="{B833E0B5-61DF-4C6B-8694-1AB6135DD8DB}"/>
+                <a16:creationId xmlns:a16="http://schemas.microsoft.com/office/drawing/2014/main" xmlns="" id="{B833E0B5-61DF-4C6B-8694-1AB6135DD8DB}"/>
               </a:ext>
             </a:extLst>
           </p:cNvPr>
@@ -2082,7 +2091,7 @@
           <p:cNvPr id="2" name="Espaço Reservado para Data 1">
             <a:extLst>
               <a:ext uri="{FF2B5EF4-FFF2-40B4-BE49-F238E27FC236}">
-                <a16:creationId xmlns:a16="http://schemas.microsoft.com/office/drawing/2014/main" id="{AB4E3F8B-65EE-4DB0-ABBB-97B6BA1D0E19}"/>
+                <a16:creationId xmlns:a16="http://schemas.microsoft.com/office/drawing/2014/main" xmlns="" id="{AB4E3F8B-65EE-4DB0-ABBB-97B6BA1D0E19}"/>
               </a:ext>
             </a:extLst>
           </p:cNvPr>
@@ -2100,7 +2109,7 @@
           <a:p>
             <a:fld id="{3D2C61AF-1E92-4EB4-9D6D-3A595082C15F}" type="datetimeFigureOut">
               <a:rPr lang="pt-BR" smtClean="0"/>
-              <a:t>02/11/2020</a:t>
+              <a:t>03/11/2020</a:t>
             </a:fld>
             <a:endParaRPr lang="pt-BR"/>
           </a:p>
@@ -2111,7 +2120,7 @@
           <p:cNvPr id="3" name="Espaço Reservado para Rodapé 2">
             <a:extLst>
               <a:ext uri="{FF2B5EF4-FFF2-40B4-BE49-F238E27FC236}">
-                <a16:creationId xmlns:a16="http://schemas.microsoft.com/office/drawing/2014/main" id="{1F7CBFB1-70D1-4668-8C9A-3CA116491652}"/>
+                <a16:creationId xmlns:a16="http://schemas.microsoft.com/office/drawing/2014/main" xmlns="" id="{1F7CBFB1-70D1-4668-8C9A-3CA116491652}"/>
               </a:ext>
             </a:extLst>
           </p:cNvPr>
@@ -2136,7 +2145,7 @@
           <p:cNvPr id="4" name="Espaço Reservado para Número de Slide 3">
             <a:extLst>
               <a:ext uri="{FF2B5EF4-FFF2-40B4-BE49-F238E27FC236}">
-                <a16:creationId xmlns:a16="http://schemas.microsoft.com/office/drawing/2014/main" id="{83CDC9ED-BD82-401A-B041-FC8464F0C3E9}"/>
+                <a16:creationId xmlns:a16="http://schemas.microsoft.com/office/drawing/2014/main" xmlns="" id="{83CDC9ED-BD82-401A-B041-FC8464F0C3E9}"/>
               </a:ext>
             </a:extLst>
           </p:cNvPr>
@@ -2195,7 +2204,7 @@
           <p:cNvPr id="2" name="Título 1">
             <a:extLst>
               <a:ext uri="{FF2B5EF4-FFF2-40B4-BE49-F238E27FC236}">
-                <a16:creationId xmlns:a16="http://schemas.microsoft.com/office/drawing/2014/main" id="{DC1C73D7-4CA6-4994-8A5C-15777C812ECC}"/>
+                <a16:creationId xmlns:a16="http://schemas.microsoft.com/office/drawing/2014/main" xmlns="" id="{DC1C73D7-4CA6-4994-8A5C-15777C812ECC}"/>
               </a:ext>
             </a:extLst>
           </p:cNvPr>
@@ -2232,7 +2241,7 @@
           <p:cNvPr id="3" name="Espaço Reservado para Conteúdo 2">
             <a:extLst>
               <a:ext uri="{FF2B5EF4-FFF2-40B4-BE49-F238E27FC236}">
-                <a16:creationId xmlns:a16="http://schemas.microsoft.com/office/drawing/2014/main" id="{F71D4868-392C-40E6-BE5A-76884D15335F}"/>
+                <a16:creationId xmlns:a16="http://schemas.microsoft.com/office/drawing/2014/main" xmlns="" id="{F71D4868-392C-40E6-BE5A-76884D15335F}"/>
               </a:ext>
             </a:extLst>
           </p:cNvPr>
@@ -2322,7 +2331,7 @@
           <p:cNvPr id="4" name="Espaço Reservado para Texto 3">
             <a:extLst>
               <a:ext uri="{FF2B5EF4-FFF2-40B4-BE49-F238E27FC236}">
-                <a16:creationId xmlns:a16="http://schemas.microsoft.com/office/drawing/2014/main" id="{332304A6-F03B-4C62-A689-F790F1090648}"/>
+                <a16:creationId xmlns:a16="http://schemas.microsoft.com/office/drawing/2014/main" xmlns="" id="{332304A6-F03B-4C62-A689-F790F1090648}"/>
               </a:ext>
             </a:extLst>
           </p:cNvPr>
@@ -2393,7 +2402,7 @@
           <p:cNvPr id="5" name="Espaço Reservado para Data 4">
             <a:extLst>
               <a:ext uri="{FF2B5EF4-FFF2-40B4-BE49-F238E27FC236}">
-                <a16:creationId xmlns:a16="http://schemas.microsoft.com/office/drawing/2014/main" id="{7EBF4895-230A-4794-B1B8-7F8A33322C1D}"/>
+                <a16:creationId xmlns:a16="http://schemas.microsoft.com/office/drawing/2014/main" xmlns="" id="{7EBF4895-230A-4794-B1B8-7F8A33322C1D}"/>
               </a:ext>
             </a:extLst>
           </p:cNvPr>
@@ -2411,7 +2420,7 @@
           <a:p>
             <a:fld id="{3D2C61AF-1E92-4EB4-9D6D-3A595082C15F}" type="datetimeFigureOut">
               <a:rPr lang="pt-BR" smtClean="0"/>
-              <a:t>02/11/2020</a:t>
+              <a:t>03/11/2020</a:t>
             </a:fld>
             <a:endParaRPr lang="pt-BR"/>
           </a:p>
@@ -2422,7 +2431,7 @@
           <p:cNvPr id="6" name="Espaço Reservado para Rodapé 5">
             <a:extLst>
               <a:ext uri="{FF2B5EF4-FFF2-40B4-BE49-F238E27FC236}">
-                <a16:creationId xmlns:a16="http://schemas.microsoft.com/office/drawing/2014/main" id="{7129A03C-CF25-4BDC-94B3-2969D9A3BBC3}"/>
+                <a16:creationId xmlns:a16="http://schemas.microsoft.com/office/drawing/2014/main" xmlns="" id="{7129A03C-CF25-4BDC-94B3-2969D9A3BBC3}"/>
               </a:ext>
             </a:extLst>
           </p:cNvPr>
@@ -2447,7 +2456,7 @@
           <p:cNvPr id="7" name="Espaço Reservado para Número de Slide 6">
             <a:extLst>
               <a:ext uri="{FF2B5EF4-FFF2-40B4-BE49-F238E27FC236}">
-                <a16:creationId xmlns:a16="http://schemas.microsoft.com/office/drawing/2014/main" id="{B9B88DE0-FEEC-42DD-A24C-6066975DB370}"/>
+                <a16:creationId xmlns:a16="http://schemas.microsoft.com/office/drawing/2014/main" xmlns="" id="{B9B88DE0-FEEC-42DD-A24C-6066975DB370}"/>
               </a:ext>
             </a:extLst>
           </p:cNvPr>
@@ -2506,7 +2515,7 @@
           <p:cNvPr id="2" name="Título 1">
             <a:extLst>
               <a:ext uri="{FF2B5EF4-FFF2-40B4-BE49-F238E27FC236}">
-                <a16:creationId xmlns:a16="http://schemas.microsoft.com/office/drawing/2014/main" id="{1DACFF0D-998D-478C-861F-751EEC216438}"/>
+                <a16:creationId xmlns:a16="http://schemas.microsoft.com/office/drawing/2014/main" xmlns="" id="{1DACFF0D-998D-478C-861F-751EEC216438}"/>
               </a:ext>
             </a:extLst>
           </p:cNvPr>
@@ -2543,7 +2552,7 @@
           <p:cNvPr id="3" name="Espaço Reservado para Imagem 2">
             <a:extLst>
               <a:ext uri="{FF2B5EF4-FFF2-40B4-BE49-F238E27FC236}">
-                <a16:creationId xmlns:a16="http://schemas.microsoft.com/office/drawing/2014/main" id="{D6C7ECAD-FE7A-410F-972C-B3B9AC108903}"/>
+                <a16:creationId xmlns:a16="http://schemas.microsoft.com/office/drawing/2014/main" xmlns="" id="{D6C7ECAD-FE7A-410F-972C-B3B9AC108903}"/>
               </a:ext>
             </a:extLst>
           </p:cNvPr>
@@ -2610,7 +2619,7 @@
           <p:cNvPr id="4" name="Espaço Reservado para Texto 3">
             <a:extLst>
               <a:ext uri="{FF2B5EF4-FFF2-40B4-BE49-F238E27FC236}">
-                <a16:creationId xmlns:a16="http://schemas.microsoft.com/office/drawing/2014/main" id="{9ADCBE1B-C821-413F-9E15-43758F060527}"/>
+                <a16:creationId xmlns:a16="http://schemas.microsoft.com/office/drawing/2014/main" xmlns="" id="{9ADCBE1B-C821-413F-9E15-43758F060527}"/>
               </a:ext>
             </a:extLst>
           </p:cNvPr>
@@ -2681,7 +2690,7 @@
           <p:cNvPr id="5" name="Espaço Reservado para Data 4">
             <a:extLst>
               <a:ext uri="{FF2B5EF4-FFF2-40B4-BE49-F238E27FC236}">
-                <a16:creationId xmlns:a16="http://schemas.microsoft.com/office/drawing/2014/main" id="{410CAC75-46B4-45D0-A74A-FD596AB628D7}"/>
+                <a16:creationId xmlns:a16="http://schemas.microsoft.com/office/drawing/2014/main" xmlns="" id="{410CAC75-46B4-45D0-A74A-FD596AB628D7}"/>
               </a:ext>
             </a:extLst>
           </p:cNvPr>
@@ -2699,7 +2708,7 @@
           <a:p>
             <a:fld id="{3D2C61AF-1E92-4EB4-9D6D-3A595082C15F}" type="datetimeFigureOut">
               <a:rPr lang="pt-BR" smtClean="0"/>
-              <a:t>02/11/2020</a:t>
+              <a:t>03/11/2020</a:t>
             </a:fld>
             <a:endParaRPr lang="pt-BR"/>
           </a:p>
@@ -2710,7 +2719,7 @@
           <p:cNvPr id="6" name="Espaço Reservado para Rodapé 5">
             <a:extLst>
               <a:ext uri="{FF2B5EF4-FFF2-40B4-BE49-F238E27FC236}">
-                <a16:creationId xmlns:a16="http://schemas.microsoft.com/office/drawing/2014/main" id="{56F42DE6-8362-4085-A552-EAAE430D3069}"/>
+                <a16:creationId xmlns:a16="http://schemas.microsoft.com/office/drawing/2014/main" xmlns="" id="{56F42DE6-8362-4085-A552-EAAE430D3069}"/>
               </a:ext>
             </a:extLst>
           </p:cNvPr>
@@ -2735,7 +2744,7 @@
           <p:cNvPr id="7" name="Espaço Reservado para Número de Slide 6">
             <a:extLst>
               <a:ext uri="{FF2B5EF4-FFF2-40B4-BE49-F238E27FC236}">
-                <a16:creationId xmlns:a16="http://schemas.microsoft.com/office/drawing/2014/main" id="{ACF3AF24-E701-4FAE-AC6B-D32C39FBBBCE}"/>
+                <a16:creationId xmlns:a16="http://schemas.microsoft.com/office/drawing/2014/main" xmlns="" id="{ACF3AF24-E701-4FAE-AC6B-D32C39FBBBCE}"/>
               </a:ext>
             </a:extLst>
           </p:cNvPr>
@@ -2799,7 +2808,7 @@
           <p:cNvPr id="2" name="Espaço Reservado para Título 1">
             <a:extLst>
               <a:ext uri="{FF2B5EF4-FFF2-40B4-BE49-F238E27FC236}">
-                <a16:creationId xmlns:a16="http://schemas.microsoft.com/office/drawing/2014/main" id="{FEDBCB17-69A9-46FA-9A5B-0686614E515B}"/>
+                <a16:creationId xmlns:a16="http://schemas.microsoft.com/office/drawing/2014/main" xmlns="" id="{FEDBCB17-69A9-46FA-9A5B-0686614E515B}"/>
               </a:ext>
             </a:extLst>
           </p:cNvPr>
@@ -2837,7 +2846,7 @@
           <p:cNvPr id="3" name="Espaço Reservado para Texto 2">
             <a:extLst>
               <a:ext uri="{FF2B5EF4-FFF2-40B4-BE49-F238E27FC236}">
-                <a16:creationId xmlns:a16="http://schemas.microsoft.com/office/drawing/2014/main" id="{BDA218F7-D0F6-4A8D-854C-EC927C1AF3AF}"/>
+                <a16:creationId xmlns:a16="http://schemas.microsoft.com/office/drawing/2014/main" xmlns="" id="{BDA218F7-D0F6-4A8D-854C-EC927C1AF3AF}"/>
               </a:ext>
             </a:extLst>
           </p:cNvPr>
@@ -2904,7 +2913,7 @@
           <p:cNvPr id="4" name="Espaço Reservado para Data 3">
             <a:extLst>
               <a:ext uri="{FF2B5EF4-FFF2-40B4-BE49-F238E27FC236}">
-                <a16:creationId xmlns:a16="http://schemas.microsoft.com/office/drawing/2014/main" id="{B66AA9B6-6CB6-427C-90B4-E7CABE90D11D}"/>
+                <a16:creationId xmlns:a16="http://schemas.microsoft.com/office/drawing/2014/main" xmlns="" id="{B66AA9B6-6CB6-427C-90B4-E7CABE90D11D}"/>
               </a:ext>
             </a:extLst>
           </p:cNvPr>
@@ -2940,7 +2949,7 @@
           <a:p>
             <a:fld id="{3D2C61AF-1E92-4EB4-9D6D-3A595082C15F}" type="datetimeFigureOut">
               <a:rPr lang="pt-BR" smtClean="0"/>
-              <a:t>02/11/2020</a:t>
+              <a:t>03/11/2020</a:t>
             </a:fld>
             <a:endParaRPr lang="pt-BR"/>
           </a:p>
@@ -2951,7 +2960,7 @@
           <p:cNvPr id="5" name="Espaço Reservado para Rodapé 4">
             <a:extLst>
               <a:ext uri="{FF2B5EF4-FFF2-40B4-BE49-F238E27FC236}">
-                <a16:creationId xmlns:a16="http://schemas.microsoft.com/office/drawing/2014/main" id="{78767D10-DE0B-47B2-BA57-C35448705C8E}"/>
+                <a16:creationId xmlns:a16="http://schemas.microsoft.com/office/drawing/2014/main" xmlns="" id="{78767D10-DE0B-47B2-BA57-C35448705C8E}"/>
               </a:ext>
             </a:extLst>
           </p:cNvPr>
@@ -2994,7 +3003,7 @@
           <p:cNvPr id="6" name="Espaço Reservado para Número de Slide 5">
             <a:extLst>
               <a:ext uri="{FF2B5EF4-FFF2-40B4-BE49-F238E27FC236}">
-                <a16:creationId xmlns:a16="http://schemas.microsoft.com/office/drawing/2014/main" id="{BCF49D6B-8EE8-4DC6-968B-10C6E406021F}"/>
+                <a16:creationId xmlns:a16="http://schemas.microsoft.com/office/drawing/2014/main" xmlns="" id="{BCF49D6B-8EE8-4DC6-968B-10C6E406021F}"/>
               </a:ext>
             </a:extLst>
           </p:cNvPr>
@@ -3362,7 +3371,7 @@
           <p:cNvPr id="2" name="Título 1">
             <a:extLst>
               <a:ext uri="{FF2B5EF4-FFF2-40B4-BE49-F238E27FC236}">
-                <a16:creationId xmlns:a16="http://schemas.microsoft.com/office/drawing/2014/main" id="{4D588DFD-861D-427A-8CF2-D1EFB519B044}"/>
+                <a16:creationId xmlns:a16="http://schemas.microsoft.com/office/drawing/2014/main" xmlns="" id="{4D588DFD-861D-427A-8CF2-D1EFB519B044}"/>
               </a:ext>
             </a:extLst>
           </p:cNvPr>
@@ -3412,7 +3421,7 @@
           <p:cNvPr id="5" name="Imagem 4">
             <a:extLst>
               <a:ext uri="{FF2B5EF4-FFF2-40B4-BE49-F238E27FC236}">
-                <a16:creationId xmlns:a16="http://schemas.microsoft.com/office/drawing/2014/main" id="{D440695E-4825-4621-ACB5-D7CB42308D59}"/>
+                <a16:creationId xmlns:a16="http://schemas.microsoft.com/office/drawing/2014/main" xmlns="" id="{D440695E-4825-4621-ACB5-D7CB42308D59}"/>
               </a:ext>
             </a:extLst>
           </p:cNvPr>
@@ -3472,7 +3481,7 @@
           <p:cNvPr id="7" name="CaixaDeTexto 6">
             <a:extLst>
               <a:ext uri="{FF2B5EF4-FFF2-40B4-BE49-F238E27FC236}">
-                <a16:creationId xmlns:a16="http://schemas.microsoft.com/office/drawing/2014/main" id="{D67E3CE1-1B05-4008-B992-B5BCAE7B17D0}"/>
+                <a16:creationId xmlns:a16="http://schemas.microsoft.com/office/drawing/2014/main" xmlns="" id="{D67E3CE1-1B05-4008-B992-B5BCAE7B17D0}"/>
               </a:ext>
             </a:extLst>
           </p:cNvPr>
@@ -3507,7 +3516,7 @@
           <p:cNvPr id="2" name="CaixaDeTexto 1">
             <a:extLst>
               <a:ext uri="{FF2B5EF4-FFF2-40B4-BE49-F238E27FC236}">
-                <a16:creationId xmlns:a16="http://schemas.microsoft.com/office/drawing/2014/main" id="{568DFC54-8910-4EF4-AF58-0C2F7A2F9E1B}"/>
+                <a16:creationId xmlns:a16="http://schemas.microsoft.com/office/drawing/2014/main" xmlns="" id="{568DFC54-8910-4EF4-AF58-0C2F7A2F9E1B}"/>
               </a:ext>
             </a:extLst>
           </p:cNvPr>
@@ -3542,7 +3551,7 @@
           <p:cNvPr id="8" name="CaixaDeTexto 7">
             <a:extLst>
               <a:ext uri="{FF2B5EF4-FFF2-40B4-BE49-F238E27FC236}">
-                <a16:creationId xmlns:a16="http://schemas.microsoft.com/office/drawing/2014/main" id="{3EEE96CD-72FD-4959-AB3B-4DECA7FA9786}"/>
+                <a16:creationId xmlns:a16="http://schemas.microsoft.com/office/drawing/2014/main" xmlns="" id="{3EEE96CD-72FD-4959-AB3B-4DECA7FA9786}"/>
               </a:ext>
             </a:extLst>
           </p:cNvPr>
@@ -3586,7 +3595,7 @@
           <p:cNvPr id="14" name="CaixaDeTexto 13">
             <a:extLst>
               <a:ext uri="{FF2B5EF4-FFF2-40B4-BE49-F238E27FC236}">
-                <a16:creationId xmlns:a16="http://schemas.microsoft.com/office/drawing/2014/main" id="{07413D16-9B5E-4806-8750-80D3ADDDEE39}"/>
+                <a16:creationId xmlns:a16="http://schemas.microsoft.com/office/drawing/2014/main" xmlns="" id="{07413D16-9B5E-4806-8750-80D3ADDDEE39}"/>
               </a:ext>
             </a:extLst>
           </p:cNvPr>
@@ -3621,7 +3630,7 @@
           <p:cNvPr id="13" name="Imagem 12">
             <a:extLst>
               <a:ext uri="{FF2B5EF4-FFF2-40B4-BE49-F238E27FC236}">
-                <a16:creationId xmlns:a16="http://schemas.microsoft.com/office/drawing/2014/main" id="{5C62662D-5A36-44EC-9617-151768C2B779}"/>
+                <a16:creationId xmlns:a16="http://schemas.microsoft.com/office/drawing/2014/main" xmlns="" id="{5C62662D-5A36-44EC-9617-151768C2B779}"/>
               </a:ext>
             </a:extLst>
           </p:cNvPr>
@@ -3651,7 +3660,7 @@
           <p:cNvPr id="16" name="Imagem 15">
             <a:extLst>
               <a:ext uri="{FF2B5EF4-FFF2-40B4-BE49-F238E27FC236}">
-                <a16:creationId xmlns:a16="http://schemas.microsoft.com/office/drawing/2014/main" id="{6B8B6817-6257-497F-BDD3-0B1482EE3D86}"/>
+                <a16:creationId xmlns:a16="http://schemas.microsoft.com/office/drawing/2014/main" xmlns="" id="{6B8B6817-6257-497F-BDD3-0B1482EE3D86}"/>
               </a:ext>
             </a:extLst>
           </p:cNvPr>
@@ -3681,7 +3690,7 @@
           <p:cNvPr id="18" name="Imagem 17">
             <a:extLst>
               <a:ext uri="{FF2B5EF4-FFF2-40B4-BE49-F238E27FC236}">
-                <a16:creationId xmlns:a16="http://schemas.microsoft.com/office/drawing/2014/main" id="{1D99518F-53C2-46BF-9F66-5A68EFA35FA7}"/>
+                <a16:creationId xmlns:a16="http://schemas.microsoft.com/office/drawing/2014/main" xmlns="" id="{1D99518F-53C2-46BF-9F66-5A68EFA35FA7}"/>
               </a:ext>
             </a:extLst>
           </p:cNvPr>
@@ -3711,7 +3720,7 @@
           <p:cNvPr id="19" name="Imagem 18">
             <a:extLst>
               <a:ext uri="{FF2B5EF4-FFF2-40B4-BE49-F238E27FC236}">
-                <a16:creationId xmlns:a16="http://schemas.microsoft.com/office/drawing/2014/main" id="{A0BC4616-FDE7-4FBB-9812-270A2462C623}"/>
+                <a16:creationId xmlns:a16="http://schemas.microsoft.com/office/drawing/2014/main" xmlns="" id="{A0BC4616-FDE7-4FBB-9812-270A2462C623}"/>
               </a:ext>
             </a:extLst>
           </p:cNvPr>
@@ -3743,7 +3752,7 @@
           <p:cNvPr id="26" name="CaixaDeTexto 25">
             <a:extLst>
               <a:ext uri="{FF2B5EF4-FFF2-40B4-BE49-F238E27FC236}">
-                <a16:creationId xmlns:a16="http://schemas.microsoft.com/office/drawing/2014/main" id="{13A17942-AD06-4AAC-8156-756049A8C7B3}"/>
+                <a16:creationId xmlns:a16="http://schemas.microsoft.com/office/drawing/2014/main" xmlns="" id="{13A17942-AD06-4AAC-8156-756049A8C7B3}"/>
               </a:ext>
             </a:extLst>
           </p:cNvPr>
@@ -3782,7 +3791,7 @@
           <p:cNvPr id="30" name="Retângulo 29">
             <a:extLst>
               <a:ext uri="{FF2B5EF4-FFF2-40B4-BE49-F238E27FC236}">
-                <a16:creationId xmlns:a16="http://schemas.microsoft.com/office/drawing/2014/main" id="{7CE908A5-C7ED-44EF-A6F0-1E9CC99DE8BE}"/>
+                <a16:creationId xmlns:a16="http://schemas.microsoft.com/office/drawing/2014/main" xmlns="" id="{7CE908A5-C7ED-44EF-A6F0-1E9CC99DE8BE}"/>
               </a:ext>
             </a:extLst>
           </p:cNvPr>
@@ -3834,7 +3843,7 @@
           <p:cNvPr id="32" name="Retângulo 31">
             <a:extLst>
               <a:ext uri="{FF2B5EF4-FFF2-40B4-BE49-F238E27FC236}">
-                <a16:creationId xmlns:a16="http://schemas.microsoft.com/office/drawing/2014/main" id="{6F39D265-7DC1-4BB0-8D0B-24F844C1F54F}"/>
+                <a16:creationId xmlns:a16="http://schemas.microsoft.com/office/drawing/2014/main" xmlns="" id="{6F39D265-7DC1-4BB0-8D0B-24F844C1F54F}"/>
               </a:ext>
             </a:extLst>
           </p:cNvPr>
@@ -3916,7 +3925,7 @@
           <p:cNvPr id="17" name="Imagem 16">
             <a:extLst>
               <a:ext uri="{FF2B5EF4-FFF2-40B4-BE49-F238E27FC236}">
-                <a16:creationId xmlns:a16="http://schemas.microsoft.com/office/drawing/2014/main" id="{AF451844-3B04-42AA-B7F8-00269CBA273E}"/>
+                <a16:creationId xmlns:a16="http://schemas.microsoft.com/office/drawing/2014/main" xmlns="" id="{AF451844-3B04-42AA-B7F8-00269CBA273E}"/>
               </a:ext>
             </a:extLst>
           </p:cNvPr>
@@ -3948,7 +3957,7 @@
           <p:cNvPr id="7" name="CaixaDeTexto 6">
             <a:extLst>
               <a:ext uri="{FF2B5EF4-FFF2-40B4-BE49-F238E27FC236}">
-                <a16:creationId xmlns:a16="http://schemas.microsoft.com/office/drawing/2014/main" id="{D67E3CE1-1B05-4008-B992-B5BCAE7B17D0}"/>
+                <a16:creationId xmlns:a16="http://schemas.microsoft.com/office/drawing/2014/main" xmlns="" id="{D67E3CE1-1B05-4008-B992-B5BCAE7B17D0}"/>
               </a:ext>
             </a:extLst>
           </p:cNvPr>
@@ -3992,7 +4001,7 @@
           <p:cNvPr id="2" name="CaixaDeTexto 1">
             <a:extLst>
               <a:ext uri="{FF2B5EF4-FFF2-40B4-BE49-F238E27FC236}">
-                <a16:creationId xmlns:a16="http://schemas.microsoft.com/office/drawing/2014/main" id="{568DFC54-8910-4EF4-AF58-0C2F7A2F9E1B}"/>
+                <a16:creationId xmlns:a16="http://schemas.microsoft.com/office/drawing/2014/main" xmlns="" id="{568DFC54-8910-4EF4-AF58-0C2F7A2F9E1B}"/>
               </a:ext>
             </a:extLst>
           </p:cNvPr>
@@ -4027,7 +4036,7 @@
           <p:cNvPr id="8" name="CaixaDeTexto 7">
             <a:extLst>
               <a:ext uri="{FF2B5EF4-FFF2-40B4-BE49-F238E27FC236}">
-                <a16:creationId xmlns:a16="http://schemas.microsoft.com/office/drawing/2014/main" id="{3EEE96CD-72FD-4959-AB3B-4DECA7FA9786}"/>
+                <a16:creationId xmlns:a16="http://schemas.microsoft.com/office/drawing/2014/main" xmlns="" id="{3EEE96CD-72FD-4959-AB3B-4DECA7FA9786}"/>
               </a:ext>
             </a:extLst>
           </p:cNvPr>
@@ -4070,7 +4079,7 @@
           <p:cNvPr id="4" name="Imagem 3">
             <a:extLst>
               <a:ext uri="{FF2B5EF4-FFF2-40B4-BE49-F238E27FC236}">
-                <a16:creationId xmlns:a16="http://schemas.microsoft.com/office/drawing/2014/main" id="{91C02493-A6CC-437C-A145-5B4133B6A105}"/>
+                <a16:creationId xmlns:a16="http://schemas.microsoft.com/office/drawing/2014/main" xmlns="" id="{91C02493-A6CC-437C-A145-5B4133B6A105}"/>
               </a:ext>
             </a:extLst>
           </p:cNvPr>
@@ -4100,7 +4109,7 @@
           <p:cNvPr id="10" name="Imagem 9">
             <a:extLst>
               <a:ext uri="{FF2B5EF4-FFF2-40B4-BE49-F238E27FC236}">
-                <a16:creationId xmlns:a16="http://schemas.microsoft.com/office/drawing/2014/main" id="{A5BBA690-D787-4B60-9809-789AB8C2A4C1}"/>
+                <a16:creationId xmlns:a16="http://schemas.microsoft.com/office/drawing/2014/main" xmlns="" id="{A5BBA690-D787-4B60-9809-789AB8C2A4C1}"/>
               </a:ext>
             </a:extLst>
           </p:cNvPr>
@@ -4130,7 +4139,7 @@
           <p:cNvPr id="15" name="Imagem 14">
             <a:extLst>
               <a:ext uri="{FF2B5EF4-FFF2-40B4-BE49-F238E27FC236}">
-                <a16:creationId xmlns:a16="http://schemas.microsoft.com/office/drawing/2014/main" id="{02CC9C9B-D88C-4EEB-8CA5-288C400C52C8}"/>
+                <a16:creationId xmlns:a16="http://schemas.microsoft.com/office/drawing/2014/main" xmlns="" id="{02CC9C9B-D88C-4EEB-8CA5-288C400C52C8}"/>
               </a:ext>
             </a:extLst>
           </p:cNvPr>
@@ -4160,7 +4169,7 @@
           <p:cNvPr id="21" name="CaixaDeTexto 20">
             <a:extLst>
               <a:ext uri="{FF2B5EF4-FFF2-40B4-BE49-F238E27FC236}">
-                <a16:creationId xmlns:a16="http://schemas.microsoft.com/office/drawing/2014/main" id="{B8044FCC-4FC9-4795-8DFA-5A13025BF904}"/>
+                <a16:creationId xmlns:a16="http://schemas.microsoft.com/office/drawing/2014/main" xmlns="" id="{B8044FCC-4FC9-4795-8DFA-5A13025BF904}"/>
               </a:ext>
             </a:extLst>
           </p:cNvPr>
@@ -4229,7 +4238,7 @@
           <p:cNvPr id="17" name="Imagem 16">
             <a:extLst>
               <a:ext uri="{FF2B5EF4-FFF2-40B4-BE49-F238E27FC236}">
-                <a16:creationId xmlns:a16="http://schemas.microsoft.com/office/drawing/2014/main" id="{50DCED27-5152-4282-9072-6B9FD3F5F1A2}"/>
+                <a16:creationId xmlns:a16="http://schemas.microsoft.com/office/drawing/2014/main" xmlns="" id="{50DCED27-5152-4282-9072-6B9FD3F5F1A2}"/>
               </a:ext>
             </a:extLst>
           </p:cNvPr>
@@ -4261,7 +4270,7 @@
           <p:cNvPr id="7" name="CaixaDeTexto 6">
             <a:extLst>
               <a:ext uri="{FF2B5EF4-FFF2-40B4-BE49-F238E27FC236}">
-                <a16:creationId xmlns:a16="http://schemas.microsoft.com/office/drawing/2014/main" id="{D67E3CE1-1B05-4008-B992-B5BCAE7B17D0}"/>
+                <a16:creationId xmlns:a16="http://schemas.microsoft.com/office/drawing/2014/main" xmlns="" id="{D67E3CE1-1B05-4008-B992-B5BCAE7B17D0}"/>
               </a:ext>
             </a:extLst>
           </p:cNvPr>
@@ -4296,7 +4305,7 @@
           <p:cNvPr id="2" name="CaixaDeTexto 1">
             <a:extLst>
               <a:ext uri="{FF2B5EF4-FFF2-40B4-BE49-F238E27FC236}">
-                <a16:creationId xmlns:a16="http://schemas.microsoft.com/office/drawing/2014/main" id="{568DFC54-8910-4EF4-AF58-0C2F7A2F9E1B}"/>
+                <a16:creationId xmlns:a16="http://schemas.microsoft.com/office/drawing/2014/main" xmlns="" id="{568DFC54-8910-4EF4-AF58-0C2F7A2F9E1B}"/>
               </a:ext>
             </a:extLst>
           </p:cNvPr>
@@ -4331,7 +4340,7 @@
           <p:cNvPr id="8" name="CaixaDeTexto 7">
             <a:extLst>
               <a:ext uri="{FF2B5EF4-FFF2-40B4-BE49-F238E27FC236}">
-                <a16:creationId xmlns:a16="http://schemas.microsoft.com/office/drawing/2014/main" id="{3EEE96CD-72FD-4959-AB3B-4DECA7FA9786}"/>
+                <a16:creationId xmlns:a16="http://schemas.microsoft.com/office/drawing/2014/main" xmlns="" id="{3EEE96CD-72FD-4959-AB3B-4DECA7FA9786}"/>
               </a:ext>
             </a:extLst>
           </p:cNvPr>
@@ -4366,7 +4375,7 @@
           <p:cNvPr id="9" name="Imagem 8">
             <a:extLst>
               <a:ext uri="{FF2B5EF4-FFF2-40B4-BE49-F238E27FC236}">
-                <a16:creationId xmlns:a16="http://schemas.microsoft.com/office/drawing/2014/main" id="{908A75A4-CF3B-43F6-AE16-1D52A12F7919}"/>
+                <a16:creationId xmlns:a16="http://schemas.microsoft.com/office/drawing/2014/main" xmlns="" id="{908A75A4-CF3B-43F6-AE16-1D52A12F7919}"/>
               </a:ext>
             </a:extLst>
           </p:cNvPr>
@@ -4396,7 +4405,7 @@
           <p:cNvPr id="14" name="Imagem 13">
             <a:extLst>
               <a:ext uri="{FF2B5EF4-FFF2-40B4-BE49-F238E27FC236}">
-                <a16:creationId xmlns:a16="http://schemas.microsoft.com/office/drawing/2014/main" id="{771445A8-DFD6-4485-AC72-4F790990B268}"/>
+                <a16:creationId xmlns:a16="http://schemas.microsoft.com/office/drawing/2014/main" xmlns="" id="{771445A8-DFD6-4485-AC72-4F790990B268}"/>
               </a:ext>
             </a:extLst>
           </p:cNvPr>
@@ -4426,7 +4435,7 @@
           <p:cNvPr id="19" name="CaixaDeTexto 18">
             <a:extLst>
               <a:ext uri="{FF2B5EF4-FFF2-40B4-BE49-F238E27FC236}">
-                <a16:creationId xmlns:a16="http://schemas.microsoft.com/office/drawing/2014/main" id="{C6929E36-ABD7-426E-BCC6-420453FF274C}"/>
+                <a16:creationId xmlns:a16="http://schemas.microsoft.com/office/drawing/2014/main" xmlns="" id="{C6929E36-ABD7-426E-BCC6-420453FF274C}"/>
               </a:ext>
             </a:extLst>
           </p:cNvPr>
@@ -4465,7 +4474,7 @@
           <p:cNvPr id="21" name="CaixaDeTexto 20">
             <a:extLst>
               <a:ext uri="{FF2B5EF4-FFF2-40B4-BE49-F238E27FC236}">
-                <a16:creationId xmlns:a16="http://schemas.microsoft.com/office/drawing/2014/main" id="{2DC83E0D-40DD-45A6-AA9D-CE4B197B0E63}"/>
+                <a16:creationId xmlns:a16="http://schemas.microsoft.com/office/drawing/2014/main" xmlns="" id="{2DC83E0D-40DD-45A6-AA9D-CE4B197B0E63}"/>
               </a:ext>
             </a:extLst>
           </p:cNvPr>
@@ -4533,7 +4542,7 @@
           <p:cNvPr id="22" name="Imagem 21">
             <a:extLst>
               <a:ext uri="{FF2B5EF4-FFF2-40B4-BE49-F238E27FC236}">
-                <a16:creationId xmlns:a16="http://schemas.microsoft.com/office/drawing/2014/main" id="{0CE654E7-5B8C-450E-8173-79E7A5D252EA}"/>
+                <a16:creationId xmlns:a16="http://schemas.microsoft.com/office/drawing/2014/main" xmlns="" id="{0CE654E7-5B8C-450E-8173-79E7A5D252EA}"/>
               </a:ext>
             </a:extLst>
           </p:cNvPr>
@@ -4565,7 +4574,7 @@
           <p:cNvPr id="7" name="CaixaDeTexto 6">
             <a:extLst>
               <a:ext uri="{FF2B5EF4-FFF2-40B4-BE49-F238E27FC236}">
-                <a16:creationId xmlns:a16="http://schemas.microsoft.com/office/drawing/2014/main" id="{D67E3CE1-1B05-4008-B992-B5BCAE7B17D0}"/>
+                <a16:creationId xmlns:a16="http://schemas.microsoft.com/office/drawing/2014/main" xmlns="" id="{D67E3CE1-1B05-4008-B992-B5BCAE7B17D0}"/>
               </a:ext>
             </a:extLst>
           </p:cNvPr>
@@ -4600,7 +4609,7 @@
           <p:cNvPr id="2" name="CaixaDeTexto 1">
             <a:extLst>
               <a:ext uri="{FF2B5EF4-FFF2-40B4-BE49-F238E27FC236}">
-                <a16:creationId xmlns:a16="http://schemas.microsoft.com/office/drawing/2014/main" id="{568DFC54-8910-4EF4-AF58-0C2F7A2F9E1B}"/>
+                <a16:creationId xmlns:a16="http://schemas.microsoft.com/office/drawing/2014/main" xmlns="" id="{568DFC54-8910-4EF4-AF58-0C2F7A2F9E1B}"/>
               </a:ext>
             </a:extLst>
           </p:cNvPr>
@@ -4635,7 +4644,7 @@
           <p:cNvPr id="8" name="CaixaDeTexto 7">
             <a:extLst>
               <a:ext uri="{FF2B5EF4-FFF2-40B4-BE49-F238E27FC236}">
-                <a16:creationId xmlns:a16="http://schemas.microsoft.com/office/drawing/2014/main" id="{3EEE96CD-72FD-4959-AB3B-4DECA7FA9786}"/>
+                <a16:creationId xmlns:a16="http://schemas.microsoft.com/office/drawing/2014/main" xmlns="" id="{3EEE96CD-72FD-4959-AB3B-4DECA7FA9786}"/>
               </a:ext>
             </a:extLst>
           </p:cNvPr>
@@ -4702,7 +4711,7 @@
           <p:cNvPr id="4" name="Imagem 3">
             <a:extLst>
               <a:ext uri="{FF2B5EF4-FFF2-40B4-BE49-F238E27FC236}">
-                <a16:creationId xmlns:a16="http://schemas.microsoft.com/office/drawing/2014/main" id="{F87C684D-53AA-46CD-9867-48384565554C}"/>
+                <a16:creationId xmlns:a16="http://schemas.microsoft.com/office/drawing/2014/main" xmlns="" id="{F87C684D-53AA-46CD-9867-48384565554C}"/>
               </a:ext>
             </a:extLst>
           </p:cNvPr>
@@ -4732,7 +4741,7 @@
           <p:cNvPr id="10" name="Imagem 9">
             <a:extLst>
               <a:ext uri="{FF2B5EF4-FFF2-40B4-BE49-F238E27FC236}">
-                <a16:creationId xmlns:a16="http://schemas.microsoft.com/office/drawing/2014/main" id="{45DBBEEF-ED68-472A-80D3-301E9F0D9FE4}"/>
+                <a16:creationId xmlns:a16="http://schemas.microsoft.com/office/drawing/2014/main" xmlns="" id="{45DBBEEF-ED68-472A-80D3-301E9F0D9FE4}"/>
               </a:ext>
             </a:extLst>
           </p:cNvPr>
@@ -4762,7 +4771,7 @@
           <p:cNvPr id="15" name="Imagem 14">
             <a:extLst>
               <a:ext uri="{FF2B5EF4-FFF2-40B4-BE49-F238E27FC236}">
-                <a16:creationId xmlns:a16="http://schemas.microsoft.com/office/drawing/2014/main" id="{F87F03F8-A116-4C25-B301-A8261E06808D}"/>
+                <a16:creationId xmlns:a16="http://schemas.microsoft.com/office/drawing/2014/main" xmlns="" id="{F87F03F8-A116-4C25-B301-A8261E06808D}"/>
               </a:ext>
             </a:extLst>
           </p:cNvPr>
@@ -4792,7 +4801,7 @@
           <p:cNvPr id="18" name="Retângulo 17">
             <a:extLst>
               <a:ext uri="{FF2B5EF4-FFF2-40B4-BE49-F238E27FC236}">
-                <a16:creationId xmlns:a16="http://schemas.microsoft.com/office/drawing/2014/main" id="{B0EA426F-6E16-42E5-9F83-45DBD44886A1}"/>
+                <a16:creationId xmlns:a16="http://schemas.microsoft.com/office/drawing/2014/main" xmlns="" id="{B0EA426F-6E16-42E5-9F83-45DBD44886A1}"/>
               </a:ext>
             </a:extLst>
           </p:cNvPr>
@@ -4844,7 +4853,7 @@
           <p:cNvPr id="20" name="Retângulo 19">
             <a:extLst>
               <a:ext uri="{FF2B5EF4-FFF2-40B4-BE49-F238E27FC236}">
-                <a16:creationId xmlns:a16="http://schemas.microsoft.com/office/drawing/2014/main" id="{99A4D406-ADA1-44CA-B8F0-92B1466F156C}"/>
+                <a16:creationId xmlns:a16="http://schemas.microsoft.com/office/drawing/2014/main" xmlns="" id="{99A4D406-ADA1-44CA-B8F0-92B1466F156C}"/>
               </a:ext>
             </a:extLst>
           </p:cNvPr>
@@ -4896,7 +4905,7 @@
           <p:cNvPr id="24" name="CaixaDeTexto 23">
             <a:extLst>
               <a:ext uri="{FF2B5EF4-FFF2-40B4-BE49-F238E27FC236}">
-                <a16:creationId xmlns:a16="http://schemas.microsoft.com/office/drawing/2014/main" id="{9643F4EF-403C-4092-A8B6-0A8CCF0D63ED}"/>
+                <a16:creationId xmlns:a16="http://schemas.microsoft.com/office/drawing/2014/main" xmlns="" id="{9643F4EF-403C-4092-A8B6-0A8CCF0D63ED}"/>
               </a:ext>
             </a:extLst>
           </p:cNvPr>
@@ -4965,7 +4974,7 @@
           <p:cNvPr id="12" name="Imagem 11">
             <a:extLst>
               <a:ext uri="{FF2B5EF4-FFF2-40B4-BE49-F238E27FC236}">
-                <a16:creationId xmlns:a16="http://schemas.microsoft.com/office/drawing/2014/main" id="{45012191-CAAF-479E-8188-4611AAB46D34}"/>
+                <a16:creationId xmlns:a16="http://schemas.microsoft.com/office/drawing/2014/main" xmlns="" id="{45012191-CAAF-479E-8188-4611AAB46D34}"/>
               </a:ext>
             </a:extLst>
           </p:cNvPr>
@@ -4997,7 +5006,7 @@
           <p:cNvPr id="7" name="CaixaDeTexto 6">
             <a:extLst>
               <a:ext uri="{FF2B5EF4-FFF2-40B4-BE49-F238E27FC236}">
-                <a16:creationId xmlns:a16="http://schemas.microsoft.com/office/drawing/2014/main" id="{D67E3CE1-1B05-4008-B992-B5BCAE7B17D0}"/>
+                <a16:creationId xmlns:a16="http://schemas.microsoft.com/office/drawing/2014/main" xmlns="" id="{D67E3CE1-1B05-4008-B992-B5BCAE7B17D0}"/>
               </a:ext>
             </a:extLst>
           </p:cNvPr>
@@ -5032,7 +5041,7 @@
           <p:cNvPr id="2" name="CaixaDeTexto 1">
             <a:extLst>
               <a:ext uri="{FF2B5EF4-FFF2-40B4-BE49-F238E27FC236}">
-                <a16:creationId xmlns:a16="http://schemas.microsoft.com/office/drawing/2014/main" id="{568DFC54-8910-4EF4-AF58-0C2F7A2F9E1B}"/>
+                <a16:creationId xmlns:a16="http://schemas.microsoft.com/office/drawing/2014/main" xmlns="" id="{568DFC54-8910-4EF4-AF58-0C2F7A2F9E1B}"/>
               </a:ext>
             </a:extLst>
           </p:cNvPr>
@@ -5067,7 +5076,7 @@
           <p:cNvPr id="8" name="CaixaDeTexto 7">
             <a:extLst>
               <a:ext uri="{FF2B5EF4-FFF2-40B4-BE49-F238E27FC236}">
-                <a16:creationId xmlns:a16="http://schemas.microsoft.com/office/drawing/2014/main" id="{3EEE96CD-72FD-4959-AB3B-4DECA7FA9786}"/>
+                <a16:creationId xmlns:a16="http://schemas.microsoft.com/office/drawing/2014/main" xmlns="" id="{3EEE96CD-72FD-4959-AB3B-4DECA7FA9786}"/>
               </a:ext>
             </a:extLst>
           </p:cNvPr>
@@ -5106,7 +5115,7 @@
           <p:cNvPr id="5" name="Imagem 4">
             <a:extLst>
               <a:ext uri="{FF2B5EF4-FFF2-40B4-BE49-F238E27FC236}">
-                <a16:creationId xmlns:a16="http://schemas.microsoft.com/office/drawing/2014/main" id="{45F71A72-D48D-418C-A5AB-C123B6C68904}"/>
+                <a16:creationId xmlns:a16="http://schemas.microsoft.com/office/drawing/2014/main" xmlns="" id="{45F71A72-D48D-418C-A5AB-C123B6C68904}"/>
               </a:ext>
             </a:extLst>
           </p:cNvPr>
@@ -5136,7 +5145,7 @@
           <p:cNvPr id="11" name="Imagem 10">
             <a:extLst>
               <a:ext uri="{FF2B5EF4-FFF2-40B4-BE49-F238E27FC236}">
-                <a16:creationId xmlns:a16="http://schemas.microsoft.com/office/drawing/2014/main" id="{88379F84-6D40-459F-8E47-909956CEBBF9}"/>
+                <a16:creationId xmlns:a16="http://schemas.microsoft.com/office/drawing/2014/main" xmlns="" id="{88379F84-6D40-459F-8E47-909956CEBBF9}"/>
               </a:ext>
             </a:extLst>
           </p:cNvPr>
@@ -5166,7 +5175,7 @@
           <p:cNvPr id="13" name="CaixaDeTexto 12">
             <a:extLst>
               <a:ext uri="{FF2B5EF4-FFF2-40B4-BE49-F238E27FC236}">
-                <a16:creationId xmlns:a16="http://schemas.microsoft.com/office/drawing/2014/main" id="{FB1A0CF8-D220-44EE-A5AC-E5B5791D84CF}"/>
+                <a16:creationId xmlns:a16="http://schemas.microsoft.com/office/drawing/2014/main" xmlns="" id="{FB1A0CF8-D220-44EE-A5AC-E5B5791D84CF}"/>
               </a:ext>
             </a:extLst>
           </p:cNvPr>
@@ -5235,7 +5244,7 @@
           <p:cNvPr id="7" name="CaixaDeTexto 6">
             <a:extLst>
               <a:ext uri="{FF2B5EF4-FFF2-40B4-BE49-F238E27FC236}">
-                <a16:creationId xmlns:a16="http://schemas.microsoft.com/office/drawing/2014/main" id="{5FDBE5A5-2BF1-44AE-AF37-AD68A545CB9B}"/>
+                <a16:creationId xmlns:a16="http://schemas.microsoft.com/office/drawing/2014/main" xmlns="" id="{5FDBE5A5-2BF1-44AE-AF37-AD68A545CB9B}"/>
               </a:ext>
             </a:extLst>
           </p:cNvPr>
@@ -5287,7 +5296,7 @@
           <p:cNvPr id="11" name="Imagem 10">
             <a:extLst>
               <a:ext uri="{FF2B5EF4-FFF2-40B4-BE49-F238E27FC236}">
-                <a16:creationId xmlns:a16="http://schemas.microsoft.com/office/drawing/2014/main" id="{6244F971-9CC6-4B9F-BB47-09A82C7B6DD4}"/>
+                <a16:creationId xmlns:a16="http://schemas.microsoft.com/office/drawing/2014/main" xmlns="" id="{6244F971-9CC6-4B9F-BB47-09A82C7B6DD4}"/>
               </a:ext>
             </a:extLst>
           </p:cNvPr>
@@ -5319,7 +5328,7 @@
           <p:cNvPr id="13" name="CaixaDeTexto 12">
             <a:extLst>
               <a:ext uri="{FF2B5EF4-FFF2-40B4-BE49-F238E27FC236}">
-                <a16:creationId xmlns:a16="http://schemas.microsoft.com/office/drawing/2014/main" id="{AB454FF3-D826-44A3-B2CE-C7028527CED8}"/>
+                <a16:creationId xmlns:a16="http://schemas.microsoft.com/office/drawing/2014/main" xmlns="" id="{AB454FF3-D826-44A3-B2CE-C7028527CED8}"/>
               </a:ext>
             </a:extLst>
           </p:cNvPr>
@@ -5372,7 +5381,7 @@
           <p:cNvPr id="15" name="Conector reto 14">
             <a:extLst>
               <a:ext uri="{FF2B5EF4-FFF2-40B4-BE49-F238E27FC236}">
-                <a16:creationId xmlns:a16="http://schemas.microsoft.com/office/drawing/2014/main" id="{1A83A55E-BA2A-463B-81EE-66BF3044D7B4}"/>
+                <a16:creationId xmlns:a16="http://schemas.microsoft.com/office/drawing/2014/main" xmlns="" id="{1A83A55E-BA2A-463B-81EE-66BF3044D7B4}"/>
               </a:ext>
             </a:extLst>
           </p:cNvPr>
@@ -5445,7 +5454,7 @@
           <p:cNvPr id="12" name="Imagem 11">
             <a:extLst>
               <a:ext uri="{FF2B5EF4-FFF2-40B4-BE49-F238E27FC236}">
-                <a16:creationId xmlns:a16="http://schemas.microsoft.com/office/drawing/2014/main" id="{45012191-CAAF-479E-8188-4611AAB46D34}"/>
+                <a16:creationId xmlns:a16="http://schemas.microsoft.com/office/drawing/2014/main" xmlns="" id="{45012191-CAAF-479E-8188-4611AAB46D34}"/>
               </a:ext>
             </a:extLst>
           </p:cNvPr>
@@ -5477,7 +5486,7 @@
           <p:cNvPr id="2" name="CaixaDeTexto 1">
             <a:extLst>
               <a:ext uri="{FF2B5EF4-FFF2-40B4-BE49-F238E27FC236}">
-                <a16:creationId xmlns:a16="http://schemas.microsoft.com/office/drawing/2014/main" id="{568DFC54-8910-4EF4-AF58-0C2F7A2F9E1B}"/>
+                <a16:creationId xmlns:a16="http://schemas.microsoft.com/office/drawing/2014/main" xmlns="" id="{568DFC54-8910-4EF4-AF58-0C2F7A2F9E1B}"/>
               </a:ext>
             </a:extLst>
           </p:cNvPr>
@@ -5520,7 +5529,7 @@
           <p:cNvPr id="13" name="CaixaDeTexto 12">
             <a:extLst>
               <a:ext uri="{FF2B5EF4-FFF2-40B4-BE49-F238E27FC236}">
-                <a16:creationId xmlns:a16="http://schemas.microsoft.com/office/drawing/2014/main" id="{FB1A0CF8-D220-44EE-A5AC-E5B5791D84CF}"/>
+                <a16:creationId xmlns:a16="http://schemas.microsoft.com/office/drawing/2014/main" xmlns="" id="{FB1A0CF8-D220-44EE-A5AC-E5B5791D84CF}"/>
               </a:ext>
             </a:extLst>
           </p:cNvPr>
@@ -5559,7 +5568,7 @@
           <p:cNvPr id="3" name="CaixaDeTexto 2">
             <a:extLst>
               <a:ext uri="{FF2B5EF4-FFF2-40B4-BE49-F238E27FC236}">
-                <a16:creationId xmlns:a16="http://schemas.microsoft.com/office/drawing/2014/main" id="{84C90BE5-E407-466B-9B81-A7A5E717CEC6}"/>
+                <a16:creationId xmlns:a16="http://schemas.microsoft.com/office/drawing/2014/main" xmlns="" id="{84C90BE5-E407-466B-9B81-A7A5E717CEC6}"/>
               </a:ext>
             </a:extLst>
           </p:cNvPr>
@@ -5717,7 +5726,7 @@
           <p:cNvPr id="12" name="Imagem 11">
             <a:extLst>
               <a:ext uri="{FF2B5EF4-FFF2-40B4-BE49-F238E27FC236}">
-                <a16:creationId xmlns:a16="http://schemas.microsoft.com/office/drawing/2014/main" id="{45012191-CAAF-479E-8188-4611AAB46D34}"/>
+                <a16:creationId xmlns:a16="http://schemas.microsoft.com/office/drawing/2014/main" xmlns="" id="{45012191-CAAF-479E-8188-4611AAB46D34}"/>
               </a:ext>
             </a:extLst>
           </p:cNvPr>
@@ -5749,7 +5758,7 @@
           <p:cNvPr id="13" name="CaixaDeTexto 12">
             <a:extLst>
               <a:ext uri="{FF2B5EF4-FFF2-40B4-BE49-F238E27FC236}">
-                <a16:creationId xmlns:a16="http://schemas.microsoft.com/office/drawing/2014/main" id="{FB1A0CF8-D220-44EE-A5AC-E5B5791D84CF}"/>
+                <a16:creationId xmlns:a16="http://schemas.microsoft.com/office/drawing/2014/main" xmlns="" id="{FB1A0CF8-D220-44EE-A5AC-E5B5791D84CF}"/>
               </a:ext>
             </a:extLst>
           </p:cNvPr>
@@ -5788,7 +5797,7 @@
           <p:cNvPr id="3" name="CaixaDeTexto 2">
             <a:extLst>
               <a:ext uri="{FF2B5EF4-FFF2-40B4-BE49-F238E27FC236}">
-                <a16:creationId xmlns:a16="http://schemas.microsoft.com/office/drawing/2014/main" id="{84C90BE5-E407-466B-9B81-A7A5E717CEC6}"/>
+                <a16:creationId xmlns:a16="http://schemas.microsoft.com/office/drawing/2014/main" xmlns="" id="{84C90BE5-E407-466B-9B81-A7A5E717CEC6}"/>
               </a:ext>
             </a:extLst>
           </p:cNvPr>
@@ -5967,7 +5976,7 @@
           <p:cNvPr id="7" name="CaixaDeTexto 6">
             <a:extLst>
               <a:ext uri="{FF2B5EF4-FFF2-40B4-BE49-F238E27FC236}">
-                <a16:creationId xmlns:a16="http://schemas.microsoft.com/office/drawing/2014/main" id="{5FDBE5A5-2BF1-44AE-AF37-AD68A545CB9B}"/>
+                <a16:creationId xmlns:a16="http://schemas.microsoft.com/office/drawing/2014/main" xmlns="" id="{5FDBE5A5-2BF1-44AE-AF37-AD68A545CB9B}"/>
               </a:ext>
             </a:extLst>
           </p:cNvPr>
@@ -6007,7 +6016,7 @@
           <p:cNvPr id="11" name="Imagem 10">
             <a:extLst>
               <a:ext uri="{FF2B5EF4-FFF2-40B4-BE49-F238E27FC236}">
-                <a16:creationId xmlns:a16="http://schemas.microsoft.com/office/drawing/2014/main" id="{6244F971-9CC6-4B9F-BB47-09A82C7B6DD4}"/>
+                <a16:creationId xmlns:a16="http://schemas.microsoft.com/office/drawing/2014/main" xmlns="" id="{6244F971-9CC6-4B9F-BB47-09A82C7B6DD4}"/>
               </a:ext>
             </a:extLst>
           </p:cNvPr>
@@ -6039,7 +6048,7 @@
           <p:cNvPr id="13" name="CaixaDeTexto 12">
             <a:extLst>
               <a:ext uri="{FF2B5EF4-FFF2-40B4-BE49-F238E27FC236}">
-                <a16:creationId xmlns:a16="http://schemas.microsoft.com/office/drawing/2014/main" id="{AB454FF3-D826-44A3-B2CE-C7028527CED8}"/>
+                <a16:creationId xmlns:a16="http://schemas.microsoft.com/office/drawing/2014/main" xmlns="" id="{AB454FF3-D826-44A3-B2CE-C7028527CED8}"/>
               </a:ext>
             </a:extLst>
           </p:cNvPr>
@@ -6048,8 +6057,8 @@
         </p:nvSpPr>
         <p:spPr>
           <a:xfrm>
-            <a:off x="1442652" y="2044005"/>
-            <a:ext cx="8924667" cy="1384995"/>
+            <a:off x="1344681" y="2474893"/>
+            <a:ext cx="9775077" cy="954107"/>
           </a:xfrm>
           <a:prstGeom prst="rect">
             <a:avLst/>
@@ -6077,8 +6086,21 @@
                   <a:srgbClr val="FF0000"/>
                 </a:solidFill>
               </a:rPr>
-              <a:t>Uma proposta de segmentação baseada no comportamento e características de nossos clientes</a:t>
-            </a:r>
+              <a:t>Uma proposta de </a:t>
+            </a:r>
+            <a:r>
+              <a:rPr lang="pt-BR" sz="2800" dirty="0" smtClean="0">
+                <a:solidFill>
+                  <a:srgbClr val="FF0000"/>
+                </a:solidFill>
+              </a:rPr>
+              <a:t>segmentação: em busca de aumento de receita</a:t>
+            </a:r>
+            <a:endParaRPr lang="pt-BR" sz="2800" dirty="0">
+              <a:solidFill>
+                <a:srgbClr val="FF0000"/>
+              </a:solidFill>
+            </a:endParaRPr>
           </a:p>
         </p:txBody>
       </p:sp>
@@ -6087,7 +6109,7 @@
           <p:cNvPr id="15" name="Conector reto 14">
             <a:extLst>
               <a:ext uri="{FF2B5EF4-FFF2-40B4-BE49-F238E27FC236}">
-                <a16:creationId xmlns:a16="http://schemas.microsoft.com/office/drawing/2014/main" id="{1A83A55E-BA2A-463B-81EE-66BF3044D7B4}"/>
+                <a16:creationId xmlns:a16="http://schemas.microsoft.com/office/drawing/2014/main" xmlns="" id="{1A83A55E-BA2A-463B-81EE-66BF3044D7B4}"/>
               </a:ext>
             </a:extLst>
           </p:cNvPr>
@@ -6160,7 +6182,7 @@
           <p:cNvPr id="12" name="Imagem 11">
             <a:extLst>
               <a:ext uri="{FF2B5EF4-FFF2-40B4-BE49-F238E27FC236}">
-                <a16:creationId xmlns:a16="http://schemas.microsoft.com/office/drawing/2014/main" id="{45012191-CAAF-479E-8188-4611AAB46D34}"/>
+                <a16:creationId xmlns:a16="http://schemas.microsoft.com/office/drawing/2014/main" xmlns="" id="{45012191-CAAF-479E-8188-4611AAB46D34}"/>
               </a:ext>
             </a:extLst>
           </p:cNvPr>
@@ -6192,7 +6214,7 @@
           <p:cNvPr id="13" name="CaixaDeTexto 12">
             <a:extLst>
               <a:ext uri="{FF2B5EF4-FFF2-40B4-BE49-F238E27FC236}">
-                <a16:creationId xmlns:a16="http://schemas.microsoft.com/office/drawing/2014/main" id="{FB1A0CF8-D220-44EE-A5AC-E5B5791D84CF}"/>
+                <a16:creationId xmlns:a16="http://schemas.microsoft.com/office/drawing/2014/main" xmlns="" id="{FB1A0CF8-D220-44EE-A5AC-E5B5791D84CF}"/>
               </a:ext>
             </a:extLst>
           </p:cNvPr>
@@ -6216,13 +6238,18 @@
           <a:lstStyle/>
           <a:p>
             <a:r>
-              <a:rPr lang="pt-BR" dirty="0">
+              <a:rPr lang="pt-BR" dirty="0" smtClean="0">
                 <a:solidFill>
                   <a:srgbClr val="FF0000"/>
                 </a:solidFill>
               </a:rPr>
-              <a:t>Insights</a:t>
-            </a:r>
+              <a:t>Segmentação</a:t>
+            </a:r>
+            <a:endParaRPr lang="pt-BR" dirty="0">
+              <a:solidFill>
+                <a:srgbClr val="FF0000"/>
+              </a:solidFill>
+            </a:endParaRPr>
           </a:p>
         </p:txBody>
       </p:sp>
@@ -6231,7 +6258,7 @@
           <p:cNvPr id="3" name="CaixaDeTexto 2">
             <a:extLst>
               <a:ext uri="{FF2B5EF4-FFF2-40B4-BE49-F238E27FC236}">
-                <a16:creationId xmlns:a16="http://schemas.microsoft.com/office/drawing/2014/main" id="{84C90BE5-E407-466B-9B81-A7A5E717CEC6}"/>
+                <a16:creationId xmlns:a16="http://schemas.microsoft.com/office/drawing/2014/main" xmlns="" id="{84C90BE5-E407-466B-9B81-A7A5E717CEC6}"/>
               </a:ext>
             </a:extLst>
           </p:cNvPr>
@@ -6241,7 +6268,7 @@
         <p:spPr>
           <a:xfrm>
             <a:off x="129872" y="959093"/>
-            <a:ext cx="11724671" cy="4524315"/>
+            <a:ext cx="11724671" cy="3693319"/>
           </a:xfrm>
           <a:prstGeom prst="rect">
             <a:avLst/>
@@ -6256,106 +6283,69 @@
           <a:p>
             <a:r>
               <a:rPr lang="pt-BR" dirty="0"/>
-              <a:t>Com base no que observamos na etapa de análise exploratória dos dados (EDA) e com base no nosso conhecimento de negócio, elaboramos uma segmentação baseada em 5 pilares, o que separamos em 2 grupos:</a:t>
-            </a:r>
-          </a:p>
-          <a:p>
+              <a:t>Com base no que observamos na etapa de análise exploratória dos dados (EDA) e com base no nosso conhecimento de negócio, elaboramos uma segmentação baseada </a:t>
+            </a:r>
+            <a:r>
+              <a:rPr lang="pt-BR" dirty="0" smtClean="0"/>
+              <a:t>nas seguintes perguntas:</a:t>
+            </a:r>
             <a:endParaRPr lang="pt-BR" dirty="0"/>
           </a:p>
           <a:p>
+            <a:endParaRPr lang="pt-BR" dirty="0" smtClean="0"/>
+          </a:p>
+          <a:p>
+            <a:r>
+              <a:rPr lang="pt-BR" dirty="0" smtClean="0"/>
+              <a:t>Qual o propósito desta segmentação?</a:t>
+            </a:r>
+          </a:p>
+          <a:p>
+            <a:endParaRPr lang="pt-BR" dirty="0" smtClean="0"/>
+          </a:p>
+          <a:p>
+            <a:r>
+              <a:rPr lang="pt-BR" dirty="0" smtClean="0"/>
+              <a:t>	- Como a perspectiva de crescimento de lucro para os próximos anos não é muito boa, definimos como objetivo da segmentação </a:t>
+            </a:r>
+            <a:r>
+              <a:rPr lang="pt-BR" b="1" dirty="0" smtClean="0"/>
+              <a:t>o aumento da receita</a:t>
+            </a:r>
+            <a:r>
+              <a:rPr lang="pt-BR" dirty="0" smtClean="0"/>
+              <a:t>.</a:t>
+            </a:r>
+          </a:p>
+          <a:p>
+            <a:endParaRPr lang="pt-BR" dirty="0" smtClean="0"/>
+          </a:p>
+          <a:p>
             <a:endParaRPr lang="pt-BR" dirty="0"/>
           </a:p>
           <a:p>
             <a:r>
+              <a:rPr lang="pt-BR" dirty="0" smtClean="0"/>
+              <a:t>Qual o critério de segmentação?</a:t>
+            </a:r>
+          </a:p>
+          <a:p>
+            <a:r>
               <a:rPr lang="pt-BR" dirty="0"/>
-              <a:t>Características do cliente:</a:t>
-            </a:r>
-          </a:p>
-          <a:p>
-            <a:pPr marL="285750" indent="-285750">
-              <a:buFontTx/>
-              <a:buChar char="-"/>
-            </a:pPr>
-            <a:r>
-              <a:rPr lang="pt-BR" dirty="0"/>
-              <a:t>Renda do cliente</a:t>
-            </a:r>
-          </a:p>
-          <a:p>
-            <a:pPr marL="285750" indent="-285750">
-              <a:buFontTx/>
-              <a:buChar char="-"/>
-            </a:pPr>
-            <a:r>
-              <a:rPr lang="pt-BR" dirty="0"/>
-              <a:t>Se tem ou não filhos</a:t>
-            </a:r>
-          </a:p>
-          <a:p>
-            <a:pPr marL="285750" indent="-285750">
-              <a:buFontTx/>
-              <a:buChar char="-"/>
-            </a:pPr>
+              <a:t>	</a:t>
+            </a:r>
+            <a:r>
+              <a:rPr lang="pt-BR" dirty="0" smtClean="0"/>
+              <a:t>- Vemos segmentar o cliente com base no seu potencial de aumento de compra. Basicamente, queremos saber </a:t>
+            </a:r>
+            <a:r>
+              <a:rPr lang="pt-BR" b="1" dirty="0" smtClean="0"/>
+              <a:t>onde buscar a receita que precisamos.</a:t>
+            </a:r>
+            <a:endParaRPr lang="pt-BR" dirty="0" smtClean="0"/>
+          </a:p>
+          <a:p>
             <a:endParaRPr lang="pt-BR" dirty="0"/>
-          </a:p>
-          <a:p>
-            <a:pPr marL="285750" indent="-285750">
-              <a:buFontTx/>
-              <a:buChar char="-"/>
-            </a:pPr>
-            <a:endParaRPr lang="pt-BR" dirty="0"/>
-          </a:p>
-          <a:p>
-            <a:r>
-              <a:rPr lang="pt-BR" dirty="0"/>
-              <a:t>Comportamento do cliente</a:t>
-            </a:r>
-          </a:p>
-          <a:p>
-            <a:pPr marL="285750" indent="-285750">
-              <a:buFontTx/>
-              <a:buChar char="-"/>
-            </a:pPr>
-            <a:r>
-              <a:rPr lang="pt-BR" dirty="0"/>
-              <a:t>Quantidade de produtos/família de produtos comprados </a:t>
-            </a:r>
-          </a:p>
-          <a:p>
-            <a:pPr marL="285750" indent="-285750">
-              <a:buFontTx/>
-              <a:buChar char="-"/>
-            </a:pPr>
-            <a:r>
-              <a:rPr lang="pt-BR" dirty="0"/>
-              <a:t>Receita média</a:t>
-            </a:r>
-          </a:p>
-          <a:p>
-            <a:pPr marL="285750" indent="-285750">
-              <a:buFontTx/>
-              <a:buChar char="-"/>
-            </a:pPr>
-            <a:r>
-              <a:rPr lang="pt-BR" dirty="0"/>
-              <a:t>Frequência de compra</a:t>
-            </a:r>
-          </a:p>
-          <a:p>
-            <a:pPr marL="285750" indent="-285750">
-              <a:buFontTx/>
-              <a:buChar char="-"/>
-            </a:pPr>
-            <a:endParaRPr lang="pt-BR" dirty="0"/>
-          </a:p>
-          <a:p>
-            <a:endParaRPr lang="pt-BR" dirty="0"/>
-          </a:p>
-          <a:p>
-            <a:r>
-              <a:rPr lang="pt-BR" dirty="0"/>
-              <a:t>A seguir, detalhamos melhor a razão pelo qual escolhemos os critérios acima</a:t>
-            </a:r>
           </a:p>
         </p:txBody>
       </p:sp>
@@ -6394,7 +6384,7 @@
           <p:cNvPr id="5" name="Imagem 4">
             <a:extLst>
               <a:ext uri="{FF2B5EF4-FFF2-40B4-BE49-F238E27FC236}">
-                <a16:creationId xmlns:a16="http://schemas.microsoft.com/office/drawing/2014/main" id="{2789C9D7-DFF1-42E1-88B8-2A1A22B7D406}"/>
+                <a16:creationId xmlns:a16="http://schemas.microsoft.com/office/drawing/2014/main" xmlns="" id="{2789C9D7-DFF1-42E1-88B8-2A1A22B7D406}"/>
               </a:ext>
             </a:extLst>
           </p:cNvPr>
@@ -6426,7 +6416,7 @@
           <p:cNvPr id="2" name="Título 1">
             <a:extLst>
               <a:ext uri="{FF2B5EF4-FFF2-40B4-BE49-F238E27FC236}">
-                <a16:creationId xmlns:a16="http://schemas.microsoft.com/office/drawing/2014/main" id="{4D588DFD-861D-427A-8CF2-D1EFB519B044}"/>
+                <a16:creationId xmlns:a16="http://schemas.microsoft.com/office/drawing/2014/main" xmlns="" id="{4D588DFD-861D-427A-8CF2-D1EFB519B044}"/>
               </a:ext>
             </a:extLst>
           </p:cNvPr>
@@ -6463,7 +6453,7 @@
           <p:cNvPr id="3" name="Título 1">
             <a:extLst>
               <a:ext uri="{FF2B5EF4-FFF2-40B4-BE49-F238E27FC236}">
-                <a16:creationId xmlns:a16="http://schemas.microsoft.com/office/drawing/2014/main" id="{B5BC324F-3AA6-4C1B-BD15-BC50BF018B4C}"/>
+                <a16:creationId xmlns:a16="http://schemas.microsoft.com/office/drawing/2014/main" xmlns="" id="{B5BC324F-3AA6-4C1B-BD15-BC50BF018B4C}"/>
               </a:ext>
             </a:extLst>
           </p:cNvPr>
@@ -6557,8 +6547,13 @@
             </a:pPr>
             <a:r>
               <a:rPr lang="pt-BR" sz="2800" dirty="0"/>
-              <a:t>Uma propostas de segmentação baseada no comportamento e características dos nossos clientes.</a:t>
-            </a:r>
+              <a:t>Uma propostas de </a:t>
+            </a:r>
+            <a:r>
+              <a:rPr lang="pt-BR" sz="2800" dirty="0" smtClean="0"/>
+              <a:t>segmentação: em busca de aumento de receita.</a:t>
+            </a:r>
+            <a:endParaRPr lang="pt-BR" sz="2800" dirty="0"/>
           </a:p>
           <a:p>
             <a:pPr marL="457200" indent="-457200" algn="l">
@@ -6629,7 +6624,7 @@
           <p:cNvPr id="12" name="Imagem 11">
             <a:extLst>
               <a:ext uri="{FF2B5EF4-FFF2-40B4-BE49-F238E27FC236}">
-                <a16:creationId xmlns:a16="http://schemas.microsoft.com/office/drawing/2014/main" id="{45012191-CAAF-479E-8188-4611AAB46D34}"/>
+                <a16:creationId xmlns:a16="http://schemas.microsoft.com/office/drawing/2014/main" xmlns="" id="{45012191-CAAF-479E-8188-4611AAB46D34}"/>
               </a:ext>
             </a:extLst>
           </p:cNvPr>
@@ -6658,10 +6653,10 @@
       </p:pic>
       <p:sp>
         <p:nvSpPr>
-          <p:cNvPr id="6" name="CaixaDeTexto 5">
-            <a:extLst>
-              <a:ext uri="{FF2B5EF4-FFF2-40B4-BE49-F238E27FC236}">
-                <a16:creationId xmlns:a16="http://schemas.microsoft.com/office/drawing/2014/main" id="{49E01614-62FE-4AE1-9DDD-51EEDB8A30A0}"/>
+          <p:cNvPr id="7" name="CaixaDeTexto 6">
+            <a:extLst>
+              <a:ext uri="{FF2B5EF4-FFF2-40B4-BE49-F238E27FC236}">
+                <a16:creationId xmlns:a16="http://schemas.microsoft.com/office/drawing/2014/main" xmlns="" id="{D67E3CE1-1B05-4008-B992-B5BCAE7B17D0}"/>
               </a:ext>
             </a:extLst>
           </p:cNvPr>
@@ -6670,8 +6665,8 @@
         </p:nvSpPr>
         <p:spPr>
           <a:xfrm>
-            <a:off x="107459" y="131055"/>
-            <a:ext cx="8612660" cy="369332"/>
+            <a:off x="187022" y="611350"/>
+            <a:ext cx="11213391" cy="338554"/>
           </a:xfrm>
           <a:prstGeom prst="rect">
             <a:avLst/>
@@ -6685,18 +6680,19 @@
           <a:lstStyle/>
           <a:p>
             <a:r>
-              <a:rPr lang="pt-BR" dirty="0"/>
-              <a:t>Relação cliente x empresa</a:t>
-            </a:r>
-          </a:p>
-        </p:txBody>
-      </p:sp>
-      <p:sp>
-        <p:nvSpPr>
-          <p:cNvPr id="7" name="CaixaDeTexto 6">
-            <a:extLst>
-              <a:ext uri="{FF2B5EF4-FFF2-40B4-BE49-F238E27FC236}">
-                <a16:creationId xmlns:a16="http://schemas.microsoft.com/office/drawing/2014/main" id="{D67E3CE1-1B05-4008-B992-B5BCAE7B17D0}"/>
+              <a:rPr lang="pt-BR" sz="1600" dirty="0" smtClean="0"/>
+              <a:t>Quase 30% da nossa base de clientes não tem filhos, mas a receita gerada por eles representa quase 55%.</a:t>
+            </a:r>
+            <a:endParaRPr lang="pt-BR" sz="1600" dirty="0"/>
+          </a:p>
+        </p:txBody>
+      </p:sp>
+      <p:sp>
+        <p:nvSpPr>
+          <p:cNvPr id="8" name="CaixaDeTexto 7">
+            <a:extLst>
+              <a:ext uri="{FF2B5EF4-FFF2-40B4-BE49-F238E27FC236}">
+                <a16:creationId xmlns:a16="http://schemas.microsoft.com/office/drawing/2014/main" xmlns="" id="{3EEE96CD-72FD-4959-AB3B-4DECA7FA9786}"/>
               </a:ext>
             </a:extLst>
           </p:cNvPr>
@@ -6705,8 +6701,8 @@
         </p:nvSpPr>
         <p:spPr>
           <a:xfrm>
-            <a:off x="107459" y="1079127"/>
-            <a:ext cx="11213391" cy="338554"/>
+            <a:off x="514578" y="4223338"/>
+            <a:ext cx="4197200" cy="830997"/>
           </a:xfrm>
           <a:prstGeom prst="rect">
             <a:avLst/>
@@ -6720,18 +6716,19 @@
           <a:lstStyle/>
           <a:p>
             <a:r>
-              <a:rPr lang="pt-BR" sz="1600" dirty="0"/>
-              <a:t>Mais de 60% dos nossos clientes já comprou os 5 produtos/família de produtos, o que parece razoavelmente bom.</a:t>
-            </a:r>
-          </a:p>
-        </p:txBody>
-      </p:sp>
-      <p:sp>
-        <p:nvSpPr>
-          <p:cNvPr id="2" name="CaixaDeTexto 1">
-            <a:extLst>
-              <a:ext uri="{FF2B5EF4-FFF2-40B4-BE49-F238E27FC236}">
-                <a16:creationId xmlns:a16="http://schemas.microsoft.com/office/drawing/2014/main" id="{568DFC54-8910-4EF4-AF58-0C2F7A2F9E1B}"/>
+              <a:rPr lang="pt-BR" sz="1600" dirty="0" smtClean="0"/>
+              <a:t>A mediana da receita total dos últimos dois anos de quem não tem filhos é 4x maior que a mediana de quem tem um filho:</a:t>
+            </a:r>
+            <a:endParaRPr lang="pt-BR" sz="1600" dirty="0"/>
+          </a:p>
+        </p:txBody>
+      </p:sp>
+      <p:sp>
+        <p:nvSpPr>
+          <p:cNvPr id="9" name="CaixaDeTexto 8">
+            <a:extLst>
+              <a:ext uri="{FF2B5EF4-FFF2-40B4-BE49-F238E27FC236}">
+                <a16:creationId xmlns:a16="http://schemas.microsoft.com/office/drawing/2014/main" xmlns="" id="{FB1A0CF8-D220-44EE-A5AC-E5B5791D84CF}"/>
               </a:ext>
             </a:extLst>
           </p:cNvPr>
@@ -6740,7 +6737,7 @@
         </p:nvSpPr>
         <p:spPr>
           <a:xfrm>
-            <a:off x="502217" y="543501"/>
+            <a:off x="129872" y="194884"/>
             <a:ext cx="8612660" cy="369332"/>
           </a:xfrm>
           <a:prstGeom prst="rect">
@@ -6755,56 +6752,24 @@
           <a:lstStyle/>
           <a:p>
             <a:r>
-              <a:rPr lang="pt-BR" dirty="0"/>
-              <a:t>Receita por cliente </a:t>
-            </a:r>
-          </a:p>
-        </p:txBody>
-      </p:sp>
-      <p:sp>
-        <p:nvSpPr>
-          <p:cNvPr id="8" name="CaixaDeTexto 7">
-            <a:extLst>
-              <a:ext uri="{FF2B5EF4-FFF2-40B4-BE49-F238E27FC236}">
-                <a16:creationId xmlns:a16="http://schemas.microsoft.com/office/drawing/2014/main" id="{3EEE96CD-72FD-4959-AB3B-4DECA7FA9786}"/>
-              </a:ext>
-            </a:extLst>
-          </p:cNvPr>
-          <p:cNvSpPr txBox="1"/>
-          <p:nvPr/>
-        </p:nvSpPr>
-        <p:spPr>
-          <a:xfrm>
-            <a:off x="107459" y="5778873"/>
-            <a:ext cx="11952736" cy="830997"/>
-          </a:xfrm>
-          <a:prstGeom prst="rect">
-            <a:avLst/>
-          </a:prstGeom>
-          <a:noFill/>
-        </p:spPr>
-        <p:txBody>
-          <a:bodyPr wrap="square" rtlCol="0">
-            <a:spAutoFit/>
-          </a:bodyPr>
-          <a:lstStyle/>
-          <a:p>
-            <a:r>
-              <a:rPr lang="pt-BR" sz="1600" dirty="0"/>
-              <a:t>Além disso, aparentemente parece haver uma relação positiva entre aqueles clientes que compraram os 5 produtos/família de produtos pelo menos uma vez e a receita total gerada por este cliente. Ou seja, o cliente que compra 4-5 tipos de produtos/família de produto pode apresentar um perfil potencial em termos de oportunidade de crescimento de receita.</a:t>
-            </a:r>
+              <a:rPr lang="pt-BR" dirty="0" smtClean="0">
+                <a:solidFill>
+                  <a:srgbClr val="FF0000"/>
+                </a:solidFill>
+              </a:rPr>
+              <a:t>Segmentação – quantidade de filhos</a:t>
+            </a:r>
+            <a:endParaRPr lang="pt-BR" dirty="0">
+              <a:solidFill>
+                <a:srgbClr val="FF0000"/>
+              </a:solidFill>
+            </a:endParaRPr>
           </a:p>
         </p:txBody>
       </p:sp>
       <p:pic>
         <p:nvPicPr>
-          <p:cNvPr id="5" name="Imagem 4">
-            <a:extLst>
-              <a:ext uri="{FF2B5EF4-FFF2-40B4-BE49-F238E27FC236}">
-                <a16:creationId xmlns:a16="http://schemas.microsoft.com/office/drawing/2014/main" id="{45F71A72-D48D-418C-A5AB-C123B6C68904}"/>
-              </a:ext>
-            </a:extLst>
-          </p:cNvPr>
+          <p:cNvPr id="4" name="Imagem 3"/>
           <p:cNvPicPr>
             <a:picLocks noChangeAspect="1"/>
           </p:cNvPicPr>
@@ -6818,8 +6783,8 @@
         </p:blipFill>
         <p:spPr>
           <a:xfrm>
-            <a:off x="892058" y="1813739"/>
-            <a:ext cx="4606699" cy="3230521"/>
+            <a:off x="4795734" y="3537888"/>
+            <a:ext cx="6176809" cy="2626587"/>
           </a:xfrm>
           <a:prstGeom prst="rect">
             <a:avLst/>
@@ -6828,13 +6793,7 @@
       </p:pic>
       <p:pic>
         <p:nvPicPr>
-          <p:cNvPr id="11" name="Imagem 10">
-            <a:extLst>
-              <a:ext uri="{FF2B5EF4-FFF2-40B4-BE49-F238E27FC236}">
-                <a16:creationId xmlns:a16="http://schemas.microsoft.com/office/drawing/2014/main" id="{88379F84-6D40-459F-8E47-909956CEBBF9}"/>
-              </a:ext>
-            </a:extLst>
-          </p:cNvPr>
+          <p:cNvPr id="14" name="Imagem 13"/>
           <p:cNvPicPr>
             <a:picLocks noChangeAspect="1"/>
           </p:cNvPicPr>
@@ -6848,8 +6807,212 @@
         </p:blipFill>
         <p:spPr>
           <a:xfrm>
-            <a:off x="5956084" y="1769435"/>
-            <a:ext cx="4794294" cy="3319127"/>
+            <a:off x="702356" y="1209536"/>
+            <a:ext cx="3029630" cy="2027179"/>
+          </a:xfrm>
+          <a:prstGeom prst="rect">
+            <a:avLst/>
+          </a:prstGeom>
+        </p:spPr>
+      </p:pic>
+      <p:pic>
+        <p:nvPicPr>
+          <p:cNvPr id="16" name="Imagem 15"/>
+          <p:cNvPicPr>
+            <a:picLocks noChangeAspect="1"/>
+          </p:cNvPicPr>
+          <p:nvPr/>
+        </p:nvPicPr>
+        <p:blipFill>
+          <a:blip r:embed="rId5"/>
+          <a:stretch>
+            <a:fillRect/>
+          </a:stretch>
+        </p:blipFill>
+        <p:spPr>
+          <a:xfrm>
+            <a:off x="3593194" y="1162402"/>
+            <a:ext cx="2862558" cy="2059555"/>
+          </a:xfrm>
+          <a:prstGeom prst="rect">
+            <a:avLst/>
+          </a:prstGeom>
+        </p:spPr>
+      </p:pic>
+      <p:sp>
+        <p:nvSpPr>
+          <p:cNvPr id="17" name="Retângulo 16">
+            <a:extLst>
+              <a:ext uri="{FF2B5EF4-FFF2-40B4-BE49-F238E27FC236}">
+                <a16:creationId xmlns:a16="http://schemas.microsoft.com/office/drawing/2014/main" xmlns="" id="{99A4D406-ADA1-44CA-B8F0-92B1466F156C}"/>
+              </a:ext>
+            </a:extLst>
+          </p:cNvPr>
+          <p:cNvSpPr/>
+          <p:nvPr/>
+        </p:nvSpPr>
+        <p:spPr>
+          <a:xfrm>
+            <a:off x="1146925" y="1908069"/>
+            <a:ext cx="375465" cy="1224628"/>
+          </a:xfrm>
+          <a:prstGeom prst="rect">
+            <a:avLst/>
+          </a:prstGeom>
+          <a:noFill/>
+          <a:ln w="28575">
+            <a:solidFill>
+              <a:srgbClr val="FF2D2D"/>
+            </a:solidFill>
+          </a:ln>
+        </p:spPr>
+        <p:style>
+          <a:lnRef idx="2">
+            <a:schemeClr val="accent1">
+              <a:shade val="50000"/>
+            </a:schemeClr>
+          </a:lnRef>
+          <a:fillRef idx="1">
+            <a:schemeClr val="accent1"/>
+          </a:fillRef>
+          <a:effectRef idx="0">
+            <a:schemeClr val="accent1"/>
+          </a:effectRef>
+          <a:fontRef idx="minor">
+            <a:schemeClr val="lt1"/>
+          </a:fontRef>
+        </p:style>
+        <p:txBody>
+          <a:bodyPr rtlCol="0" anchor="ctr"/>
+          <a:lstStyle/>
+          <a:p>
+            <a:pPr algn="ctr"/>
+            <a:endParaRPr lang="pt-BR"/>
+          </a:p>
+        </p:txBody>
+      </p:sp>
+      <p:sp>
+        <p:nvSpPr>
+          <p:cNvPr id="18" name="Retângulo 17">
+            <a:extLst>
+              <a:ext uri="{FF2B5EF4-FFF2-40B4-BE49-F238E27FC236}">
+                <a16:creationId xmlns:a16="http://schemas.microsoft.com/office/drawing/2014/main" xmlns="" id="{99A4D406-ADA1-44CA-B8F0-92B1466F156C}"/>
+              </a:ext>
+            </a:extLst>
+          </p:cNvPr>
+          <p:cNvSpPr/>
+          <p:nvPr/>
+        </p:nvSpPr>
+        <p:spPr>
+          <a:xfrm>
+            <a:off x="4030262" y="1357245"/>
+            <a:ext cx="375465" cy="1775452"/>
+          </a:xfrm>
+          <a:prstGeom prst="rect">
+            <a:avLst/>
+          </a:prstGeom>
+          <a:noFill/>
+          <a:ln w="28575">
+            <a:solidFill>
+              <a:srgbClr val="FF2D2D"/>
+            </a:solidFill>
+          </a:ln>
+        </p:spPr>
+        <p:style>
+          <a:lnRef idx="2">
+            <a:schemeClr val="accent1">
+              <a:shade val="50000"/>
+            </a:schemeClr>
+          </a:lnRef>
+          <a:fillRef idx="1">
+            <a:schemeClr val="accent1"/>
+          </a:fillRef>
+          <a:effectRef idx="0">
+            <a:schemeClr val="accent1"/>
+          </a:effectRef>
+          <a:fontRef idx="minor">
+            <a:schemeClr val="lt1"/>
+          </a:fontRef>
+        </p:style>
+        <p:txBody>
+          <a:bodyPr rtlCol="0" anchor="ctr"/>
+          <a:lstStyle/>
+          <a:p>
+            <a:pPr algn="ctr"/>
+            <a:endParaRPr lang="pt-BR"/>
+          </a:p>
+        </p:txBody>
+      </p:sp>
+      <p:sp>
+        <p:nvSpPr>
+          <p:cNvPr id="19" name="Retângulo 18">
+            <a:extLst>
+              <a:ext uri="{FF2B5EF4-FFF2-40B4-BE49-F238E27FC236}">
+                <a16:creationId xmlns:a16="http://schemas.microsoft.com/office/drawing/2014/main" xmlns="" id="{99A4D406-ADA1-44CA-B8F0-92B1466F156C}"/>
+              </a:ext>
+            </a:extLst>
+          </p:cNvPr>
+          <p:cNvSpPr/>
+          <p:nvPr/>
+        </p:nvSpPr>
+        <p:spPr>
+          <a:xfrm>
+            <a:off x="8221436" y="3737695"/>
+            <a:ext cx="1200150" cy="2226975"/>
+          </a:xfrm>
+          <a:prstGeom prst="rect">
+            <a:avLst/>
+          </a:prstGeom>
+          <a:noFill/>
+          <a:ln w="28575">
+            <a:solidFill>
+              <a:srgbClr val="FF2D2D"/>
+            </a:solidFill>
+          </a:ln>
+        </p:spPr>
+        <p:style>
+          <a:lnRef idx="2">
+            <a:schemeClr val="accent1">
+              <a:shade val="50000"/>
+            </a:schemeClr>
+          </a:lnRef>
+          <a:fillRef idx="1">
+            <a:schemeClr val="accent1"/>
+          </a:fillRef>
+          <a:effectRef idx="0">
+            <a:schemeClr val="accent1"/>
+          </a:effectRef>
+          <a:fontRef idx="minor">
+            <a:schemeClr val="lt1"/>
+          </a:fontRef>
+        </p:style>
+        <p:txBody>
+          <a:bodyPr rtlCol="0" anchor="ctr"/>
+          <a:lstStyle/>
+          <a:p>
+            <a:pPr algn="ctr"/>
+            <a:endParaRPr lang="pt-BR"/>
+          </a:p>
+        </p:txBody>
+      </p:sp>
+      <p:pic>
+        <p:nvPicPr>
+          <p:cNvPr id="20" name="Imagem 19"/>
+          <p:cNvPicPr>
+            <a:picLocks noChangeAspect="1"/>
+          </p:cNvPicPr>
+          <p:nvPr/>
+        </p:nvPicPr>
+        <p:blipFill>
+          <a:blip r:embed="rId6"/>
+          <a:stretch>
+            <a:fillRect/>
+          </a:stretch>
+        </p:blipFill>
+        <p:spPr>
+          <a:xfrm>
+            <a:off x="9364231" y="2833050"/>
+            <a:ext cx="2827769" cy="571735"/>
           </a:xfrm>
           <a:prstGeom prst="rect">
             <a:avLst/>
@@ -6860,6 +7023,2278 @@
     <p:extLst>
       <p:ext uri="{BB962C8B-B14F-4D97-AF65-F5344CB8AC3E}">
         <p14:creationId xmlns:p14="http://schemas.microsoft.com/office/powerpoint/2010/main" val="2856808165"/>
+      </p:ext>
+    </p:extLst>
+  </p:cSld>
+  <p:clrMapOvr>
+    <a:masterClrMapping/>
+  </p:clrMapOvr>
+</p:sld>
+</file>
+
+<file path=ppt/slides/slide21.xml><?xml version="1.0" encoding="utf-8"?>
+<p:sld xmlns:a="http://schemas.openxmlformats.org/drawingml/2006/main" xmlns:r="http://schemas.openxmlformats.org/officeDocument/2006/relationships" xmlns:p="http://schemas.openxmlformats.org/presentationml/2006/main">
+  <p:cSld>
+    <p:spTree>
+      <p:nvGrpSpPr>
+        <p:cNvPr id="1" name=""/>
+        <p:cNvGrpSpPr/>
+        <p:nvPr/>
+      </p:nvGrpSpPr>
+      <p:grpSpPr>
+        <a:xfrm>
+          <a:off x="0" y="0"/>
+          <a:ext cx="0" cy="0"/>
+          <a:chOff x="0" y="0"/>
+          <a:chExt cx="0" cy="0"/>
+        </a:xfrm>
+      </p:grpSpPr>
+      <p:pic>
+        <p:nvPicPr>
+          <p:cNvPr id="12" name="Imagem 11">
+            <a:extLst>
+              <a:ext uri="{FF2B5EF4-FFF2-40B4-BE49-F238E27FC236}">
+                <a16:creationId xmlns:a16="http://schemas.microsoft.com/office/drawing/2014/main" xmlns="" id="{45012191-CAAF-479E-8188-4611AAB46D34}"/>
+              </a:ext>
+            </a:extLst>
+          </p:cNvPr>
+          <p:cNvPicPr>
+            <a:picLocks noChangeAspect="1"/>
+          </p:cNvPicPr>
+          <p:nvPr/>
+        </p:nvPicPr>
+        <p:blipFill>
+          <a:blip r:embed="rId2">
+            <a:lum bright="70000" contrast="-70000"/>
+          </a:blip>
+          <a:stretch>
+            <a:fillRect/>
+          </a:stretch>
+        </p:blipFill>
+        <p:spPr>
+          <a:xfrm>
+            <a:off x="10972543" y="5992769"/>
+            <a:ext cx="1075295" cy="731201"/>
+          </a:xfrm>
+          <a:prstGeom prst="rect">
+            <a:avLst/>
+          </a:prstGeom>
+        </p:spPr>
+      </p:pic>
+      <p:sp>
+        <p:nvSpPr>
+          <p:cNvPr id="7" name="CaixaDeTexto 6">
+            <a:extLst>
+              <a:ext uri="{FF2B5EF4-FFF2-40B4-BE49-F238E27FC236}">
+                <a16:creationId xmlns:a16="http://schemas.microsoft.com/office/drawing/2014/main" xmlns="" id="{D67E3CE1-1B05-4008-B992-B5BCAE7B17D0}"/>
+              </a:ext>
+            </a:extLst>
+          </p:cNvPr>
+          <p:cNvSpPr txBox="1"/>
+          <p:nvPr/>
+        </p:nvSpPr>
+        <p:spPr>
+          <a:xfrm>
+            <a:off x="187022" y="611350"/>
+            <a:ext cx="11213391" cy="338554"/>
+          </a:xfrm>
+          <a:prstGeom prst="rect">
+            <a:avLst/>
+          </a:prstGeom>
+          <a:noFill/>
+        </p:spPr>
+        <p:txBody>
+          <a:bodyPr wrap="square" rtlCol="0">
+            <a:spAutoFit/>
+          </a:bodyPr>
+          <a:lstStyle/>
+          <a:p>
+            <a:r>
+              <a:rPr lang="pt-BR" sz="1600" dirty="0" smtClean="0"/>
+              <a:t>Também em nossa análise, observamos que a renda e a receita total apresentam uma correlação positiva :</a:t>
+            </a:r>
+            <a:endParaRPr lang="pt-BR" sz="1600" dirty="0"/>
+          </a:p>
+        </p:txBody>
+      </p:sp>
+      <p:sp>
+        <p:nvSpPr>
+          <p:cNvPr id="9" name="CaixaDeTexto 8">
+            <a:extLst>
+              <a:ext uri="{FF2B5EF4-FFF2-40B4-BE49-F238E27FC236}">
+                <a16:creationId xmlns:a16="http://schemas.microsoft.com/office/drawing/2014/main" xmlns="" id="{FB1A0CF8-D220-44EE-A5AC-E5B5791D84CF}"/>
+              </a:ext>
+            </a:extLst>
+          </p:cNvPr>
+          <p:cNvSpPr txBox="1"/>
+          <p:nvPr/>
+        </p:nvSpPr>
+        <p:spPr>
+          <a:xfrm>
+            <a:off x="129872" y="194884"/>
+            <a:ext cx="8612660" cy="369332"/>
+          </a:xfrm>
+          <a:prstGeom prst="rect">
+            <a:avLst/>
+          </a:prstGeom>
+          <a:noFill/>
+        </p:spPr>
+        <p:txBody>
+          <a:bodyPr wrap="square" rtlCol="0">
+            <a:spAutoFit/>
+          </a:bodyPr>
+          <a:lstStyle/>
+          <a:p>
+            <a:r>
+              <a:rPr lang="pt-BR" dirty="0" smtClean="0">
+                <a:solidFill>
+                  <a:srgbClr val="FF0000"/>
+                </a:solidFill>
+              </a:rPr>
+              <a:t>Segmentação –  Renda</a:t>
+            </a:r>
+            <a:endParaRPr lang="pt-BR" dirty="0">
+              <a:solidFill>
+                <a:srgbClr val="FF0000"/>
+              </a:solidFill>
+            </a:endParaRPr>
+          </a:p>
+        </p:txBody>
+      </p:sp>
+      <p:pic>
+        <p:nvPicPr>
+          <p:cNvPr id="2" name="Imagem 1"/>
+          <p:cNvPicPr>
+            <a:picLocks noChangeAspect="1"/>
+          </p:cNvPicPr>
+          <p:nvPr/>
+        </p:nvPicPr>
+        <p:blipFill>
+          <a:blip r:embed="rId3"/>
+          <a:stretch>
+            <a:fillRect/>
+          </a:stretch>
+        </p:blipFill>
+        <p:spPr>
+          <a:xfrm>
+            <a:off x="2735641" y="2186481"/>
+            <a:ext cx="5838825" cy="2686050"/>
+          </a:xfrm>
+          <a:prstGeom prst="rect">
+            <a:avLst/>
+          </a:prstGeom>
+        </p:spPr>
+      </p:pic>
+      <p:pic>
+        <p:nvPicPr>
+          <p:cNvPr id="3" name="Imagem 2"/>
+          <p:cNvPicPr>
+            <a:picLocks noChangeAspect="1"/>
+          </p:cNvPicPr>
+          <p:nvPr/>
+        </p:nvPicPr>
+        <p:blipFill>
+          <a:blip r:embed="rId4"/>
+          <a:stretch>
+            <a:fillRect/>
+          </a:stretch>
+        </p:blipFill>
+        <p:spPr>
+          <a:xfrm>
+            <a:off x="8502166" y="1875012"/>
+            <a:ext cx="2470377" cy="311795"/>
+          </a:xfrm>
+          <a:prstGeom prst="rect">
+            <a:avLst/>
+          </a:prstGeom>
+        </p:spPr>
+      </p:pic>
+    </p:spTree>
+    <p:extLst>
+      <p:ext uri="{BB962C8B-B14F-4D97-AF65-F5344CB8AC3E}">
+        <p14:creationId xmlns:p14="http://schemas.microsoft.com/office/powerpoint/2010/main" val="1951345147"/>
+      </p:ext>
+    </p:extLst>
+  </p:cSld>
+  <p:clrMapOvr>
+    <a:masterClrMapping/>
+  </p:clrMapOvr>
+</p:sld>
+</file>
+
+<file path=ppt/slides/slide22.xml><?xml version="1.0" encoding="utf-8"?>
+<p:sld xmlns:a="http://schemas.openxmlformats.org/drawingml/2006/main" xmlns:r="http://schemas.openxmlformats.org/officeDocument/2006/relationships" xmlns:p="http://schemas.openxmlformats.org/presentationml/2006/main">
+  <p:cSld>
+    <p:spTree>
+      <p:nvGrpSpPr>
+        <p:cNvPr id="1" name=""/>
+        <p:cNvGrpSpPr/>
+        <p:nvPr/>
+      </p:nvGrpSpPr>
+      <p:grpSpPr>
+        <a:xfrm>
+          <a:off x="0" y="0"/>
+          <a:ext cx="0" cy="0"/>
+          <a:chOff x="0" y="0"/>
+          <a:chExt cx="0" cy="0"/>
+        </a:xfrm>
+      </p:grpSpPr>
+      <p:pic>
+        <p:nvPicPr>
+          <p:cNvPr id="12" name="Imagem 11">
+            <a:extLst>
+              <a:ext uri="{FF2B5EF4-FFF2-40B4-BE49-F238E27FC236}">
+                <a16:creationId xmlns:a16="http://schemas.microsoft.com/office/drawing/2014/main" xmlns="" id="{45012191-CAAF-479E-8188-4611AAB46D34}"/>
+              </a:ext>
+            </a:extLst>
+          </p:cNvPr>
+          <p:cNvPicPr>
+            <a:picLocks noChangeAspect="1"/>
+          </p:cNvPicPr>
+          <p:nvPr/>
+        </p:nvPicPr>
+        <p:blipFill>
+          <a:blip r:embed="rId2">
+            <a:lum bright="70000" contrast="-70000"/>
+          </a:blip>
+          <a:stretch>
+            <a:fillRect/>
+          </a:stretch>
+        </p:blipFill>
+        <p:spPr>
+          <a:xfrm>
+            <a:off x="10972543" y="5992769"/>
+            <a:ext cx="1075295" cy="731201"/>
+          </a:xfrm>
+          <a:prstGeom prst="rect">
+            <a:avLst/>
+          </a:prstGeom>
+        </p:spPr>
+      </p:pic>
+      <p:sp>
+        <p:nvSpPr>
+          <p:cNvPr id="7" name="CaixaDeTexto 6">
+            <a:extLst>
+              <a:ext uri="{FF2B5EF4-FFF2-40B4-BE49-F238E27FC236}">
+                <a16:creationId xmlns:a16="http://schemas.microsoft.com/office/drawing/2014/main" xmlns="" id="{D67E3CE1-1B05-4008-B992-B5BCAE7B17D0}"/>
+              </a:ext>
+            </a:extLst>
+          </p:cNvPr>
+          <p:cNvSpPr txBox="1"/>
+          <p:nvPr/>
+        </p:nvSpPr>
+        <p:spPr>
+          <a:xfrm>
+            <a:off x="129872" y="603015"/>
+            <a:ext cx="11213391" cy="338554"/>
+          </a:xfrm>
+          <a:prstGeom prst="rect">
+            <a:avLst/>
+          </a:prstGeom>
+          <a:noFill/>
+        </p:spPr>
+        <p:txBody>
+          <a:bodyPr wrap="square" rtlCol="0">
+            <a:spAutoFit/>
+          </a:bodyPr>
+          <a:lstStyle/>
+          <a:p>
+            <a:r>
+              <a:rPr lang="pt-BR" sz="1600" dirty="0" smtClean="0"/>
+              <a:t>Com base nas informações que obtivemos, nossa proposta de segmentação considera os seguintes critérios:</a:t>
+            </a:r>
+            <a:endParaRPr lang="pt-BR" sz="1600" dirty="0"/>
+          </a:p>
+        </p:txBody>
+      </p:sp>
+      <p:sp>
+        <p:nvSpPr>
+          <p:cNvPr id="9" name="CaixaDeTexto 8">
+            <a:extLst>
+              <a:ext uri="{FF2B5EF4-FFF2-40B4-BE49-F238E27FC236}">
+                <a16:creationId xmlns:a16="http://schemas.microsoft.com/office/drawing/2014/main" xmlns="" id="{FB1A0CF8-D220-44EE-A5AC-E5B5791D84CF}"/>
+              </a:ext>
+            </a:extLst>
+          </p:cNvPr>
+          <p:cNvSpPr txBox="1"/>
+          <p:nvPr/>
+        </p:nvSpPr>
+        <p:spPr>
+          <a:xfrm>
+            <a:off x="129872" y="194884"/>
+            <a:ext cx="8612660" cy="369332"/>
+          </a:xfrm>
+          <a:prstGeom prst="rect">
+            <a:avLst/>
+          </a:prstGeom>
+          <a:noFill/>
+        </p:spPr>
+        <p:txBody>
+          <a:bodyPr wrap="square" rtlCol="0">
+            <a:spAutoFit/>
+          </a:bodyPr>
+          <a:lstStyle/>
+          <a:p>
+            <a:r>
+              <a:rPr lang="pt-BR" dirty="0" smtClean="0">
+                <a:solidFill>
+                  <a:srgbClr val="FF0000"/>
+                </a:solidFill>
+              </a:rPr>
+              <a:t>Segmentação</a:t>
+            </a:r>
+            <a:endParaRPr lang="pt-BR" dirty="0">
+              <a:solidFill>
+                <a:srgbClr val="FF0000"/>
+              </a:solidFill>
+            </a:endParaRPr>
+          </a:p>
+        </p:txBody>
+      </p:sp>
+      <p:sp>
+        <p:nvSpPr>
+          <p:cNvPr id="13" name="CaixaDeTexto 12">
+            <a:extLst>
+              <a:ext uri="{FF2B5EF4-FFF2-40B4-BE49-F238E27FC236}">
+                <a16:creationId xmlns:a16="http://schemas.microsoft.com/office/drawing/2014/main" xmlns="" id="{D67E3CE1-1B05-4008-B992-B5BCAE7B17D0}"/>
+              </a:ext>
+            </a:extLst>
+          </p:cNvPr>
+          <p:cNvSpPr txBox="1"/>
+          <p:nvPr/>
+        </p:nvSpPr>
+        <p:spPr>
+          <a:xfrm>
+            <a:off x="129872" y="1621001"/>
+            <a:ext cx="11213391" cy="1815882"/>
+          </a:xfrm>
+          <a:prstGeom prst="rect">
+            <a:avLst/>
+          </a:prstGeom>
+          <a:noFill/>
+        </p:spPr>
+        <p:txBody>
+          <a:bodyPr wrap="square" rtlCol="0">
+            <a:spAutoFit/>
+          </a:bodyPr>
+          <a:lstStyle/>
+          <a:p>
+            <a:r>
+              <a:rPr lang="pt-BR" sz="1600" dirty="0" smtClean="0"/>
+              <a:t>Clientes potenciais A (alto potencial): os clientes sem filhos e com a renda acima de ~68000 (~12% do total dos clientes).</a:t>
+            </a:r>
+          </a:p>
+          <a:p>
+            <a:endParaRPr lang="pt-BR" sz="1600" dirty="0" smtClean="0"/>
+          </a:p>
+          <a:p>
+            <a:endParaRPr lang="pt-BR" sz="1600" dirty="0"/>
+          </a:p>
+          <a:p>
+            <a:r>
+              <a:rPr lang="pt-BR" sz="1600" dirty="0" smtClean="0"/>
+              <a:t>Clientes potenciais B (médio potencial)</a:t>
+            </a:r>
+            <a:r>
+              <a:rPr lang="pt-BR" sz="1600" dirty="0" smtClean="0"/>
+              <a:t>: </a:t>
+            </a:r>
+            <a:r>
+              <a:rPr lang="pt-BR" sz="1600" dirty="0"/>
+              <a:t>os clientes sem filhos e com a renda entre </a:t>
+            </a:r>
+            <a:r>
+              <a:rPr lang="pt-BR" sz="1600" dirty="0" smtClean="0"/>
+              <a:t>~51000 e ~68000 (~9% do total de clientes).</a:t>
+            </a:r>
+          </a:p>
+          <a:p>
+            <a:endParaRPr lang="pt-BR" sz="1600" dirty="0" smtClean="0"/>
+          </a:p>
+          <a:p>
+            <a:endParaRPr lang="pt-BR" sz="1600" dirty="0"/>
+          </a:p>
+          <a:p>
+            <a:r>
+              <a:rPr lang="pt-BR" sz="1600" dirty="0" smtClean="0"/>
+              <a:t>Clientes </a:t>
+            </a:r>
+            <a:r>
+              <a:rPr lang="pt-BR" sz="1600" dirty="0"/>
+              <a:t>potenciais B </a:t>
+            </a:r>
+            <a:r>
+              <a:rPr lang="pt-BR" sz="1600" dirty="0" smtClean="0"/>
+              <a:t>(baixo potencial): Demais clientes</a:t>
+            </a:r>
+            <a:endParaRPr lang="pt-BR" sz="1600" dirty="0"/>
+          </a:p>
+        </p:txBody>
+      </p:sp>
+    </p:spTree>
+    <p:extLst>
+      <p:ext uri="{BB962C8B-B14F-4D97-AF65-F5344CB8AC3E}">
+        <p14:creationId xmlns:p14="http://schemas.microsoft.com/office/powerpoint/2010/main" val="3088922244"/>
+      </p:ext>
+    </p:extLst>
+  </p:cSld>
+  <p:clrMapOvr>
+    <a:masterClrMapping/>
+  </p:clrMapOvr>
+</p:sld>
+</file>
+
+<file path=ppt/slides/slide23.xml><?xml version="1.0" encoding="utf-8"?>
+<p:sld xmlns:a="http://schemas.openxmlformats.org/drawingml/2006/main" xmlns:r="http://schemas.openxmlformats.org/officeDocument/2006/relationships" xmlns:p="http://schemas.openxmlformats.org/presentationml/2006/main">
+  <p:cSld>
+    <p:spTree>
+      <p:nvGrpSpPr>
+        <p:cNvPr id="1" name=""/>
+        <p:cNvGrpSpPr/>
+        <p:nvPr/>
+      </p:nvGrpSpPr>
+      <p:grpSpPr>
+        <a:xfrm>
+          <a:off x="0" y="0"/>
+          <a:ext cx="0" cy="0"/>
+          <a:chOff x="0" y="0"/>
+          <a:chExt cx="0" cy="0"/>
+        </a:xfrm>
+      </p:grpSpPr>
+      <p:sp>
+        <p:nvSpPr>
+          <p:cNvPr id="7" name="CaixaDeTexto 6">
+            <a:extLst>
+              <a:ext uri="{FF2B5EF4-FFF2-40B4-BE49-F238E27FC236}">
+                <a16:creationId xmlns:a16="http://schemas.microsoft.com/office/drawing/2014/main" xmlns="" id="{5FDBE5A5-2BF1-44AE-AF37-AD68A545CB9B}"/>
+              </a:ext>
+            </a:extLst>
+          </p:cNvPr>
+          <p:cNvSpPr txBox="1"/>
+          <p:nvPr/>
+        </p:nvSpPr>
+        <p:spPr>
+          <a:xfrm>
+            <a:off x="194619" y="177284"/>
+            <a:ext cx="7034084" cy="461665"/>
+          </a:xfrm>
+          <a:prstGeom prst="rect">
+            <a:avLst/>
+          </a:prstGeom>
+          <a:noFill/>
+        </p:spPr>
+        <p:txBody>
+          <a:bodyPr wrap="square">
+            <a:spAutoFit/>
+          </a:bodyPr>
+          <a:lstStyle/>
+          <a:p>
+            <a:r>
+              <a:rPr lang="pt-BR" sz="2400" dirty="0" smtClean="0">
+                <a:solidFill>
+                  <a:srgbClr val="FF0000"/>
+                </a:solidFill>
+              </a:rPr>
+              <a:t>3. </a:t>
+            </a:r>
+            <a:r>
+              <a:rPr lang="pt-BR" sz="2400" dirty="0">
+                <a:solidFill>
+                  <a:srgbClr val="FF0000"/>
+                </a:solidFill>
+              </a:rPr>
+              <a:t>Um modelo de classificação de clientes</a:t>
+            </a:r>
+            <a:endParaRPr lang="pt-BR" sz="2400" dirty="0">
+              <a:solidFill>
+                <a:srgbClr val="FF0000"/>
+              </a:solidFill>
+            </a:endParaRPr>
+          </a:p>
+        </p:txBody>
+      </p:sp>
+      <p:pic>
+        <p:nvPicPr>
+          <p:cNvPr id="11" name="Imagem 10">
+            <a:extLst>
+              <a:ext uri="{FF2B5EF4-FFF2-40B4-BE49-F238E27FC236}">
+                <a16:creationId xmlns:a16="http://schemas.microsoft.com/office/drawing/2014/main" xmlns="" id="{6244F971-9CC6-4B9F-BB47-09A82C7B6DD4}"/>
+              </a:ext>
+            </a:extLst>
+          </p:cNvPr>
+          <p:cNvPicPr>
+            <a:picLocks noChangeAspect="1"/>
+          </p:cNvPicPr>
+          <p:nvPr/>
+        </p:nvPicPr>
+        <p:blipFill>
+          <a:blip r:embed="rId2">
+            <a:lum bright="70000" contrast="-70000"/>
+          </a:blip>
+          <a:stretch>
+            <a:fillRect/>
+          </a:stretch>
+        </p:blipFill>
+        <p:spPr>
+          <a:xfrm>
+            <a:off x="10972543" y="5992769"/>
+            <a:ext cx="1075295" cy="731201"/>
+          </a:xfrm>
+          <a:prstGeom prst="rect">
+            <a:avLst/>
+          </a:prstGeom>
+        </p:spPr>
+      </p:pic>
+      <p:sp>
+        <p:nvSpPr>
+          <p:cNvPr id="13" name="CaixaDeTexto 12">
+            <a:extLst>
+              <a:ext uri="{FF2B5EF4-FFF2-40B4-BE49-F238E27FC236}">
+                <a16:creationId xmlns:a16="http://schemas.microsoft.com/office/drawing/2014/main" xmlns="" id="{AB454FF3-D826-44A3-B2CE-C7028527CED8}"/>
+              </a:ext>
+            </a:extLst>
+          </p:cNvPr>
+          <p:cNvSpPr txBox="1"/>
+          <p:nvPr/>
+        </p:nvSpPr>
+        <p:spPr>
+          <a:xfrm>
+            <a:off x="1344681" y="2474893"/>
+            <a:ext cx="9775077" cy="1384995"/>
+          </a:xfrm>
+          <a:prstGeom prst="rect">
+            <a:avLst/>
+          </a:prstGeom>
+          <a:noFill/>
+        </p:spPr>
+        <p:txBody>
+          <a:bodyPr wrap="square">
+            <a:spAutoFit/>
+          </a:bodyPr>
+          <a:lstStyle/>
+          <a:p>
+            <a:pPr algn="ctr"/>
+            <a:endParaRPr lang="pt-BR" sz="2800" dirty="0" smtClean="0">
+              <a:solidFill>
+                <a:srgbClr val="FF0000"/>
+              </a:solidFill>
+            </a:endParaRPr>
+          </a:p>
+          <a:p>
+            <a:pPr algn="ctr"/>
+            <a:r>
+              <a:rPr lang="pt-BR" sz="2800" dirty="0" smtClean="0">
+                <a:solidFill>
+                  <a:srgbClr val="FF0000"/>
+                </a:solidFill>
+              </a:rPr>
+              <a:t>Vamos </a:t>
+            </a:r>
+            <a:r>
+              <a:rPr lang="pt-BR" sz="2800" dirty="0">
+                <a:solidFill>
+                  <a:srgbClr val="FF0000"/>
+                </a:solidFill>
+              </a:rPr>
+              <a:t>ser mais assertivos em nossas campanhas?</a:t>
+            </a:r>
+          </a:p>
+          <a:p>
+            <a:pPr algn="ctr"/>
+            <a:endParaRPr lang="pt-BR" sz="2800" dirty="0">
+              <a:solidFill>
+                <a:srgbClr val="FF0000"/>
+              </a:solidFill>
+            </a:endParaRPr>
+          </a:p>
+        </p:txBody>
+      </p:sp>
+      <p:cxnSp>
+        <p:nvCxnSpPr>
+          <p:cNvPr id="15" name="Conector reto 14">
+            <a:extLst>
+              <a:ext uri="{FF2B5EF4-FFF2-40B4-BE49-F238E27FC236}">
+                <a16:creationId xmlns:a16="http://schemas.microsoft.com/office/drawing/2014/main" xmlns="" id="{1A83A55E-BA2A-463B-81EE-66BF3044D7B4}"/>
+              </a:ext>
+            </a:extLst>
+          </p:cNvPr>
+          <p:cNvCxnSpPr>
+            <a:cxnSpLocks/>
+          </p:cNvCxnSpPr>
+          <p:nvPr/>
+        </p:nvCxnSpPr>
+        <p:spPr>
+          <a:xfrm>
+            <a:off x="3827505" y="3429000"/>
+            <a:ext cx="6403889" cy="0"/>
+          </a:xfrm>
+          <a:prstGeom prst="line">
+            <a:avLst/>
+          </a:prstGeom>
+          <a:ln w="57150">
+            <a:solidFill>
+              <a:srgbClr val="FF2D2D"/>
+            </a:solidFill>
+          </a:ln>
+        </p:spPr>
+        <p:style>
+          <a:lnRef idx="1">
+            <a:schemeClr val="accent1"/>
+          </a:lnRef>
+          <a:fillRef idx="0">
+            <a:schemeClr val="accent1"/>
+          </a:fillRef>
+          <a:effectRef idx="0">
+            <a:schemeClr val="accent1"/>
+          </a:effectRef>
+          <a:fontRef idx="minor">
+            <a:schemeClr val="tx1"/>
+          </a:fontRef>
+        </p:style>
+      </p:cxnSp>
+    </p:spTree>
+    <p:extLst>
+      <p:ext uri="{BB962C8B-B14F-4D97-AF65-F5344CB8AC3E}">
+        <p14:creationId xmlns:p14="http://schemas.microsoft.com/office/powerpoint/2010/main" val="2347844492"/>
+      </p:ext>
+    </p:extLst>
+  </p:cSld>
+  <p:clrMapOvr>
+    <a:masterClrMapping/>
+  </p:clrMapOvr>
+</p:sld>
+</file>
+
+<file path=ppt/slides/slide24.xml><?xml version="1.0" encoding="utf-8"?>
+<p:sld xmlns:a="http://schemas.openxmlformats.org/drawingml/2006/main" xmlns:r="http://schemas.openxmlformats.org/officeDocument/2006/relationships" xmlns:p="http://schemas.openxmlformats.org/presentationml/2006/main">
+  <p:cSld>
+    <p:spTree>
+      <p:nvGrpSpPr>
+        <p:cNvPr id="1" name=""/>
+        <p:cNvGrpSpPr/>
+        <p:nvPr/>
+      </p:nvGrpSpPr>
+      <p:grpSpPr>
+        <a:xfrm>
+          <a:off x="0" y="0"/>
+          <a:ext cx="0" cy="0"/>
+          <a:chOff x="0" y="0"/>
+          <a:chExt cx="0" cy="0"/>
+        </a:xfrm>
+      </p:grpSpPr>
+      <p:pic>
+        <p:nvPicPr>
+          <p:cNvPr id="12" name="Imagem 11">
+            <a:extLst>
+              <a:ext uri="{FF2B5EF4-FFF2-40B4-BE49-F238E27FC236}">
+                <a16:creationId xmlns:a16="http://schemas.microsoft.com/office/drawing/2014/main" xmlns="" id="{45012191-CAAF-479E-8188-4611AAB46D34}"/>
+              </a:ext>
+            </a:extLst>
+          </p:cNvPr>
+          <p:cNvPicPr>
+            <a:picLocks noChangeAspect="1"/>
+          </p:cNvPicPr>
+          <p:nvPr/>
+        </p:nvPicPr>
+        <p:blipFill>
+          <a:blip r:embed="rId2">
+            <a:lum bright="70000" contrast="-70000"/>
+          </a:blip>
+          <a:stretch>
+            <a:fillRect/>
+          </a:stretch>
+        </p:blipFill>
+        <p:spPr>
+          <a:xfrm>
+            <a:off x="10972543" y="5992769"/>
+            <a:ext cx="1075295" cy="731201"/>
+          </a:xfrm>
+          <a:prstGeom prst="rect">
+            <a:avLst/>
+          </a:prstGeom>
+        </p:spPr>
+      </p:pic>
+      <p:sp>
+        <p:nvSpPr>
+          <p:cNvPr id="7" name="CaixaDeTexto 6">
+            <a:extLst>
+              <a:ext uri="{FF2B5EF4-FFF2-40B4-BE49-F238E27FC236}">
+                <a16:creationId xmlns:a16="http://schemas.microsoft.com/office/drawing/2014/main" xmlns="" id="{D67E3CE1-1B05-4008-B992-B5BCAE7B17D0}"/>
+              </a:ext>
+            </a:extLst>
+          </p:cNvPr>
+          <p:cNvSpPr txBox="1"/>
+          <p:nvPr/>
+        </p:nvSpPr>
+        <p:spPr>
+          <a:xfrm>
+            <a:off x="129872" y="774465"/>
+            <a:ext cx="11213391" cy="1077218"/>
+          </a:xfrm>
+          <a:prstGeom prst="rect">
+            <a:avLst/>
+          </a:prstGeom>
+          <a:noFill/>
+        </p:spPr>
+        <p:txBody>
+          <a:bodyPr wrap="square" rtlCol="0">
+            <a:spAutoFit/>
+          </a:bodyPr>
+          <a:lstStyle/>
+          <a:p>
+            <a:r>
+              <a:rPr lang="pt-BR" sz="1600" dirty="0" smtClean="0"/>
+              <a:t>Com o objetivo de melhorar o desempenho da sexta campanha, criamos um modelo de classificação de clientes utilizando o algoritmo regressão logística, bastante utilizado para esta finalidade.</a:t>
+            </a:r>
+          </a:p>
+          <a:p>
+            <a:endParaRPr lang="pt-BR" sz="1600" dirty="0" smtClean="0"/>
+          </a:p>
+          <a:p>
+            <a:r>
+              <a:rPr lang="pt-BR" sz="1600" dirty="0" smtClean="0"/>
+              <a:t>O objetivo era obter uma probabilidade (para cada cliente) de ele comprar ou não o </a:t>
+            </a:r>
+            <a:r>
+              <a:rPr lang="pt-BR" sz="1600" dirty="0" err="1" smtClean="0"/>
+              <a:t>gadget</a:t>
+            </a:r>
+            <a:r>
+              <a:rPr lang="pt-BR" sz="1600" dirty="0" smtClean="0"/>
+              <a:t>.</a:t>
+            </a:r>
+            <a:endParaRPr lang="pt-BR" sz="1600" dirty="0"/>
+          </a:p>
+        </p:txBody>
+      </p:sp>
+      <p:sp>
+        <p:nvSpPr>
+          <p:cNvPr id="9" name="CaixaDeTexto 8">
+            <a:extLst>
+              <a:ext uri="{FF2B5EF4-FFF2-40B4-BE49-F238E27FC236}">
+                <a16:creationId xmlns:a16="http://schemas.microsoft.com/office/drawing/2014/main" xmlns="" id="{FB1A0CF8-D220-44EE-A5AC-E5B5791D84CF}"/>
+              </a:ext>
+            </a:extLst>
+          </p:cNvPr>
+          <p:cNvSpPr txBox="1"/>
+          <p:nvPr/>
+        </p:nvSpPr>
+        <p:spPr>
+          <a:xfrm>
+            <a:off x="129872" y="194884"/>
+            <a:ext cx="8612660" cy="369332"/>
+          </a:xfrm>
+          <a:prstGeom prst="rect">
+            <a:avLst/>
+          </a:prstGeom>
+          <a:noFill/>
+        </p:spPr>
+        <p:txBody>
+          <a:bodyPr wrap="square" rtlCol="0">
+            <a:spAutoFit/>
+          </a:bodyPr>
+          <a:lstStyle/>
+          <a:p>
+            <a:r>
+              <a:rPr lang="pt-BR" dirty="0" smtClean="0">
+                <a:solidFill>
+                  <a:srgbClr val="FF0000"/>
+                </a:solidFill>
+              </a:rPr>
+              <a:t>Modelo de classificação</a:t>
+            </a:r>
+            <a:endParaRPr lang="pt-BR" dirty="0">
+              <a:solidFill>
+                <a:srgbClr val="FF0000"/>
+              </a:solidFill>
+            </a:endParaRPr>
+          </a:p>
+        </p:txBody>
+      </p:sp>
+      <p:sp>
+        <p:nvSpPr>
+          <p:cNvPr id="2" name="Retângulo 1"/>
+          <p:cNvSpPr/>
+          <p:nvPr/>
+        </p:nvSpPr>
+        <p:spPr>
+          <a:xfrm>
+            <a:off x="129872" y="2123798"/>
+            <a:ext cx="4744208" cy="2308324"/>
+          </a:xfrm>
+          <a:prstGeom prst="rect">
+            <a:avLst/>
+          </a:prstGeom>
+        </p:spPr>
+        <p:txBody>
+          <a:bodyPr wrap="square">
+            <a:spAutoFit/>
+          </a:bodyPr>
+          <a:lstStyle/>
+          <a:p>
+            <a:r>
+              <a:rPr lang="pt-BR" sz="1200" dirty="0" smtClean="0"/>
+              <a:t>As colunas preditoras (x) que melhor contribuíram para o modelo foram:</a:t>
+            </a:r>
+          </a:p>
+          <a:p>
+            <a:endParaRPr lang="pt-BR" sz="1200" dirty="0"/>
+          </a:p>
+          <a:p>
+            <a:r>
+              <a:rPr lang="pt-BR" sz="1200" dirty="0" smtClean="0"/>
+              <a:t>'</a:t>
+            </a:r>
+            <a:r>
+              <a:rPr lang="pt-BR" sz="1200" dirty="0" err="1" smtClean="0"/>
+              <a:t>Recency</a:t>
+            </a:r>
+            <a:r>
+              <a:rPr lang="pt-BR" sz="1200" dirty="0" smtClean="0"/>
+              <a:t>‘  - </a:t>
+            </a:r>
+            <a:r>
+              <a:rPr lang="pt-BR" sz="1200" dirty="0" err="1" smtClean="0"/>
+              <a:t>Qtde</a:t>
+            </a:r>
+            <a:r>
+              <a:rPr lang="pt-BR" sz="1200" dirty="0" smtClean="0"/>
+              <a:t> de dias desde a última compra</a:t>
+            </a:r>
+          </a:p>
+          <a:p>
+            <a:r>
+              <a:rPr lang="pt-BR" sz="1200" dirty="0" smtClean="0"/>
+              <a:t>'</a:t>
+            </a:r>
+            <a:r>
+              <a:rPr lang="pt-BR" sz="1200" dirty="0" err="1" smtClean="0"/>
+              <a:t>MntTotal</a:t>
+            </a:r>
+            <a:r>
+              <a:rPr lang="pt-BR" sz="1200" dirty="0" smtClean="0"/>
+              <a:t>‘ – Receita </a:t>
+            </a:r>
+          </a:p>
+          <a:p>
+            <a:r>
+              <a:rPr lang="pt-BR" sz="1200" dirty="0" smtClean="0"/>
+              <a:t>'</a:t>
+            </a:r>
+            <a:r>
+              <a:rPr lang="pt-BR" sz="1200" dirty="0" err="1" smtClean="0"/>
+              <a:t>Income</a:t>
+            </a:r>
+            <a:r>
+              <a:rPr lang="pt-BR" sz="1200" dirty="0" smtClean="0"/>
+              <a:t>‘ – Renda </a:t>
+            </a:r>
+          </a:p>
+          <a:p>
+            <a:r>
+              <a:rPr lang="pt-BR" sz="1200" dirty="0" smtClean="0"/>
+              <a:t>'Education_2n </a:t>
+            </a:r>
+            <a:r>
+              <a:rPr lang="pt-BR" sz="1200" dirty="0" err="1" smtClean="0"/>
+              <a:t>Cycle</a:t>
+            </a:r>
+            <a:r>
+              <a:rPr lang="pt-BR" sz="1200" dirty="0" smtClean="0"/>
+              <a:t>‘</a:t>
+            </a:r>
+          </a:p>
+          <a:p>
+            <a:r>
+              <a:rPr lang="pt-BR" sz="1200" dirty="0" smtClean="0"/>
+              <a:t>‘</a:t>
+            </a:r>
+            <a:r>
+              <a:rPr lang="pt-BR" sz="1200" dirty="0" err="1" smtClean="0"/>
+              <a:t>Education_Master</a:t>
+            </a:r>
+            <a:r>
+              <a:rPr lang="pt-BR" sz="1200" dirty="0" smtClean="0"/>
+              <a:t>‘         Educação (</a:t>
+            </a:r>
+            <a:r>
+              <a:rPr lang="pt-BR" sz="1200" dirty="0" err="1" smtClean="0"/>
+              <a:t>dummy</a:t>
+            </a:r>
+            <a:r>
+              <a:rPr lang="pt-BR" sz="1200" dirty="0" smtClean="0"/>
+              <a:t> </a:t>
+            </a:r>
+            <a:r>
+              <a:rPr lang="pt-BR" sz="1200" dirty="0" err="1" smtClean="0"/>
+              <a:t>coluns</a:t>
+            </a:r>
+            <a:r>
+              <a:rPr lang="pt-BR" sz="1200" dirty="0" smtClean="0"/>
+              <a:t>)</a:t>
+            </a:r>
+          </a:p>
+          <a:p>
+            <a:r>
+              <a:rPr lang="pt-BR" sz="1200" dirty="0" smtClean="0"/>
+              <a:t>'</a:t>
+            </a:r>
+            <a:r>
+              <a:rPr lang="pt-BR" sz="1200" dirty="0" err="1" smtClean="0"/>
+              <a:t>Education_PhD</a:t>
+            </a:r>
+            <a:r>
+              <a:rPr lang="pt-BR" sz="1200" dirty="0" smtClean="0"/>
+              <a:t>'</a:t>
+            </a:r>
+          </a:p>
+          <a:p>
+            <a:r>
+              <a:rPr lang="pt-BR" sz="1200" dirty="0" smtClean="0"/>
+              <a:t> </a:t>
+            </a:r>
+            <a:r>
+              <a:rPr lang="pt-BR" sz="1200" dirty="0"/>
+              <a:t>'</a:t>
+            </a:r>
+            <a:r>
+              <a:rPr lang="pt-BR" sz="1200" dirty="0" err="1"/>
+              <a:t>Marital_Status_Divorced</a:t>
+            </a:r>
+            <a:r>
+              <a:rPr lang="pt-BR" sz="1200" dirty="0" smtClean="0"/>
+              <a:t>',</a:t>
+            </a:r>
+          </a:p>
+          <a:p>
+            <a:r>
+              <a:rPr lang="pt-BR" sz="1200" dirty="0" smtClean="0"/>
+              <a:t>'</a:t>
+            </a:r>
+            <a:r>
+              <a:rPr lang="pt-BR" sz="1200" dirty="0" err="1" smtClean="0"/>
+              <a:t>Marital_Status_Married</a:t>
+            </a:r>
+            <a:r>
+              <a:rPr lang="pt-BR" sz="1200" dirty="0" smtClean="0"/>
+              <a:t>‘         Estado civil (</a:t>
+            </a:r>
+            <a:r>
+              <a:rPr lang="pt-BR" sz="1200" dirty="0" err="1" smtClean="0"/>
+              <a:t>dummy</a:t>
+            </a:r>
+            <a:r>
+              <a:rPr lang="pt-BR" sz="1200" dirty="0" smtClean="0"/>
+              <a:t> </a:t>
+            </a:r>
+            <a:r>
+              <a:rPr lang="pt-BR" sz="1200" dirty="0" err="1" smtClean="0"/>
+              <a:t>columns</a:t>
+            </a:r>
+            <a:r>
+              <a:rPr lang="pt-BR" sz="1200" dirty="0" smtClean="0"/>
+              <a:t>)</a:t>
+            </a:r>
+          </a:p>
+          <a:p>
+            <a:r>
+              <a:rPr lang="pt-BR" sz="1200" dirty="0" smtClean="0"/>
+              <a:t>'</a:t>
+            </a:r>
+            <a:r>
+              <a:rPr lang="pt-BR" sz="1200" dirty="0" err="1" smtClean="0"/>
+              <a:t>Marital_Status_Single</a:t>
+            </a:r>
+            <a:r>
+              <a:rPr lang="pt-BR" sz="1200" dirty="0" smtClean="0"/>
+              <a:t>'</a:t>
+            </a:r>
+          </a:p>
+          <a:p>
+            <a:r>
+              <a:rPr lang="pt-BR" sz="1200" dirty="0" smtClean="0"/>
+              <a:t>'</a:t>
+            </a:r>
+            <a:r>
+              <a:rPr lang="pt-BR" sz="1200" dirty="0" err="1" smtClean="0"/>
+              <a:t>AcceptedTotalFirstFiveCmps</a:t>
+            </a:r>
+            <a:r>
+              <a:rPr lang="pt-BR" sz="1200" dirty="0" smtClean="0"/>
+              <a:t>‘ – Quantas campanhas o cliente respondeu</a:t>
+            </a:r>
+            <a:endParaRPr lang="pt-BR" sz="1200" dirty="0"/>
+          </a:p>
+        </p:txBody>
+      </p:sp>
+      <p:sp>
+        <p:nvSpPr>
+          <p:cNvPr id="3" name="Chave direita 2"/>
+          <p:cNvSpPr/>
+          <p:nvPr/>
+        </p:nvSpPr>
+        <p:spPr>
+          <a:xfrm>
+            <a:off x="1910443" y="3633106"/>
+            <a:ext cx="81643" cy="473527"/>
+          </a:xfrm>
+          <a:prstGeom prst="rightBrace">
+            <a:avLst/>
+          </a:prstGeom>
+          <a:ln>
+            <a:solidFill>
+              <a:schemeClr val="tx1"/>
+            </a:solidFill>
+          </a:ln>
+        </p:spPr>
+        <p:style>
+          <a:lnRef idx="1">
+            <a:schemeClr val="accent1"/>
+          </a:lnRef>
+          <a:fillRef idx="0">
+            <a:schemeClr val="accent1"/>
+          </a:fillRef>
+          <a:effectRef idx="0">
+            <a:schemeClr val="accent1"/>
+          </a:effectRef>
+          <a:fontRef idx="minor">
+            <a:schemeClr val="tx1"/>
+          </a:fontRef>
+        </p:style>
+        <p:txBody>
+          <a:bodyPr rtlCol="0" anchor="ctr"/>
+          <a:lstStyle/>
+          <a:p>
+            <a:pPr algn="ctr"/>
+            <a:endParaRPr lang="pt-BR"/>
+          </a:p>
+        </p:txBody>
+      </p:sp>
+      <p:sp>
+        <p:nvSpPr>
+          <p:cNvPr id="8" name="Chave direita 7"/>
+          <p:cNvSpPr/>
+          <p:nvPr/>
+        </p:nvSpPr>
+        <p:spPr>
+          <a:xfrm>
+            <a:off x="1532164" y="3037114"/>
+            <a:ext cx="108857" cy="481693"/>
+          </a:xfrm>
+          <a:prstGeom prst="rightBrace">
+            <a:avLst/>
+          </a:prstGeom>
+          <a:ln>
+            <a:solidFill>
+              <a:schemeClr val="tx1"/>
+            </a:solidFill>
+          </a:ln>
+        </p:spPr>
+        <p:style>
+          <a:lnRef idx="1">
+            <a:schemeClr val="accent1"/>
+          </a:lnRef>
+          <a:fillRef idx="0">
+            <a:schemeClr val="accent1"/>
+          </a:fillRef>
+          <a:effectRef idx="0">
+            <a:schemeClr val="accent1"/>
+          </a:effectRef>
+          <a:fontRef idx="minor">
+            <a:schemeClr val="tx1"/>
+          </a:fontRef>
+        </p:style>
+        <p:txBody>
+          <a:bodyPr rtlCol="0" anchor="ctr"/>
+          <a:lstStyle/>
+          <a:p>
+            <a:pPr algn="ctr"/>
+            <a:endParaRPr lang="pt-BR"/>
+          </a:p>
+        </p:txBody>
+      </p:sp>
+    </p:spTree>
+    <p:extLst>
+      <p:ext uri="{BB962C8B-B14F-4D97-AF65-F5344CB8AC3E}">
+        <p14:creationId xmlns:p14="http://schemas.microsoft.com/office/powerpoint/2010/main" val="909793158"/>
+      </p:ext>
+    </p:extLst>
+  </p:cSld>
+  <p:clrMapOvr>
+    <a:masterClrMapping/>
+  </p:clrMapOvr>
+</p:sld>
+</file>
+
+<file path=ppt/slides/slide25.xml><?xml version="1.0" encoding="utf-8"?>
+<p:sld xmlns:a="http://schemas.openxmlformats.org/drawingml/2006/main" xmlns:r="http://schemas.openxmlformats.org/officeDocument/2006/relationships" xmlns:p="http://schemas.openxmlformats.org/presentationml/2006/main">
+  <p:cSld>
+    <p:spTree>
+      <p:nvGrpSpPr>
+        <p:cNvPr id="1" name=""/>
+        <p:cNvGrpSpPr/>
+        <p:nvPr/>
+      </p:nvGrpSpPr>
+      <p:grpSpPr>
+        <a:xfrm>
+          <a:off x="0" y="0"/>
+          <a:ext cx="0" cy="0"/>
+          <a:chOff x="0" y="0"/>
+          <a:chExt cx="0" cy="0"/>
+        </a:xfrm>
+      </p:grpSpPr>
+      <p:pic>
+        <p:nvPicPr>
+          <p:cNvPr id="12" name="Imagem 11">
+            <a:extLst>
+              <a:ext uri="{FF2B5EF4-FFF2-40B4-BE49-F238E27FC236}">
+                <a16:creationId xmlns:a16="http://schemas.microsoft.com/office/drawing/2014/main" xmlns="" id="{45012191-CAAF-479E-8188-4611AAB46D34}"/>
+              </a:ext>
+            </a:extLst>
+          </p:cNvPr>
+          <p:cNvPicPr>
+            <a:picLocks noChangeAspect="1"/>
+          </p:cNvPicPr>
+          <p:nvPr/>
+        </p:nvPicPr>
+        <p:blipFill>
+          <a:blip r:embed="rId2">
+            <a:lum bright="70000" contrast="-70000"/>
+          </a:blip>
+          <a:stretch>
+            <a:fillRect/>
+          </a:stretch>
+        </p:blipFill>
+        <p:spPr>
+          <a:xfrm>
+            <a:off x="10972543" y="5992769"/>
+            <a:ext cx="1075295" cy="731201"/>
+          </a:xfrm>
+          <a:prstGeom prst="rect">
+            <a:avLst/>
+          </a:prstGeom>
+        </p:spPr>
+      </p:pic>
+      <p:sp>
+        <p:nvSpPr>
+          <p:cNvPr id="9" name="CaixaDeTexto 8">
+            <a:extLst>
+              <a:ext uri="{FF2B5EF4-FFF2-40B4-BE49-F238E27FC236}">
+                <a16:creationId xmlns:a16="http://schemas.microsoft.com/office/drawing/2014/main" xmlns="" id="{FB1A0CF8-D220-44EE-A5AC-E5B5791D84CF}"/>
+              </a:ext>
+            </a:extLst>
+          </p:cNvPr>
+          <p:cNvSpPr txBox="1"/>
+          <p:nvPr/>
+        </p:nvSpPr>
+        <p:spPr>
+          <a:xfrm>
+            <a:off x="129872" y="194884"/>
+            <a:ext cx="8612660" cy="369332"/>
+          </a:xfrm>
+          <a:prstGeom prst="rect">
+            <a:avLst/>
+          </a:prstGeom>
+          <a:noFill/>
+        </p:spPr>
+        <p:txBody>
+          <a:bodyPr wrap="square" rtlCol="0">
+            <a:spAutoFit/>
+          </a:bodyPr>
+          <a:lstStyle/>
+          <a:p>
+            <a:r>
+              <a:rPr lang="pt-BR" dirty="0" smtClean="0">
+                <a:solidFill>
+                  <a:srgbClr val="FF0000"/>
+                </a:solidFill>
+              </a:rPr>
+              <a:t>Modelo de classificação - resultados</a:t>
+            </a:r>
+            <a:endParaRPr lang="pt-BR" dirty="0">
+              <a:solidFill>
+                <a:srgbClr val="FF0000"/>
+              </a:solidFill>
+            </a:endParaRPr>
+          </a:p>
+        </p:txBody>
+      </p:sp>
+      <p:sp>
+        <p:nvSpPr>
+          <p:cNvPr id="5" name="CaixaDeTexto 4"/>
+          <p:cNvSpPr txBox="1"/>
+          <p:nvPr/>
+        </p:nvSpPr>
+        <p:spPr>
+          <a:xfrm>
+            <a:off x="4732698" y="2895595"/>
+            <a:ext cx="1365758" cy="369332"/>
+          </a:xfrm>
+          <a:prstGeom prst="rect">
+            <a:avLst/>
+          </a:prstGeom>
+          <a:noFill/>
+        </p:spPr>
+        <p:txBody>
+          <a:bodyPr wrap="none" rtlCol="0">
+            <a:spAutoFit/>
+          </a:bodyPr>
+          <a:lstStyle/>
+          <a:p>
+            <a:r>
+              <a:rPr lang="pt-BR" dirty="0" smtClean="0"/>
+              <a:t>Métrica AUC</a:t>
+            </a:r>
+            <a:endParaRPr lang="pt-BR" dirty="0"/>
+          </a:p>
+        </p:txBody>
+      </p:sp>
+      <p:sp>
+        <p:nvSpPr>
+          <p:cNvPr id="10" name="CaixaDeTexto 9"/>
+          <p:cNvSpPr txBox="1"/>
+          <p:nvPr/>
+        </p:nvSpPr>
+        <p:spPr>
+          <a:xfrm>
+            <a:off x="129871" y="750531"/>
+            <a:ext cx="10312249" cy="1815882"/>
+          </a:xfrm>
+          <a:prstGeom prst="rect">
+            <a:avLst/>
+          </a:prstGeom>
+          <a:noFill/>
+        </p:spPr>
+        <p:txBody>
+          <a:bodyPr wrap="square" rtlCol="0">
+            <a:spAutoFit/>
+          </a:bodyPr>
+          <a:lstStyle/>
+          <a:p>
+            <a:r>
+              <a:rPr lang="pt-BR" sz="1400" dirty="0" smtClean="0"/>
+              <a:t>O modelo atribuiu para cada cliente a probabilidade (entre 0 a 1) de ele comprar o </a:t>
+            </a:r>
+            <a:r>
+              <a:rPr lang="pt-BR" sz="1400" dirty="0" err="1" smtClean="0"/>
+              <a:t>gadget</a:t>
+            </a:r>
+            <a:r>
+              <a:rPr lang="pt-BR" sz="1400" dirty="0" smtClean="0"/>
+              <a:t>.</a:t>
+            </a:r>
+          </a:p>
+          <a:p>
+            <a:endParaRPr lang="pt-BR" sz="1400" dirty="0"/>
+          </a:p>
+          <a:p>
+            <a:r>
+              <a:rPr lang="pt-BR" sz="1400" dirty="0" smtClean="0"/>
+              <a:t>Quando a probabilidade do cliente comprar é maior que 0,5 (50%), o modelo traz </a:t>
+            </a:r>
+            <a:r>
+              <a:rPr lang="pt-BR" sz="1400" dirty="0" err="1" smtClean="0"/>
+              <a:t>True</a:t>
+            </a:r>
+            <a:r>
+              <a:rPr lang="pt-BR" sz="1400" dirty="0" smtClean="0"/>
+              <a:t>. Se menor, o modelo traz False.</a:t>
+            </a:r>
+          </a:p>
+          <a:p>
+            <a:endParaRPr lang="pt-BR" sz="1400" dirty="0" smtClean="0"/>
+          </a:p>
+          <a:p>
+            <a:r>
+              <a:rPr lang="pt-BR" sz="1400" dirty="0" smtClean="0"/>
+              <a:t>Durante o treinamento e teste do modelo, para os casos em que o modelo trouxe que o cliente compraria, 67% (</a:t>
+            </a:r>
+            <a:r>
+              <a:rPr lang="pt-BR" sz="1400" i="1" dirty="0" err="1" smtClean="0"/>
+              <a:t>precision</a:t>
+            </a:r>
+            <a:r>
+              <a:rPr lang="pt-BR" sz="1400" dirty="0" smtClean="0"/>
+              <a:t>) de fato comprou (com base no piloto).</a:t>
+            </a:r>
+          </a:p>
+          <a:p>
+            <a:endParaRPr lang="pt-BR" sz="1400" dirty="0"/>
+          </a:p>
+          <a:p>
+            <a:r>
+              <a:rPr lang="pt-BR" sz="1400" dirty="0" smtClean="0"/>
+              <a:t>Já do total de clientes que respondeu no piloto que compraria, o modelo só conseguiu identificar 23% deles (</a:t>
+            </a:r>
+            <a:r>
+              <a:rPr lang="pt-BR" sz="1400" i="1" dirty="0" smtClean="0"/>
+              <a:t>recall</a:t>
+            </a:r>
+            <a:r>
+              <a:rPr lang="pt-BR" sz="1400" dirty="0" smtClean="0"/>
+              <a:t>).</a:t>
+            </a:r>
+            <a:endParaRPr lang="pt-BR" sz="1400" dirty="0"/>
+          </a:p>
+        </p:txBody>
+      </p:sp>
+      <p:sp>
+        <p:nvSpPr>
+          <p:cNvPr id="11" name="CaixaDeTexto 10"/>
+          <p:cNvSpPr txBox="1"/>
+          <p:nvPr/>
+        </p:nvSpPr>
+        <p:spPr>
+          <a:xfrm>
+            <a:off x="129871" y="5852034"/>
+            <a:ext cx="12062129" cy="738664"/>
+          </a:xfrm>
+          <a:prstGeom prst="rect">
+            <a:avLst/>
+          </a:prstGeom>
+          <a:noFill/>
+        </p:spPr>
+        <p:txBody>
+          <a:bodyPr wrap="square" rtlCol="0">
+            <a:spAutoFit/>
+          </a:bodyPr>
+          <a:lstStyle/>
+          <a:p>
+            <a:r>
+              <a:rPr lang="pt-BR" sz="1400" dirty="0" smtClean="0"/>
+              <a:t>Achamos os resultados do modelo suficientes para obtermos um melhor desempenho na sexta campanha.</a:t>
+            </a:r>
+          </a:p>
+          <a:p>
+            <a:r>
+              <a:rPr lang="pt-BR" sz="1400" dirty="0" smtClean="0"/>
+              <a:t>Em nosso caso, é melhor uma precisão alta e um recall baixo do que o contrário. Isso porque a campanha gera um custo de $3 por cliente. É mais interessante tentarmos ser mais assertivos (precisão) do que tentar encontrar todos os clientes que aceitariam comprar.</a:t>
+            </a:r>
+            <a:endParaRPr lang="pt-BR" sz="1600" dirty="0"/>
+          </a:p>
+        </p:txBody>
+      </p:sp>
+      <p:pic>
+        <p:nvPicPr>
+          <p:cNvPr id="14" name="Imagem 13"/>
+          <p:cNvPicPr>
+            <a:picLocks noChangeAspect="1"/>
+          </p:cNvPicPr>
+          <p:nvPr/>
+        </p:nvPicPr>
+        <p:blipFill>
+          <a:blip r:embed="rId3"/>
+          <a:stretch>
+            <a:fillRect/>
+          </a:stretch>
+        </p:blipFill>
+        <p:spPr>
+          <a:xfrm>
+            <a:off x="3596302" y="3216464"/>
+            <a:ext cx="3638550" cy="2324100"/>
+          </a:xfrm>
+          <a:prstGeom prst="rect">
+            <a:avLst/>
+          </a:prstGeom>
+        </p:spPr>
+      </p:pic>
+      <p:pic>
+        <p:nvPicPr>
+          <p:cNvPr id="15" name="Imagem 14"/>
+          <p:cNvPicPr>
+            <a:picLocks noChangeAspect="1"/>
+          </p:cNvPicPr>
+          <p:nvPr/>
+        </p:nvPicPr>
+        <p:blipFill>
+          <a:blip r:embed="rId4"/>
+          <a:stretch>
+            <a:fillRect/>
+          </a:stretch>
+        </p:blipFill>
+        <p:spPr>
+          <a:xfrm>
+            <a:off x="7113948" y="2959289"/>
+            <a:ext cx="1257300" cy="514350"/>
+          </a:xfrm>
+          <a:prstGeom prst="rect">
+            <a:avLst/>
+          </a:prstGeom>
+        </p:spPr>
+      </p:pic>
+    </p:spTree>
+    <p:extLst>
+      <p:ext uri="{BB962C8B-B14F-4D97-AF65-F5344CB8AC3E}">
+        <p14:creationId xmlns:p14="http://schemas.microsoft.com/office/powerpoint/2010/main" val="941280494"/>
+      </p:ext>
+    </p:extLst>
+  </p:cSld>
+  <p:clrMapOvr>
+    <a:masterClrMapping/>
+  </p:clrMapOvr>
+</p:sld>
+</file>
+
+<file path=ppt/slides/slide26.xml><?xml version="1.0" encoding="utf-8"?>
+<p:sld xmlns:a="http://schemas.openxmlformats.org/drawingml/2006/main" xmlns:r="http://schemas.openxmlformats.org/officeDocument/2006/relationships" xmlns:p="http://schemas.openxmlformats.org/presentationml/2006/main">
+  <p:cSld>
+    <p:spTree>
+      <p:nvGrpSpPr>
+        <p:cNvPr id="1" name=""/>
+        <p:cNvGrpSpPr/>
+        <p:nvPr/>
+      </p:nvGrpSpPr>
+      <p:grpSpPr>
+        <a:xfrm>
+          <a:off x="0" y="0"/>
+          <a:ext cx="0" cy="0"/>
+          <a:chOff x="0" y="0"/>
+          <a:chExt cx="0" cy="0"/>
+        </a:xfrm>
+      </p:grpSpPr>
+      <p:pic>
+        <p:nvPicPr>
+          <p:cNvPr id="12" name="Imagem 11">
+            <a:extLst>
+              <a:ext uri="{FF2B5EF4-FFF2-40B4-BE49-F238E27FC236}">
+                <a16:creationId xmlns:a16="http://schemas.microsoft.com/office/drawing/2014/main" xmlns="" id="{45012191-CAAF-479E-8188-4611AAB46D34}"/>
+              </a:ext>
+            </a:extLst>
+          </p:cNvPr>
+          <p:cNvPicPr>
+            <a:picLocks noChangeAspect="1"/>
+          </p:cNvPicPr>
+          <p:nvPr/>
+        </p:nvPicPr>
+        <p:blipFill>
+          <a:blip r:embed="rId2">
+            <a:lum bright="70000" contrast="-70000"/>
+          </a:blip>
+          <a:stretch>
+            <a:fillRect/>
+          </a:stretch>
+        </p:blipFill>
+        <p:spPr>
+          <a:xfrm>
+            <a:off x="10972543" y="5992769"/>
+            <a:ext cx="1075295" cy="731201"/>
+          </a:xfrm>
+          <a:prstGeom prst="rect">
+            <a:avLst/>
+          </a:prstGeom>
+        </p:spPr>
+      </p:pic>
+      <p:sp>
+        <p:nvSpPr>
+          <p:cNvPr id="7" name="CaixaDeTexto 6">
+            <a:extLst>
+              <a:ext uri="{FF2B5EF4-FFF2-40B4-BE49-F238E27FC236}">
+                <a16:creationId xmlns:a16="http://schemas.microsoft.com/office/drawing/2014/main" xmlns="" id="{D67E3CE1-1B05-4008-B992-B5BCAE7B17D0}"/>
+              </a:ext>
+            </a:extLst>
+          </p:cNvPr>
+          <p:cNvSpPr txBox="1"/>
+          <p:nvPr/>
+        </p:nvSpPr>
+        <p:spPr>
+          <a:xfrm>
+            <a:off x="129872" y="774465"/>
+            <a:ext cx="11213391" cy="1323439"/>
+          </a:xfrm>
+          <a:prstGeom prst="rect">
+            <a:avLst/>
+          </a:prstGeom>
+          <a:noFill/>
+        </p:spPr>
+        <p:txBody>
+          <a:bodyPr wrap="square" rtlCol="0">
+            <a:spAutoFit/>
+          </a:bodyPr>
+          <a:lstStyle/>
+          <a:p>
+            <a:r>
+              <a:rPr lang="pt-BR" sz="1600" dirty="0" smtClean="0"/>
+              <a:t>Quando aplicamos o modelo em toda a base, tivemos uma taxa de sucesso de 70% (no piloto era 15</a:t>
+            </a:r>
+            <a:r>
+              <a:rPr lang="pt-BR" sz="1600" dirty="0"/>
+              <a:t>%). Em termos de resultados financeiros, teríamos uma receita de </a:t>
+            </a:r>
+            <a:r>
+              <a:rPr lang="pt-BR" sz="1600" dirty="0" smtClean="0"/>
+              <a:t>$1012 e </a:t>
+            </a:r>
+            <a:r>
+              <a:rPr lang="pt-BR" sz="1600" dirty="0"/>
+              <a:t>um custo de </a:t>
+            </a:r>
+            <a:r>
+              <a:rPr lang="pt-BR" sz="1600" dirty="0" smtClean="0"/>
+              <a:t>$396 </a:t>
+            </a:r>
+            <a:r>
+              <a:rPr lang="pt-BR" sz="1600" b="1" dirty="0" smtClean="0"/>
+              <a:t>(lucro </a:t>
+            </a:r>
+            <a:r>
+              <a:rPr lang="pt-BR" sz="1600" b="1" dirty="0"/>
+              <a:t>de </a:t>
+            </a:r>
+            <a:r>
+              <a:rPr lang="pt-BR" sz="1600" b="1" dirty="0" smtClean="0"/>
+              <a:t>$616)</a:t>
+            </a:r>
+            <a:r>
+              <a:rPr lang="pt-BR" sz="1600" dirty="0" smtClean="0"/>
+              <a:t>.</a:t>
+            </a:r>
+          </a:p>
+          <a:p>
+            <a:endParaRPr lang="pt-BR" sz="1600" dirty="0"/>
+          </a:p>
+          <a:p>
+            <a:endParaRPr lang="pt-BR" sz="1600" dirty="0" smtClean="0"/>
+          </a:p>
+          <a:p>
+            <a:r>
+              <a:rPr lang="pt-BR" sz="1600" dirty="0" smtClean="0"/>
+              <a:t>Porém, a quantidade de clientes caiu bastante (~65%).</a:t>
+            </a:r>
+            <a:endParaRPr lang="pt-BR" sz="1600" dirty="0"/>
+          </a:p>
+        </p:txBody>
+      </p:sp>
+      <p:sp>
+        <p:nvSpPr>
+          <p:cNvPr id="9" name="CaixaDeTexto 8">
+            <a:extLst>
+              <a:ext uri="{FF2B5EF4-FFF2-40B4-BE49-F238E27FC236}">
+                <a16:creationId xmlns:a16="http://schemas.microsoft.com/office/drawing/2014/main" xmlns="" id="{FB1A0CF8-D220-44EE-A5AC-E5B5791D84CF}"/>
+              </a:ext>
+            </a:extLst>
+          </p:cNvPr>
+          <p:cNvSpPr txBox="1"/>
+          <p:nvPr/>
+        </p:nvSpPr>
+        <p:spPr>
+          <a:xfrm>
+            <a:off x="129872" y="194884"/>
+            <a:ext cx="8612660" cy="369332"/>
+          </a:xfrm>
+          <a:prstGeom prst="rect">
+            <a:avLst/>
+          </a:prstGeom>
+          <a:noFill/>
+        </p:spPr>
+        <p:txBody>
+          <a:bodyPr wrap="square" rtlCol="0">
+            <a:spAutoFit/>
+          </a:bodyPr>
+          <a:lstStyle/>
+          <a:p>
+            <a:r>
+              <a:rPr lang="pt-BR" dirty="0" smtClean="0">
+                <a:solidFill>
+                  <a:srgbClr val="FF0000"/>
+                </a:solidFill>
+              </a:rPr>
+              <a:t>Aplicação </a:t>
+            </a:r>
+            <a:r>
+              <a:rPr lang="pt-BR" dirty="0" smtClean="0">
+                <a:solidFill>
+                  <a:srgbClr val="FF0000"/>
+                </a:solidFill>
+              </a:rPr>
+              <a:t>do m</a:t>
+            </a:r>
+            <a:r>
+              <a:rPr lang="pt-BR" dirty="0" smtClean="0">
+                <a:solidFill>
+                  <a:srgbClr val="FF0000"/>
+                </a:solidFill>
+              </a:rPr>
+              <a:t>odelo de classificação</a:t>
+            </a:r>
+            <a:endParaRPr lang="pt-BR" dirty="0">
+              <a:solidFill>
+                <a:srgbClr val="FF0000"/>
+              </a:solidFill>
+            </a:endParaRPr>
+          </a:p>
+        </p:txBody>
+      </p:sp>
+      <p:sp>
+        <p:nvSpPr>
+          <p:cNvPr id="13" name="CaixaDeTexto 12"/>
+          <p:cNvSpPr txBox="1"/>
+          <p:nvPr/>
+        </p:nvSpPr>
+        <p:spPr>
+          <a:xfrm>
+            <a:off x="5797837" y="3319167"/>
+            <a:ext cx="6007719" cy="1754326"/>
+          </a:xfrm>
+          <a:prstGeom prst="rect">
+            <a:avLst/>
+          </a:prstGeom>
+          <a:noFill/>
+        </p:spPr>
+        <p:txBody>
+          <a:bodyPr wrap="square" rtlCol="0">
+            <a:spAutoFit/>
+          </a:bodyPr>
+          <a:lstStyle/>
+          <a:p>
+            <a:r>
+              <a:rPr lang="pt-BR" dirty="0" smtClean="0"/>
+              <a:t>E se assumirmos que o cliente vai comprar não apenas quando a probabilidade disso acontecer for maior que 0,5 (50%), mas quando a probabilidade for maior que 0,3 (30%)?</a:t>
+            </a:r>
+          </a:p>
+          <a:p>
+            <a:endParaRPr lang="pt-BR" dirty="0"/>
+          </a:p>
+          <a:p>
+            <a:r>
+              <a:rPr lang="pt-BR" dirty="0" smtClean="0"/>
+              <a:t>Erraríamos mais, ou seja, a taxa de sucesso cairia, porém, alcançaríamos mais clientes.</a:t>
+            </a:r>
+            <a:endParaRPr lang="pt-BR" dirty="0"/>
+          </a:p>
+        </p:txBody>
+      </p:sp>
+      <p:pic>
+        <p:nvPicPr>
+          <p:cNvPr id="14" name="Imagem 13"/>
+          <p:cNvPicPr>
+            <a:picLocks noChangeAspect="1"/>
+          </p:cNvPicPr>
+          <p:nvPr/>
+        </p:nvPicPr>
+        <p:blipFill>
+          <a:blip r:embed="rId3"/>
+          <a:stretch>
+            <a:fillRect/>
+          </a:stretch>
+        </p:blipFill>
+        <p:spPr>
+          <a:xfrm>
+            <a:off x="295955" y="2445204"/>
+            <a:ext cx="3648075" cy="3028950"/>
+          </a:xfrm>
+          <a:prstGeom prst="rect">
+            <a:avLst/>
+          </a:prstGeom>
+        </p:spPr>
+      </p:pic>
+    </p:spTree>
+    <p:extLst>
+      <p:ext uri="{BB962C8B-B14F-4D97-AF65-F5344CB8AC3E}">
+        <p14:creationId xmlns:p14="http://schemas.microsoft.com/office/powerpoint/2010/main" val="3899718760"/>
+      </p:ext>
+    </p:extLst>
+  </p:cSld>
+  <p:clrMapOvr>
+    <a:masterClrMapping/>
+  </p:clrMapOvr>
+</p:sld>
+</file>
+
+<file path=ppt/slides/slide27.xml><?xml version="1.0" encoding="utf-8"?>
+<p:sld xmlns:a="http://schemas.openxmlformats.org/drawingml/2006/main" xmlns:r="http://schemas.openxmlformats.org/officeDocument/2006/relationships" xmlns:p="http://schemas.openxmlformats.org/presentationml/2006/main">
+  <p:cSld>
+    <p:spTree>
+      <p:nvGrpSpPr>
+        <p:cNvPr id="1" name=""/>
+        <p:cNvGrpSpPr/>
+        <p:nvPr/>
+      </p:nvGrpSpPr>
+      <p:grpSpPr>
+        <a:xfrm>
+          <a:off x="0" y="0"/>
+          <a:ext cx="0" cy="0"/>
+          <a:chOff x="0" y="0"/>
+          <a:chExt cx="0" cy="0"/>
+        </a:xfrm>
+      </p:grpSpPr>
+      <p:pic>
+        <p:nvPicPr>
+          <p:cNvPr id="12" name="Imagem 11">
+            <a:extLst>
+              <a:ext uri="{FF2B5EF4-FFF2-40B4-BE49-F238E27FC236}">
+                <a16:creationId xmlns:a16="http://schemas.microsoft.com/office/drawing/2014/main" xmlns="" id="{45012191-CAAF-479E-8188-4611AAB46D34}"/>
+              </a:ext>
+            </a:extLst>
+          </p:cNvPr>
+          <p:cNvPicPr>
+            <a:picLocks noChangeAspect="1"/>
+          </p:cNvPicPr>
+          <p:nvPr/>
+        </p:nvPicPr>
+        <p:blipFill>
+          <a:blip r:embed="rId2">
+            <a:lum bright="70000" contrast="-70000"/>
+          </a:blip>
+          <a:stretch>
+            <a:fillRect/>
+          </a:stretch>
+        </p:blipFill>
+        <p:spPr>
+          <a:xfrm>
+            <a:off x="10972543" y="5992769"/>
+            <a:ext cx="1075295" cy="731201"/>
+          </a:xfrm>
+          <a:prstGeom prst="rect">
+            <a:avLst/>
+          </a:prstGeom>
+        </p:spPr>
+      </p:pic>
+      <p:sp>
+        <p:nvSpPr>
+          <p:cNvPr id="7" name="CaixaDeTexto 6">
+            <a:extLst>
+              <a:ext uri="{FF2B5EF4-FFF2-40B4-BE49-F238E27FC236}">
+                <a16:creationId xmlns:a16="http://schemas.microsoft.com/office/drawing/2014/main" xmlns="" id="{D67E3CE1-1B05-4008-B992-B5BCAE7B17D0}"/>
+              </a:ext>
+            </a:extLst>
+          </p:cNvPr>
+          <p:cNvSpPr txBox="1"/>
+          <p:nvPr/>
+        </p:nvSpPr>
+        <p:spPr>
+          <a:xfrm>
+            <a:off x="129872" y="774465"/>
+            <a:ext cx="11213391" cy="830997"/>
+          </a:xfrm>
+          <a:prstGeom prst="rect">
+            <a:avLst/>
+          </a:prstGeom>
+          <a:noFill/>
+        </p:spPr>
+        <p:txBody>
+          <a:bodyPr wrap="square" rtlCol="0">
+            <a:spAutoFit/>
+          </a:bodyPr>
+          <a:lstStyle/>
+          <a:p>
+            <a:r>
+              <a:rPr lang="pt-BR" sz="1600" dirty="0" smtClean="0"/>
+              <a:t>Fizemos um teste </a:t>
+            </a:r>
+            <a:r>
+              <a:rPr lang="pt-BR" sz="1600" dirty="0"/>
+              <a:t>assumindo </a:t>
+            </a:r>
+            <a:r>
+              <a:rPr lang="pt-BR" sz="1600" dirty="0" smtClean="0"/>
+              <a:t>que o cliente iria comprar </a:t>
+            </a:r>
+            <a:r>
+              <a:rPr lang="pt-BR" sz="1600" dirty="0"/>
+              <a:t>não apenas quando a probabilidade disso acontecer for maior que 0,5 (50%), mas quando a probabilidade for maior que 0,3 (30</a:t>
+            </a:r>
+            <a:r>
+              <a:rPr lang="pt-BR" sz="1600" dirty="0" smtClean="0"/>
+              <a:t>%):</a:t>
+            </a:r>
+            <a:endParaRPr lang="pt-BR" sz="1600" dirty="0"/>
+          </a:p>
+          <a:p>
+            <a:endParaRPr lang="pt-BR" sz="1600" dirty="0"/>
+          </a:p>
+        </p:txBody>
+      </p:sp>
+      <p:sp>
+        <p:nvSpPr>
+          <p:cNvPr id="9" name="CaixaDeTexto 8">
+            <a:extLst>
+              <a:ext uri="{FF2B5EF4-FFF2-40B4-BE49-F238E27FC236}">
+                <a16:creationId xmlns:a16="http://schemas.microsoft.com/office/drawing/2014/main" xmlns="" id="{FB1A0CF8-D220-44EE-A5AC-E5B5791D84CF}"/>
+              </a:ext>
+            </a:extLst>
+          </p:cNvPr>
+          <p:cNvSpPr txBox="1"/>
+          <p:nvPr/>
+        </p:nvSpPr>
+        <p:spPr>
+          <a:xfrm>
+            <a:off x="129872" y="194884"/>
+            <a:ext cx="8612660" cy="369332"/>
+          </a:xfrm>
+          <a:prstGeom prst="rect">
+            <a:avLst/>
+          </a:prstGeom>
+          <a:noFill/>
+        </p:spPr>
+        <p:txBody>
+          <a:bodyPr wrap="square" rtlCol="0">
+            <a:spAutoFit/>
+          </a:bodyPr>
+          <a:lstStyle/>
+          <a:p>
+            <a:r>
+              <a:rPr lang="pt-BR" dirty="0" smtClean="0">
+                <a:solidFill>
+                  <a:srgbClr val="FF0000"/>
+                </a:solidFill>
+              </a:rPr>
+              <a:t>Otimização do lucro</a:t>
+            </a:r>
+            <a:endParaRPr lang="pt-BR" dirty="0">
+              <a:solidFill>
+                <a:srgbClr val="FF0000"/>
+              </a:solidFill>
+            </a:endParaRPr>
+          </a:p>
+        </p:txBody>
+      </p:sp>
+      <p:sp>
+        <p:nvSpPr>
+          <p:cNvPr id="13" name="CaixaDeTexto 12"/>
+          <p:cNvSpPr txBox="1"/>
+          <p:nvPr/>
+        </p:nvSpPr>
+        <p:spPr>
+          <a:xfrm>
+            <a:off x="4964824" y="2816608"/>
+            <a:ext cx="6007719" cy="2031325"/>
+          </a:xfrm>
+          <a:prstGeom prst="rect">
+            <a:avLst/>
+          </a:prstGeom>
+          <a:noFill/>
+        </p:spPr>
+        <p:txBody>
+          <a:bodyPr wrap="square" rtlCol="0">
+            <a:spAutoFit/>
+          </a:bodyPr>
+          <a:lstStyle/>
+          <a:p>
+            <a:r>
+              <a:rPr lang="pt-BR" dirty="0" smtClean="0"/>
+              <a:t>A quantidade de clientes que realmente comprariam (com base no piloto) aumentou, mas não na mesma proporção quantidade de envios da campanha. Com isso, a taxa de sucesso caiu para ~57%.</a:t>
+            </a:r>
+          </a:p>
+          <a:p>
+            <a:endParaRPr lang="pt-BR" dirty="0" smtClean="0"/>
+          </a:p>
+          <a:p>
+            <a:r>
+              <a:rPr lang="pt-BR" dirty="0" smtClean="0"/>
+              <a:t>Porém, em </a:t>
+            </a:r>
+            <a:r>
+              <a:rPr lang="pt-BR" dirty="0"/>
+              <a:t>termos de resultados financeiros, teríamos uma receita de </a:t>
+            </a:r>
+            <a:r>
+              <a:rPr lang="pt-BR" dirty="0" smtClean="0"/>
+              <a:t>$1892 </a:t>
+            </a:r>
+            <a:r>
+              <a:rPr lang="pt-BR" dirty="0"/>
+              <a:t>e um custo de </a:t>
+            </a:r>
+            <a:r>
+              <a:rPr lang="pt-BR" dirty="0" smtClean="0"/>
+              <a:t>$906 </a:t>
+            </a:r>
+            <a:r>
+              <a:rPr lang="pt-BR" b="1" dirty="0"/>
+              <a:t>(lucro de </a:t>
+            </a:r>
+            <a:r>
+              <a:rPr lang="pt-BR" b="1" dirty="0" smtClean="0"/>
+              <a:t>$986)</a:t>
+            </a:r>
+            <a:r>
+              <a:rPr lang="pt-BR" dirty="0" smtClean="0"/>
+              <a:t>.</a:t>
+            </a:r>
+            <a:endParaRPr lang="pt-BR" dirty="0"/>
+          </a:p>
+        </p:txBody>
+      </p:sp>
+      <p:pic>
+        <p:nvPicPr>
+          <p:cNvPr id="3" name="Imagem 2"/>
+          <p:cNvPicPr>
+            <a:picLocks noChangeAspect="1"/>
+          </p:cNvPicPr>
+          <p:nvPr/>
+        </p:nvPicPr>
+        <p:blipFill>
+          <a:blip r:embed="rId3"/>
+          <a:stretch>
+            <a:fillRect/>
+          </a:stretch>
+        </p:blipFill>
+        <p:spPr>
+          <a:xfrm>
+            <a:off x="603643" y="2344474"/>
+            <a:ext cx="3705225" cy="3028950"/>
+          </a:xfrm>
+          <a:prstGeom prst="rect">
+            <a:avLst/>
+          </a:prstGeom>
+        </p:spPr>
+      </p:pic>
+    </p:spTree>
+    <p:extLst>
+      <p:ext uri="{BB962C8B-B14F-4D97-AF65-F5344CB8AC3E}">
+        <p14:creationId xmlns:p14="http://schemas.microsoft.com/office/powerpoint/2010/main" val="2868991731"/>
+      </p:ext>
+    </p:extLst>
+  </p:cSld>
+  <p:clrMapOvr>
+    <a:masterClrMapping/>
+  </p:clrMapOvr>
+</p:sld>
+</file>
+
+<file path=ppt/slides/slide28.xml><?xml version="1.0" encoding="utf-8"?>
+<p:sld xmlns:a="http://schemas.openxmlformats.org/drawingml/2006/main" xmlns:r="http://schemas.openxmlformats.org/officeDocument/2006/relationships" xmlns:p="http://schemas.openxmlformats.org/presentationml/2006/main">
+  <p:cSld>
+    <p:spTree>
+      <p:nvGrpSpPr>
+        <p:cNvPr id="1" name=""/>
+        <p:cNvGrpSpPr/>
+        <p:nvPr/>
+      </p:nvGrpSpPr>
+      <p:grpSpPr>
+        <a:xfrm>
+          <a:off x="0" y="0"/>
+          <a:ext cx="0" cy="0"/>
+          <a:chOff x="0" y="0"/>
+          <a:chExt cx="0" cy="0"/>
+        </a:xfrm>
+      </p:grpSpPr>
+      <p:pic>
+        <p:nvPicPr>
+          <p:cNvPr id="12" name="Imagem 11">
+            <a:extLst>
+              <a:ext uri="{FF2B5EF4-FFF2-40B4-BE49-F238E27FC236}">
+                <a16:creationId xmlns:a16="http://schemas.microsoft.com/office/drawing/2014/main" xmlns="" id="{45012191-CAAF-479E-8188-4611AAB46D34}"/>
+              </a:ext>
+            </a:extLst>
+          </p:cNvPr>
+          <p:cNvPicPr>
+            <a:picLocks noChangeAspect="1"/>
+          </p:cNvPicPr>
+          <p:nvPr/>
+        </p:nvPicPr>
+        <p:blipFill>
+          <a:blip r:embed="rId2">
+            <a:lum bright="70000" contrast="-70000"/>
+          </a:blip>
+          <a:stretch>
+            <a:fillRect/>
+          </a:stretch>
+        </p:blipFill>
+        <p:spPr>
+          <a:xfrm>
+            <a:off x="10972543" y="5992769"/>
+            <a:ext cx="1075295" cy="731201"/>
+          </a:xfrm>
+          <a:prstGeom prst="rect">
+            <a:avLst/>
+          </a:prstGeom>
+        </p:spPr>
+      </p:pic>
+      <p:sp>
+        <p:nvSpPr>
+          <p:cNvPr id="9" name="CaixaDeTexto 8">
+            <a:extLst>
+              <a:ext uri="{FF2B5EF4-FFF2-40B4-BE49-F238E27FC236}">
+                <a16:creationId xmlns:a16="http://schemas.microsoft.com/office/drawing/2014/main" xmlns="" id="{FB1A0CF8-D220-44EE-A5AC-E5B5791D84CF}"/>
+              </a:ext>
+            </a:extLst>
+          </p:cNvPr>
+          <p:cNvSpPr txBox="1"/>
+          <p:nvPr/>
+        </p:nvSpPr>
+        <p:spPr>
+          <a:xfrm>
+            <a:off x="129872" y="194884"/>
+            <a:ext cx="8612660" cy="369332"/>
+          </a:xfrm>
+          <a:prstGeom prst="rect">
+            <a:avLst/>
+          </a:prstGeom>
+          <a:noFill/>
+        </p:spPr>
+        <p:txBody>
+          <a:bodyPr wrap="square" rtlCol="0">
+            <a:spAutoFit/>
+          </a:bodyPr>
+          <a:lstStyle/>
+          <a:p>
+            <a:r>
+              <a:rPr lang="pt-BR" dirty="0" smtClean="0">
+                <a:solidFill>
+                  <a:srgbClr val="FF0000"/>
+                </a:solidFill>
+              </a:rPr>
+              <a:t>Otimização do lucro</a:t>
+            </a:r>
+            <a:endParaRPr lang="pt-BR" dirty="0">
+              <a:solidFill>
+                <a:srgbClr val="FF0000"/>
+              </a:solidFill>
+            </a:endParaRPr>
+          </a:p>
+        </p:txBody>
+      </p:sp>
+      <p:sp>
+        <p:nvSpPr>
+          <p:cNvPr id="8" name="CaixaDeTexto 7">
+            <a:extLst>
+              <a:ext uri="{FF2B5EF4-FFF2-40B4-BE49-F238E27FC236}">
+                <a16:creationId xmlns:a16="http://schemas.microsoft.com/office/drawing/2014/main" xmlns="" id="{D67E3CE1-1B05-4008-B992-B5BCAE7B17D0}"/>
+              </a:ext>
+            </a:extLst>
+          </p:cNvPr>
+          <p:cNvSpPr txBox="1"/>
+          <p:nvPr/>
+        </p:nvSpPr>
+        <p:spPr>
+          <a:xfrm>
+            <a:off x="129872" y="763580"/>
+            <a:ext cx="11213391" cy="1077218"/>
+          </a:xfrm>
+          <a:prstGeom prst="rect">
+            <a:avLst/>
+          </a:prstGeom>
+          <a:noFill/>
+        </p:spPr>
+        <p:txBody>
+          <a:bodyPr wrap="square" rtlCol="0">
+            <a:spAutoFit/>
+          </a:bodyPr>
+          <a:lstStyle/>
+          <a:p>
+            <a:r>
+              <a:rPr lang="pt-BR" sz="1600" dirty="0" smtClean="0"/>
+              <a:t>Com isso, criamos uma tabela contendo a receita, custo e lucro previsto para cada valor limite de probabilidade que quisermos optar.</a:t>
+            </a:r>
+          </a:p>
+          <a:p>
+            <a:endParaRPr lang="pt-BR" sz="1600" dirty="0"/>
+          </a:p>
+          <a:p>
+            <a:r>
+              <a:rPr lang="pt-BR" sz="1600" dirty="0" smtClean="0"/>
+              <a:t>Essa decisão ficaria a cargo do gestor.</a:t>
+            </a:r>
+            <a:endParaRPr lang="pt-BR" sz="1600" dirty="0"/>
+          </a:p>
+          <a:p>
+            <a:endParaRPr lang="pt-BR" sz="1600" dirty="0"/>
+          </a:p>
+        </p:txBody>
+      </p:sp>
+      <p:pic>
+        <p:nvPicPr>
+          <p:cNvPr id="3" name="Imagem 2"/>
+          <p:cNvPicPr>
+            <a:picLocks noChangeAspect="1"/>
+          </p:cNvPicPr>
+          <p:nvPr/>
+        </p:nvPicPr>
+        <p:blipFill>
+          <a:blip r:embed="rId3"/>
+          <a:stretch>
+            <a:fillRect/>
+          </a:stretch>
+        </p:blipFill>
+        <p:spPr>
+          <a:xfrm>
+            <a:off x="2255657" y="2040162"/>
+            <a:ext cx="2180545" cy="4539094"/>
+          </a:xfrm>
+          <a:prstGeom prst="rect">
+            <a:avLst/>
+          </a:prstGeom>
+        </p:spPr>
+      </p:pic>
+      <p:pic>
+        <p:nvPicPr>
+          <p:cNvPr id="5" name="Imagem 4"/>
+          <p:cNvPicPr>
+            <a:picLocks noChangeAspect="1"/>
+          </p:cNvPicPr>
+          <p:nvPr/>
+        </p:nvPicPr>
+        <p:blipFill>
+          <a:blip r:embed="rId4"/>
+          <a:stretch>
+            <a:fillRect/>
+          </a:stretch>
+        </p:blipFill>
+        <p:spPr>
+          <a:xfrm>
+            <a:off x="4629152" y="2040162"/>
+            <a:ext cx="3965800" cy="4561631"/>
+          </a:xfrm>
+          <a:prstGeom prst="rect">
+            <a:avLst/>
+          </a:prstGeom>
+        </p:spPr>
+      </p:pic>
+    </p:spTree>
+    <p:extLst>
+      <p:ext uri="{BB962C8B-B14F-4D97-AF65-F5344CB8AC3E}">
+        <p14:creationId xmlns:p14="http://schemas.microsoft.com/office/powerpoint/2010/main" val="1358760457"/>
+      </p:ext>
+    </p:extLst>
+  </p:cSld>
+  <p:clrMapOvr>
+    <a:masterClrMapping/>
+  </p:clrMapOvr>
+</p:sld>
+</file>
+
+<file path=ppt/slides/slide29.xml><?xml version="1.0" encoding="utf-8"?>
+<p:sld xmlns:a="http://schemas.openxmlformats.org/drawingml/2006/main" xmlns:r="http://schemas.openxmlformats.org/officeDocument/2006/relationships" xmlns:p="http://schemas.openxmlformats.org/presentationml/2006/main">
+  <p:cSld>
+    <p:spTree>
+      <p:nvGrpSpPr>
+        <p:cNvPr id="1" name=""/>
+        <p:cNvGrpSpPr/>
+        <p:nvPr/>
+      </p:nvGrpSpPr>
+      <p:grpSpPr>
+        <a:xfrm>
+          <a:off x="0" y="0"/>
+          <a:ext cx="0" cy="0"/>
+          <a:chOff x="0" y="0"/>
+          <a:chExt cx="0" cy="0"/>
+        </a:xfrm>
+      </p:grpSpPr>
+      <p:pic>
+        <p:nvPicPr>
+          <p:cNvPr id="12" name="Imagem 11">
+            <a:extLst>
+              <a:ext uri="{FF2B5EF4-FFF2-40B4-BE49-F238E27FC236}">
+                <a16:creationId xmlns:a16="http://schemas.microsoft.com/office/drawing/2014/main" xmlns="" id="{45012191-CAAF-479E-8188-4611AAB46D34}"/>
+              </a:ext>
+            </a:extLst>
+          </p:cNvPr>
+          <p:cNvPicPr>
+            <a:picLocks noChangeAspect="1"/>
+          </p:cNvPicPr>
+          <p:nvPr/>
+        </p:nvPicPr>
+        <p:blipFill>
+          <a:blip r:embed="rId2">
+            <a:lum bright="70000" contrast="-70000"/>
+          </a:blip>
+          <a:stretch>
+            <a:fillRect/>
+          </a:stretch>
+        </p:blipFill>
+        <p:spPr>
+          <a:xfrm>
+            <a:off x="4841164" y="3151597"/>
+            <a:ext cx="1075295" cy="731201"/>
+          </a:xfrm>
+          <a:prstGeom prst="rect">
+            <a:avLst/>
+          </a:prstGeom>
+        </p:spPr>
+      </p:pic>
+      <p:sp>
+        <p:nvSpPr>
+          <p:cNvPr id="9" name="CaixaDeTexto 8">
+            <a:extLst>
+              <a:ext uri="{FF2B5EF4-FFF2-40B4-BE49-F238E27FC236}">
+                <a16:creationId xmlns:a16="http://schemas.microsoft.com/office/drawing/2014/main" xmlns="" id="{FB1A0CF8-D220-44EE-A5AC-E5B5791D84CF}"/>
+              </a:ext>
+            </a:extLst>
+          </p:cNvPr>
+          <p:cNvSpPr txBox="1"/>
+          <p:nvPr/>
+        </p:nvSpPr>
+        <p:spPr>
+          <a:xfrm>
+            <a:off x="4498522" y="2505266"/>
+            <a:ext cx="1959428" cy="646331"/>
+          </a:xfrm>
+          <a:prstGeom prst="rect">
+            <a:avLst/>
+          </a:prstGeom>
+          <a:noFill/>
+        </p:spPr>
+        <p:txBody>
+          <a:bodyPr wrap="square" rtlCol="0">
+            <a:spAutoFit/>
+          </a:bodyPr>
+          <a:lstStyle/>
+          <a:p>
+            <a:r>
+              <a:rPr lang="pt-BR" sz="3600" dirty="0" smtClean="0">
+                <a:solidFill>
+                  <a:srgbClr val="FF0000"/>
+                </a:solidFill>
+              </a:rPr>
+              <a:t>Dúvidas?</a:t>
+            </a:r>
+            <a:endParaRPr lang="pt-BR" sz="3600" dirty="0">
+              <a:solidFill>
+                <a:srgbClr val="FF0000"/>
+              </a:solidFill>
+            </a:endParaRPr>
+          </a:p>
+        </p:txBody>
+      </p:sp>
+      <p:sp>
+        <p:nvSpPr>
+          <p:cNvPr id="6" name="CaixaDeTexto 5">
+            <a:extLst>
+              <a:ext uri="{FF2B5EF4-FFF2-40B4-BE49-F238E27FC236}">
+                <a16:creationId xmlns:a16="http://schemas.microsoft.com/office/drawing/2014/main" xmlns="" id="{FB1A0CF8-D220-44EE-A5AC-E5B5791D84CF}"/>
+              </a:ext>
+            </a:extLst>
+          </p:cNvPr>
+          <p:cNvSpPr txBox="1"/>
+          <p:nvPr/>
+        </p:nvSpPr>
+        <p:spPr>
+          <a:xfrm>
+            <a:off x="4408715" y="3797928"/>
+            <a:ext cx="2139042" cy="646331"/>
+          </a:xfrm>
+          <a:prstGeom prst="rect">
+            <a:avLst/>
+          </a:prstGeom>
+          <a:noFill/>
+        </p:spPr>
+        <p:txBody>
+          <a:bodyPr wrap="square" rtlCol="0">
+            <a:spAutoFit/>
+          </a:bodyPr>
+          <a:lstStyle/>
+          <a:p>
+            <a:r>
+              <a:rPr lang="pt-BR" sz="3600" dirty="0" smtClean="0">
+                <a:solidFill>
+                  <a:srgbClr val="FF0000"/>
+                </a:solidFill>
+              </a:rPr>
+              <a:t>Obrigado!</a:t>
+            </a:r>
+            <a:endParaRPr lang="pt-BR" sz="3600" dirty="0">
+              <a:solidFill>
+                <a:srgbClr val="FF0000"/>
+              </a:solidFill>
+            </a:endParaRPr>
+          </a:p>
+        </p:txBody>
+      </p:sp>
+    </p:spTree>
+    <p:extLst>
+      <p:ext uri="{BB962C8B-B14F-4D97-AF65-F5344CB8AC3E}">
+        <p14:creationId xmlns:p14="http://schemas.microsoft.com/office/powerpoint/2010/main" val="2363133925"/>
       </p:ext>
     </p:extLst>
   </p:cSld>
@@ -6891,7 +9326,7 @@
           <p:cNvPr id="7" name="CaixaDeTexto 6">
             <a:extLst>
               <a:ext uri="{FF2B5EF4-FFF2-40B4-BE49-F238E27FC236}">
-                <a16:creationId xmlns:a16="http://schemas.microsoft.com/office/drawing/2014/main" id="{5FDBE5A5-2BF1-44AE-AF37-AD68A545CB9B}"/>
+                <a16:creationId xmlns:a16="http://schemas.microsoft.com/office/drawing/2014/main" xmlns="" id="{5FDBE5A5-2BF1-44AE-AF37-AD68A545CB9B}"/>
               </a:ext>
             </a:extLst>
           </p:cNvPr>
@@ -6943,7 +9378,7 @@
           <p:cNvPr id="11" name="Imagem 10">
             <a:extLst>
               <a:ext uri="{FF2B5EF4-FFF2-40B4-BE49-F238E27FC236}">
-                <a16:creationId xmlns:a16="http://schemas.microsoft.com/office/drawing/2014/main" id="{6244F971-9CC6-4B9F-BB47-09A82C7B6DD4}"/>
+                <a16:creationId xmlns:a16="http://schemas.microsoft.com/office/drawing/2014/main" xmlns="" id="{6244F971-9CC6-4B9F-BB47-09A82C7B6DD4}"/>
               </a:ext>
             </a:extLst>
           </p:cNvPr>
@@ -6975,7 +9410,7 @@
           <p:cNvPr id="13" name="CaixaDeTexto 12">
             <a:extLst>
               <a:ext uri="{FF2B5EF4-FFF2-40B4-BE49-F238E27FC236}">
-                <a16:creationId xmlns:a16="http://schemas.microsoft.com/office/drawing/2014/main" id="{AB454FF3-D826-44A3-B2CE-C7028527CED8}"/>
+                <a16:creationId xmlns:a16="http://schemas.microsoft.com/office/drawing/2014/main" xmlns="" id="{AB454FF3-D826-44A3-B2CE-C7028527CED8}"/>
               </a:ext>
             </a:extLst>
           </p:cNvPr>
@@ -7023,7 +9458,7 @@
           <p:cNvPr id="15" name="Conector reto 14">
             <a:extLst>
               <a:ext uri="{FF2B5EF4-FFF2-40B4-BE49-F238E27FC236}">
-                <a16:creationId xmlns:a16="http://schemas.microsoft.com/office/drawing/2014/main" id="{1A83A55E-BA2A-463B-81EE-66BF3044D7B4}"/>
+                <a16:creationId xmlns:a16="http://schemas.microsoft.com/office/drawing/2014/main" xmlns="" id="{1A83A55E-BA2A-463B-81EE-66BF3044D7B4}"/>
               </a:ext>
             </a:extLst>
           </p:cNvPr>
@@ -7096,7 +9531,7 @@
           <p:cNvPr id="6" name="CaixaDeTexto 5">
             <a:extLst>
               <a:ext uri="{FF2B5EF4-FFF2-40B4-BE49-F238E27FC236}">
-                <a16:creationId xmlns:a16="http://schemas.microsoft.com/office/drawing/2014/main" id="{49E01614-62FE-4AE1-9DDD-51EEDB8A30A0}"/>
+                <a16:creationId xmlns:a16="http://schemas.microsoft.com/office/drawing/2014/main" xmlns="" id="{49E01614-62FE-4AE1-9DDD-51EEDB8A30A0}"/>
               </a:ext>
             </a:extLst>
           </p:cNvPr>
@@ -7135,7 +9570,7 @@
           <p:cNvPr id="10" name="Imagem 9">
             <a:extLst>
               <a:ext uri="{FF2B5EF4-FFF2-40B4-BE49-F238E27FC236}">
-                <a16:creationId xmlns:a16="http://schemas.microsoft.com/office/drawing/2014/main" id="{4A93023F-4D3A-4EA2-8F9A-85D8F8008E8E}"/>
+                <a16:creationId xmlns:a16="http://schemas.microsoft.com/office/drawing/2014/main" xmlns="" id="{4A93023F-4D3A-4EA2-8F9A-85D8F8008E8E}"/>
               </a:ext>
             </a:extLst>
           </p:cNvPr>
@@ -7165,7 +9600,7 @@
           <p:cNvPr id="2" name="CaixaDeTexto 1">
             <a:extLst>
               <a:ext uri="{FF2B5EF4-FFF2-40B4-BE49-F238E27FC236}">
-                <a16:creationId xmlns:a16="http://schemas.microsoft.com/office/drawing/2014/main" id="{55A72135-0593-413C-AECB-CA47CA15A7F7}"/>
+                <a16:creationId xmlns:a16="http://schemas.microsoft.com/office/drawing/2014/main" xmlns="" id="{55A72135-0593-413C-AECB-CA47CA15A7F7}"/>
               </a:ext>
             </a:extLst>
           </p:cNvPr>
@@ -7206,7 +9641,7 @@
           <p:cNvPr id="4" name="Imagem 3">
             <a:extLst>
               <a:ext uri="{FF2B5EF4-FFF2-40B4-BE49-F238E27FC236}">
-                <a16:creationId xmlns:a16="http://schemas.microsoft.com/office/drawing/2014/main" id="{00AC7143-4C91-4FE8-A182-66F579E4652A}"/>
+                <a16:creationId xmlns:a16="http://schemas.microsoft.com/office/drawing/2014/main" xmlns="" id="{00AC7143-4C91-4FE8-A182-66F579E4652A}"/>
               </a:ext>
             </a:extLst>
           </p:cNvPr>
@@ -7236,7 +9671,7 @@
           <p:cNvPr id="7" name="Imagem 6">
             <a:extLst>
               <a:ext uri="{FF2B5EF4-FFF2-40B4-BE49-F238E27FC236}">
-                <a16:creationId xmlns:a16="http://schemas.microsoft.com/office/drawing/2014/main" id="{FCFEDB88-3848-4B03-9A74-860B00C37A2A}"/>
+                <a16:creationId xmlns:a16="http://schemas.microsoft.com/office/drawing/2014/main" xmlns="" id="{FCFEDB88-3848-4B03-9A74-860B00C37A2A}"/>
               </a:ext>
             </a:extLst>
           </p:cNvPr>
@@ -7298,7 +9733,7 @@
           <p:cNvPr id="17" name="CaixaDeTexto 16">
             <a:extLst>
               <a:ext uri="{FF2B5EF4-FFF2-40B4-BE49-F238E27FC236}">
-                <a16:creationId xmlns:a16="http://schemas.microsoft.com/office/drawing/2014/main" id="{A2F80039-290F-405A-B551-9DECF536708A}"/>
+                <a16:creationId xmlns:a16="http://schemas.microsoft.com/office/drawing/2014/main" xmlns="" id="{A2F80039-290F-405A-B551-9DECF536708A}"/>
               </a:ext>
             </a:extLst>
           </p:cNvPr>
@@ -7333,7 +9768,7 @@
           <p:cNvPr id="19" name="CaixaDeTexto 18">
             <a:extLst>
               <a:ext uri="{FF2B5EF4-FFF2-40B4-BE49-F238E27FC236}">
-                <a16:creationId xmlns:a16="http://schemas.microsoft.com/office/drawing/2014/main" id="{A7D1BFBD-0E40-41A3-8E22-7EA0F6C8A1A3}"/>
+                <a16:creationId xmlns:a16="http://schemas.microsoft.com/office/drawing/2014/main" xmlns="" id="{A7D1BFBD-0E40-41A3-8E22-7EA0F6C8A1A3}"/>
               </a:ext>
             </a:extLst>
           </p:cNvPr>
@@ -7368,7 +9803,7 @@
           <p:cNvPr id="21" name="CaixaDeTexto 20">
             <a:extLst>
               <a:ext uri="{FF2B5EF4-FFF2-40B4-BE49-F238E27FC236}">
-                <a16:creationId xmlns:a16="http://schemas.microsoft.com/office/drawing/2014/main" id="{3EBE4AE6-5097-42F2-87F7-B376A100FCE1}"/>
+                <a16:creationId xmlns:a16="http://schemas.microsoft.com/office/drawing/2014/main" xmlns="" id="{3EBE4AE6-5097-42F2-87F7-B376A100FCE1}"/>
               </a:ext>
             </a:extLst>
           </p:cNvPr>
@@ -7403,7 +9838,7 @@
           <p:cNvPr id="25" name="Imagem 24">
             <a:extLst>
               <a:ext uri="{FF2B5EF4-FFF2-40B4-BE49-F238E27FC236}">
-                <a16:creationId xmlns:a16="http://schemas.microsoft.com/office/drawing/2014/main" id="{B7EA975A-3219-4189-9D73-0F244AA33BE0}"/>
+                <a16:creationId xmlns:a16="http://schemas.microsoft.com/office/drawing/2014/main" xmlns="" id="{B7EA975A-3219-4189-9D73-0F244AA33BE0}"/>
               </a:ext>
             </a:extLst>
           </p:cNvPr>
@@ -7435,7 +9870,7 @@
           <p:cNvPr id="29" name="CaixaDeTexto 28">
             <a:extLst>
               <a:ext uri="{FF2B5EF4-FFF2-40B4-BE49-F238E27FC236}">
-                <a16:creationId xmlns:a16="http://schemas.microsoft.com/office/drawing/2014/main" id="{3128BA13-4D7B-4EB1-B311-4A2BDA7AE22F}"/>
+                <a16:creationId xmlns:a16="http://schemas.microsoft.com/office/drawing/2014/main" xmlns="" id="{3128BA13-4D7B-4EB1-B311-4A2BDA7AE22F}"/>
               </a:ext>
             </a:extLst>
           </p:cNvPr>
@@ -7474,7 +9909,7 @@
           <p:cNvPr id="3" name="Imagem 2">
             <a:extLst>
               <a:ext uri="{FF2B5EF4-FFF2-40B4-BE49-F238E27FC236}">
-                <a16:creationId xmlns:a16="http://schemas.microsoft.com/office/drawing/2014/main" id="{70A0C344-3729-46F1-95E4-53BFD0032548}"/>
+                <a16:creationId xmlns:a16="http://schemas.microsoft.com/office/drawing/2014/main" xmlns="" id="{70A0C344-3729-46F1-95E4-53BFD0032548}"/>
               </a:ext>
             </a:extLst>
           </p:cNvPr>
@@ -7504,7 +9939,7 @@
           <p:cNvPr id="5" name="Imagem 4">
             <a:extLst>
               <a:ext uri="{FF2B5EF4-FFF2-40B4-BE49-F238E27FC236}">
-                <a16:creationId xmlns:a16="http://schemas.microsoft.com/office/drawing/2014/main" id="{C28B160A-C366-4507-B211-02DD71628271}"/>
+                <a16:creationId xmlns:a16="http://schemas.microsoft.com/office/drawing/2014/main" xmlns="" id="{C28B160A-C366-4507-B211-02DD71628271}"/>
               </a:ext>
             </a:extLst>
           </p:cNvPr>
@@ -7534,7 +9969,7 @@
           <p:cNvPr id="7" name="Imagem 6">
             <a:extLst>
               <a:ext uri="{FF2B5EF4-FFF2-40B4-BE49-F238E27FC236}">
-                <a16:creationId xmlns:a16="http://schemas.microsoft.com/office/drawing/2014/main" id="{B8BE222A-8EF9-4E46-8605-A578F95001E9}"/>
+                <a16:creationId xmlns:a16="http://schemas.microsoft.com/office/drawing/2014/main" xmlns="" id="{B8BE222A-8EF9-4E46-8605-A578F95001E9}"/>
               </a:ext>
             </a:extLst>
           </p:cNvPr>
@@ -7594,7 +10029,7 @@
           <p:cNvPr id="2" name="CaixaDeTexto 1">
             <a:extLst>
               <a:ext uri="{FF2B5EF4-FFF2-40B4-BE49-F238E27FC236}">
-                <a16:creationId xmlns:a16="http://schemas.microsoft.com/office/drawing/2014/main" id="{55A72135-0593-413C-AECB-CA47CA15A7F7}"/>
+                <a16:creationId xmlns:a16="http://schemas.microsoft.com/office/drawing/2014/main" xmlns="" id="{55A72135-0593-413C-AECB-CA47CA15A7F7}"/>
               </a:ext>
             </a:extLst>
           </p:cNvPr>
@@ -7630,7 +10065,7 @@
           <p:cNvPr id="5" name="Imagem 4">
             <a:extLst>
               <a:ext uri="{FF2B5EF4-FFF2-40B4-BE49-F238E27FC236}">
-                <a16:creationId xmlns:a16="http://schemas.microsoft.com/office/drawing/2014/main" id="{3784B415-A895-4AB4-B90C-136143820014}"/>
+                <a16:creationId xmlns:a16="http://schemas.microsoft.com/office/drawing/2014/main" xmlns="" id="{3784B415-A895-4AB4-B90C-136143820014}"/>
               </a:ext>
             </a:extLst>
           </p:cNvPr>
@@ -7660,7 +10095,7 @@
           <p:cNvPr id="8" name="Imagem 7">
             <a:extLst>
               <a:ext uri="{FF2B5EF4-FFF2-40B4-BE49-F238E27FC236}">
-                <a16:creationId xmlns:a16="http://schemas.microsoft.com/office/drawing/2014/main" id="{E885EE22-DD67-4C93-ABA3-658124DC14B1}"/>
+                <a16:creationId xmlns:a16="http://schemas.microsoft.com/office/drawing/2014/main" xmlns="" id="{E885EE22-DD67-4C93-ABA3-658124DC14B1}"/>
               </a:ext>
             </a:extLst>
           </p:cNvPr>
@@ -7690,7 +10125,7 @@
           <p:cNvPr id="15" name="Imagem 14">
             <a:extLst>
               <a:ext uri="{FF2B5EF4-FFF2-40B4-BE49-F238E27FC236}">
-                <a16:creationId xmlns:a16="http://schemas.microsoft.com/office/drawing/2014/main" id="{C4F74523-2C96-4426-A803-6FCCEF6B487C}"/>
+                <a16:creationId xmlns:a16="http://schemas.microsoft.com/office/drawing/2014/main" xmlns="" id="{C4F74523-2C96-4426-A803-6FCCEF6B487C}"/>
               </a:ext>
             </a:extLst>
           </p:cNvPr>
@@ -7722,7 +10157,7 @@
           <p:cNvPr id="17" name="CaixaDeTexto 16">
             <a:extLst>
               <a:ext uri="{FF2B5EF4-FFF2-40B4-BE49-F238E27FC236}">
-                <a16:creationId xmlns:a16="http://schemas.microsoft.com/office/drawing/2014/main" id="{1278100D-7FDB-42DE-9BD9-CCB8B5241616}"/>
+                <a16:creationId xmlns:a16="http://schemas.microsoft.com/office/drawing/2014/main" xmlns="" id="{1278100D-7FDB-42DE-9BD9-CCB8B5241616}"/>
               </a:ext>
             </a:extLst>
           </p:cNvPr>
@@ -7761,7 +10196,7 @@
           <p:cNvPr id="19" name="CaixaDeTexto 18">
             <a:extLst>
               <a:ext uri="{FF2B5EF4-FFF2-40B4-BE49-F238E27FC236}">
-                <a16:creationId xmlns:a16="http://schemas.microsoft.com/office/drawing/2014/main" id="{19C2F6E6-20F2-4612-BC63-591D9BC6C81A}"/>
+                <a16:creationId xmlns:a16="http://schemas.microsoft.com/office/drawing/2014/main" xmlns="" id="{19C2F6E6-20F2-4612-BC63-591D9BC6C81A}"/>
               </a:ext>
             </a:extLst>
           </p:cNvPr>
@@ -7826,7 +10261,7 @@
           <p:cNvPr id="4" name="Imagem 3">
             <a:extLst>
               <a:ext uri="{FF2B5EF4-FFF2-40B4-BE49-F238E27FC236}">
-                <a16:creationId xmlns:a16="http://schemas.microsoft.com/office/drawing/2014/main" id="{D1D34DAC-0ECA-495A-9168-9CB6F9AC67AC}"/>
+                <a16:creationId xmlns:a16="http://schemas.microsoft.com/office/drawing/2014/main" xmlns="" id="{D1D34DAC-0ECA-495A-9168-9CB6F9AC67AC}"/>
               </a:ext>
             </a:extLst>
           </p:cNvPr>
@@ -7856,7 +10291,7 @@
           <p:cNvPr id="7" name="CaixaDeTexto 6">
             <a:extLst>
               <a:ext uri="{FF2B5EF4-FFF2-40B4-BE49-F238E27FC236}">
-                <a16:creationId xmlns:a16="http://schemas.microsoft.com/office/drawing/2014/main" id="{D67E3CE1-1B05-4008-B992-B5BCAE7B17D0}"/>
+                <a16:creationId xmlns:a16="http://schemas.microsoft.com/office/drawing/2014/main" xmlns="" id="{D67E3CE1-1B05-4008-B992-B5BCAE7B17D0}"/>
               </a:ext>
             </a:extLst>
           </p:cNvPr>
@@ -7897,7 +10332,7 @@
           <p:cNvPr id="10" name="CaixaDeTexto 9">
             <a:extLst>
               <a:ext uri="{FF2B5EF4-FFF2-40B4-BE49-F238E27FC236}">
-                <a16:creationId xmlns:a16="http://schemas.microsoft.com/office/drawing/2014/main" id="{1FD5EE6A-9D8F-441B-8170-A2FFA545E769}"/>
+                <a16:creationId xmlns:a16="http://schemas.microsoft.com/office/drawing/2014/main" xmlns="" id="{1FD5EE6A-9D8F-441B-8170-A2FFA545E769}"/>
               </a:ext>
             </a:extLst>
           </p:cNvPr>
@@ -7932,7 +10367,7 @@
           <p:cNvPr id="12" name="Imagem 11">
             <a:extLst>
               <a:ext uri="{FF2B5EF4-FFF2-40B4-BE49-F238E27FC236}">
-                <a16:creationId xmlns:a16="http://schemas.microsoft.com/office/drawing/2014/main" id="{9CB02745-4747-4B59-B247-EC876124CB42}"/>
+                <a16:creationId xmlns:a16="http://schemas.microsoft.com/office/drawing/2014/main" xmlns="" id="{9CB02745-4747-4B59-B247-EC876124CB42}"/>
               </a:ext>
             </a:extLst>
           </p:cNvPr>
@@ -7964,7 +10399,7 @@
           <p:cNvPr id="14" name="CaixaDeTexto 13">
             <a:extLst>
               <a:ext uri="{FF2B5EF4-FFF2-40B4-BE49-F238E27FC236}">
-                <a16:creationId xmlns:a16="http://schemas.microsoft.com/office/drawing/2014/main" id="{898227E1-0DE5-4149-AB8B-874F1DA1BC85}"/>
+                <a16:creationId xmlns:a16="http://schemas.microsoft.com/office/drawing/2014/main" xmlns="" id="{898227E1-0DE5-4149-AB8B-874F1DA1BC85}"/>
               </a:ext>
             </a:extLst>
           </p:cNvPr>
@@ -8033,7 +10468,7 @@
           <p:cNvPr id="12" name="Imagem 11">
             <a:extLst>
               <a:ext uri="{FF2B5EF4-FFF2-40B4-BE49-F238E27FC236}">
-                <a16:creationId xmlns:a16="http://schemas.microsoft.com/office/drawing/2014/main" id="{77C742BD-9AB4-418B-ADC8-025D03F519CC}"/>
+                <a16:creationId xmlns:a16="http://schemas.microsoft.com/office/drawing/2014/main" xmlns="" id="{77C742BD-9AB4-418B-ADC8-025D03F519CC}"/>
               </a:ext>
             </a:extLst>
           </p:cNvPr>
@@ -8065,7 +10500,7 @@
           <p:cNvPr id="7" name="CaixaDeTexto 6">
             <a:extLst>
               <a:ext uri="{FF2B5EF4-FFF2-40B4-BE49-F238E27FC236}">
-                <a16:creationId xmlns:a16="http://schemas.microsoft.com/office/drawing/2014/main" id="{D67E3CE1-1B05-4008-B992-B5BCAE7B17D0}"/>
+                <a16:creationId xmlns:a16="http://schemas.microsoft.com/office/drawing/2014/main" xmlns="" id="{D67E3CE1-1B05-4008-B992-B5BCAE7B17D0}"/>
               </a:ext>
             </a:extLst>
           </p:cNvPr>
@@ -8119,7 +10554,7 @@
           <p:cNvPr id="2" name="CaixaDeTexto 1">
             <a:extLst>
               <a:ext uri="{FF2B5EF4-FFF2-40B4-BE49-F238E27FC236}">
-                <a16:creationId xmlns:a16="http://schemas.microsoft.com/office/drawing/2014/main" id="{568DFC54-8910-4EF4-AF58-0C2F7A2F9E1B}"/>
+                <a16:creationId xmlns:a16="http://schemas.microsoft.com/office/drawing/2014/main" xmlns="" id="{568DFC54-8910-4EF4-AF58-0C2F7A2F9E1B}"/>
               </a:ext>
             </a:extLst>
           </p:cNvPr>
@@ -8154,7 +10589,7 @@
           <p:cNvPr id="8" name="Imagem 7">
             <a:extLst>
               <a:ext uri="{FF2B5EF4-FFF2-40B4-BE49-F238E27FC236}">
-                <a16:creationId xmlns:a16="http://schemas.microsoft.com/office/drawing/2014/main" id="{B52C04D7-C505-4F83-B2AB-7DB429A43110}"/>
+                <a16:creationId xmlns:a16="http://schemas.microsoft.com/office/drawing/2014/main" xmlns="" id="{B52C04D7-C505-4F83-B2AB-7DB429A43110}"/>
               </a:ext>
             </a:extLst>
           </p:cNvPr>
@@ -8184,7 +10619,7 @@
           <p:cNvPr id="10" name="Imagem 9">
             <a:extLst>
               <a:ext uri="{FF2B5EF4-FFF2-40B4-BE49-F238E27FC236}">
-                <a16:creationId xmlns:a16="http://schemas.microsoft.com/office/drawing/2014/main" id="{ADD31238-1161-4358-9EBD-809E5E68A84D}"/>
+                <a16:creationId xmlns:a16="http://schemas.microsoft.com/office/drawing/2014/main" xmlns="" id="{ADD31238-1161-4358-9EBD-809E5E68A84D}"/>
               </a:ext>
             </a:extLst>
           </p:cNvPr>
@@ -8214,7 +10649,7 @@
           <p:cNvPr id="14" name="CaixaDeTexto 13">
             <a:extLst>
               <a:ext uri="{FF2B5EF4-FFF2-40B4-BE49-F238E27FC236}">
-                <a16:creationId xmlns:a16="http://schemas.microsoft.com/office/drawing/2014/main" id="{1B4F966F-DDD7-40B3-BB43-0D6FD15B79A5}"/>
+                <a16:creationId xmlns:a16="http://schemas.microsoft.com/office/drawing/2014/main" xmlns="" id="{1B4F966F-DDD7-40B3-BB43-0D6FD15B79A5}"/>
               </a:ext>
             </a:extLst>
           </p:cNvPr>
@@ -8283,7 +10718,7 @@
           <p:cNvPr id="24" name="Imagem 23">
             <a:extLst>
               <a:ext uri="{FF2B5EF4-FFF2-40B4-BE49-F238E27FC236}">
-                <a16:creationId xmlns:a16="http://schemas.microsoft.com/office/drawing/2014/main" id="{953AC66B-B3EA-43A2-9C19-997B8748E33C}"/>
+                <a16:creationId xmlns:a16="http://schemas.microsoft.com/office/drawing/2014/main" xmlns="" id="{953AC66B-B3EA-43A2-9C19-997B8748E33C}"/>
               </a:ext>
             </a:extLst>
           </p:cNvPr>
@@ -8315,7 +10750,7 @@
           <p:cNvPr id="7" name="CaixaDeTexto 6">
             <a:extLst>
               <a:ext uri="{FF2B5EF4-FFF2-40B4-BE49-F238E27FC236}">
-                <a16:creationId xmlns:a16="http://schemas.microsoft.com/office/drawing/2014/main" id="{D67E3CE1-1B05-4008-B992-B5BCAE7B17D0}"/>
+                <a16:creationId xmlns:a16="http://schemas.microsoft.com/office/drawing/2014/main" xmlns="" id="{D67E3CE1-1B05-4008-B992-B5BCAE7B17D0}"/>
               </a:ext>
             </a:extLst>
           </p:cNvPr>
@@ -8365,7 +10800,7 @@
           <p:cNvPr id="2" name="CaixaDeTexto 1">
             <a:extLst>
               <a:ext uri="{FF2B5EF4-FFF2-40B4-BE49-F238E27FC236}">
-                <a16:creationId xmlns:a16="http://schemas.microsoft.com/office/drawing/2014/main" id="{568DFC54-8910-4EF4-AF58-0C2F7A2F9E1B}"/>
+                <a16:creationId xmlns:a16="http://schemas.microsoft.com/office/drawing/2014/main" xmlns="" id="{568DFC54-8910-4EF4-AF58-0C2F7A2F9E1B}"/>
               </a:ext>
             </a:extLst>
           </p:cNvPr>
@@ -8400,7 +10835,7 @@
           <p:cNvPr id="4" name="Imagem 3">
             <a:extLst>
               <a:ext uri="{FF2B5EF4-FFF2-40B4-BE49-F238E27FC236}">
-                <a16:creationId xmlns:a16="http://schemas.microsoft.com/office/drawing/2014/main" id="{C54D8342-41F7-4129-B708-868C1FE9B179}"/>
+                <a16:creationId xmlns:a16="http://schemas.microsoft.com/office/drawing/2014/main" xmlns="" id="{C54D8342-41F7-4129-B708-868C1FE9B179}"/>
               </a:ext>
             </a:extLst>
           </p:cNvPr>
@@ -8430,7 +10865,7 @@
           <p:cNvPr id="12" name="CaixaDeTexto 11">
             <a:extLst>
               <a:ext uri="{FF2B5EF4-FFF2-40B4-BE49-F238E27FC236}">
-                <a16:creationId xmlns:a16="http://schemas.microsoft.com/office/drawing/2014/main" id="{5C76A3B0-EF8F-465D-B0D5-5D9222769FFF}"/>
+                <a16:creationId xmlns:a16="http://schemas.microsoft.com/office/drawing/2014/main" xmlns="" id="{5C76A3B0-EF8F-465D-B0D5-5D9222769FFF}"/>
               </a:ext>
             </a:extLst>
           </p:cNvPr>
@@ -8465,7 +10900,7 @@
           <p:cNvPr id="20" name="Imagem 19">
             <a:extLst>
               <a:ext uri="{FF2B5EF4-FFF2-40B4-BE49-F238E27FC236}">
-                <a16:creationId xmlns:a16="http://schemas.microsoft.com/office/drawing/2014/main" id="{312EB4E1-DD6B-4721-ABB3-E2CDB420A81D}"/>
+                <a16:creationId xmlns:a16="http://schemas.microsoft.com/office/drawing/2014/main" xmlns="" id="{312EB4E1-DD6B-4721-ABB3-E2CDB420A81D}"/>
               </a:ext>
             </a:extLst>
           </p:cNvPr>
@@ -8495,7 +10930,7 @@
           <p:cNvPr id="22" name="Imagem 21">
             <a:extLst>
               <a:ext uri="{FF2B5EF4-FFF2-40B4-BE49-F238E27FC236}">
-                <a16:creationId xmlns:a16="http://schemas.microsoft.com/office/drawing/2014/main" id="{094EB50E-6B04-4F60-9602-F0C1D1C0D608}"/>
+                <a16:creationId xmlns:a16="http://schemas.microsoft.com/office/drawing/2014/main" xmlns="" id="{094EB50E-6B04-4F60-9602-F0C1D1C0D608}"/>
               </a:ext>
             </a:extLst>
           </p:cNvPr>
@@ -8525,7 +10960,7 @@
           <p:cNvPr id="26" name="CaixaDeTexto 25">
             <a:extLst>
               <a:ext uri="{FF2B5EF4-FFF2-40B4-BE49-F238E27FC236}">
-                <a16:creationId xmlns:a16="http://schemas.microsoft.com/office/drawing/2014/main" id="{7EC23470-B1EB-4051-9A80-56CF3CFCFF64}"/>
+                <a16:creationId xmlns:a16="http://schemas.microsoft.com/office/drawing/2014/main" xmlns="" id="{7EC23470-B1EB-4051-9A80-56CF3CFCFF64}"/>
               </a:ext>
             </a:extLst>
           </p:cNvPr>
@@ -8564,7 +10999,7 @@
           <p:cNvPr id="27" name="Seta: para a Direita 26">
             <a:extLst>
               <a:ext uri="{FF2B5EF4-FFF2-40B4-BE49-F238E27FC236}">
-                <a16:creationId xmlns:a16="http://schemas.microsoft.com/office/drawing/2014/main" id="{3194D331-B309-4A08-8A57-41F7F2A1C21B}"/>
+                <a16:creationId xmlns:a16="http://schemas.microsoft.com/office/drawing/2014/main" xmlns="" id="{3194D331-B309-4A08-8A57-41F7F2A1C21B}"/>
               </a:ext>
             </a:extLst>
           </p:cNvPr>
@@ -8618,7 +11053,7 @@
           <p:cNvPr id="31" name="Retângulo 30">
             <a:extLst>
               <a:ext uri="{FF2B5EF4-FFF2-40B4-BE49-F238E27FC236}">
-                <a16:creationId xmlns:a16="http://schemas.microsoft.com/office/drawing/2014/main" id="{EA482231-FA16-483A-9D80-633998497497}"/>
+                <a16:creationId xmlns:a16="http://schemas.microsoft.com/office/drawing/2014/main" xmlns="" id="{EA482231-FA16-483A-9D80-633998497497}"/>
               </a:ext>
             </a:extLst>
           </p:cNvPr>
@@ -8670,7 +11105,7 @@
           <p:cNvPr id="32" name="CaixaDeTexto 31">
             <a:extLst>
               <a:ext uri="{FF2B5EF4-FFF2-40B4-BE49-F238E27FC236}">
-                <a16:creationId xmlns:a16="http://schemas.microsoft.com/office/drawing/2014/main" id="{8061C88E-3B78-40E7-946C-80EF280F6B4F}"/>
+                <a16:creationId xmlns:a16="http://schemas.microsoft.com/office/drawing/2014/main" xmlns="" id="{8061C88E-3B78-40E7-946C-80EF280F6B4F}"/>
               </a:ext>
             </a:extLst>
           </p:cNvPr>

</xml_diff>

<commit_message>
final fix in the apresentation
</commit_message>
<xml_diff>
--- a/my_project/iFood CRM Data Analyst Case.pptx
+++ b/my_project/iFood CRM Data Analyst Case.pptx
@@ -3456,6 +3456,13 @@
   <p:clrMapOvr>
     <a:masterClrMapping/>
   </p:clrMapOvr>
+  <p:timing>
+    <p:tnLst>
+      <p:par>
+        <p:cTn id="1" dur="indefinite" restart="never" nodeType="tmRoot"/>
+      </p:par>
+    </p:tnLst>
+  </p:timing>
 </p:sld>
 </file>
 
@@ -3490,7 +3497,7 @@
         </p:nvSpPr>
         <p:spPr>
           <a:xfrm>
-            <a:off x="192391" y="1223053"/>
+            <a:off x="192391" y="1254584"/>
             <a:ext cx="5581134" cy="584775"/>
           </a:xfrm>
           <a:prstGeom prst="rect">
@@ -3762,7 +3769,7 @@
         <p:spPr>
           <a:xfrm>
             <a:off x="129872" y="194884"/>
-            <a:ext cx="8612660" cy="369332"/>
+            <a:ext cx="8612660" cy="400110"/>
           </a:xfrm>
           <a:prstGeom prst="rect">
             <a:avLst/>
@@ -3776,7 +3783,7 @@
           <a:lstStyle/>
           <a:p>
             <a:r>
-              <a:rPr lang="pt-BR" dirty="0">
+              <a:rPr lang="pt-BR" sz="2000" dirty="0">
                 <a:solidFill>
                   <a:srgbClr val="FF0000"/>
                 </a:solidFill>
@@ -4045,7 +4052,7 @@
         </p:nvSpPr>
         <p:spPr>
           <a:xfrm>
-            <a:off x="107459" y="5497111"/>
+            <a:off x="139461" y="5384056"/>
             <a:ext cx="11656173" cy="830997"/>
           </a:xfrm>
           <a:prstGeom prst="rect">
@@ -4178,8 +4185,8 @@
         </p:nvSpPr>
         <p:spPr>
           <a:xfrm>
-            <a:off x="129872" y="194884"/>
-            <a:ext cx="8612660" cy="369332"/>
+            <a:off x="129872" y="163353"/>
+            <a:ext cx="8612660" cy="400110"/>
           </a:xfrm>
           <a:prstGeom prst="rect">
             <a:avLst/>
@@ -4193,7 +4200,7 @@
           <a:lstStyle/>
           <a:p>
             <a:r>
-              <a:rPr lang="pt-BR" dirty="0">
+              <a:rPr lang="pt-BR" sz="2000" dirty="0">
                 <a:solidFill>
                   <a:srgbClr val="FF0000"/>
                 </a:solidFill>
@@ -4392,7 +4399,7 @@
         </p:blipFill>
         <p:spPr>
           <a:xfrm>
-            <a:off x="2145793" y="2837887"/>
+            <a:off x="2145793" y="2959388"/>
             <a:ext cx="1956778" cy="2075371"/>
           </a:xfrm>
           <a:prstGeom prst="rect">
@@ -4422,7 +4429,7 @@
         </p:blipFill>
         <p:spPr>
           <a:xfrm>
-            <a:off x="4899693" y="2280874"/>
+            <a:off x="4899693" y="2482702"/>
             <a:ext cx="4092275" cy="3189395"/>
           </a:xfrm>
           <a:prstGeom prst="rect">
@@ -4445,7 +4452,7 @@
         <p:spPr>
           <a:xfrm>
             <a:off x="129872" y="194884"/>
-            <a:ext cx="8612660" cy="369332"/>
+            <a:ext cx="8612660" cy="400110"/>
           </a:xfrm>
           <a:prstGeom prst="rect">
             <a:avLst/>
@@ -4459,7 +4466,7 @@
           <a:lstStyle/>
           <a:p>
             <a:r>
-              <a:rPr lang="pt-BR" dirty="0">
+              <a:rPr lang="pt-BR" sz="2000" dirty="0">
                 <a:solidFill>
                   <a:srgbClr val="FF0000"/>
                 </a:solidFill>
@@ -4653,7 +4660,7 @@
         </p:nvSpPr>
         <p:spPr>
           <a:xfrm>
-            <a:off x="107459" y="5609595"/>
+            <a:off x="239264" y="5477982"/>
             <a:ext cx="11952736" cy="1077218"/>
           </a:xfrm>
           <a:prstGeom prst="rect">
@@ -4728,7 +4735,7 @@
         </p:blipFill>
         <p:spPr>
           <a:xfrm>
-            <a:off x="131805" y="2402152"/>
+            <a:off x="131805" y="2276032"/>
             <a:ext cx="1975457" cy="2052025"/>
           </a:xfrm>
           <a:prstGeom prst="rect">
@@ -4758,7 +4765,7 @@
         </p:blipFill>
         <p:spPr>
           <a:xfrm>
-            <a:off x="2153408" y="1984428"/>
+            <a:off x="2153408" y="1858308"/>
             <a:ext cx="4914595" cy="3304641"/>
           </a:xfrm>
           <a:prstGeom prst="rect">
@@ -4788,7 +4795,7 @@
         </p:blipFill>
         <p:spPr>
           <a:xfrm>
-            <a:off x="7068003" y="1756648"/>
+            <a:off x="7068003" y="1630528"/>
             <a:ext cx="4992192" cy="3760202"/>
           </a:xfrm>
           <a:prstGeom prst="rect">
@@ -4810,7 +4817,7 @@
         </p:nvSpPr>
         <p:spPr>
           <a:xfrm>
-            <a:off x="7933038" y="3325444"/>
+            <a:off x="7933038" y="3199324"/>
             <a:ext cx="580767" cy="1853513"/>
           </a:xfrm>
           <a:prstGeom prst="rect">
@@ -4862,7 +4869,7 @@
         </p:nvSpPr>
         <p:spPr>
           <a:xfrm>
-            <a:off x="2940846" y="2197411"/>
+            <a:off x="2940846" y="2071291"/>
             <a:ext cx="444905" cy="2981546"/>
           </a:xfrm>
           <a:prstGeom prst="rect">
@@ -5185,7 +5192,7 @@
         <p:spPr>
           <a:xfrm>
             <a:off x="129872" y="194884"/>
-            <a:ext cx="8612660" cy="369332"/>
+            <a:ext cx="8612660" cy="400110"/>
           </a:xfrm>
           <a:prstGeom prst="rect">
             <a:avLst/>
@@ -5199,7 +5206,7 @@
           <a:lstStyle/>
           <a:p>
             <a:r>
-              <a:rPr lang="pt-BR" dirty="0">
+              <a:rPr lang="pt-BR" sz="2000" dirty="0">
                 <a:solidFill>
                   <a:srgbClr val="FF0000"/>
                 </a:solidFill>
@@ -5254,7 +5261,7 @@
         <p:spPr>
           <a:xfrm>
             <a:off x="194619" y="177284"/>
-            <a:ext cx="7034084" cy="830997"/>
+            <a:ext cx="7034084" cy="1077218"/>
           </a:xfrm>
           <a:prstGeom prst="rect">
             <a:avLst/>
@@ -5271,7 +5278,7 @@
               <a:buAutoNum type="arabicPeriod"/>
             </a:pPr>
             <a:r>
-              <a:rPr lang="pt-BR" sz="2400" dirty="0">
+              <a:rPr lang="pt-BR" sz="3200" dirty="0">
                 <a:solidFill>
                   <a:srgbClr val="FF0000"/>
                 </a:solidFill>
@@ -5283,7 +5290,7 @@
             <a:pPr marL="457200" indent="-457200" algn="l">
               <a:buAutoNum type="arabicPeriod"/>
             </a:pPr>
-            <a:endParaRPr lang="pt-BR" sz="2400" dirty="0">
+            <a:endParaRPr lang="pt-BR" sz="3200" dirty="0">
               <a:solidFill>
                 <a:srgbClr val="FF0000"/>
               </a:solidFill>
@@ -5337,8 +5344,8 @@
         </p:nvSpPr>
         <p:spPr>
           <a:xfrm>
-            <a:off x="1973992" y="2364430"/>
-            <a:ext cx="7034085" cy="954107"/>
+            <a:off x="2131648" y="2733762"/>
+            <a:ext cx="7034085" cy="584775"/>
           </a:xfrm>
           <a:prstGeom prst="rect">
             <a:avLst/>
@@ -5352,23 +5359,15 @@
           <a:lstStyle/>
           <a:p>
             <a:pPr algn="ctr"/>
-            <a:endParaRPr lang="pt-BR" sz="2800" dirty="0">
-              <a:solidFill>
-                <a:srgbClr val="FF0000"/>
-              </a:solidFill>
-            </a:endParaRPr>
-          </a:p>
-          <a:p>
-            <a:pPr algn="ctr"/>
-            <a:r>
-              <a:rPr lang="pt-BR" sz="2800" dirty="0" err="1">
+            <a:r>
+              <a:rPr lang="pt-BR" sz="3200" dirty="0" smtClean="0">
                 <a:solidFill>
                   <a:srgbClr val="FF0000"/>
                 </a:solidFill>
               </a:rPr>
-              <a:t>Insigths</a:t>
-            </a:r>
-            <a:endParaRPr lang="pt-BR" sz="2800" dirty="0">
+              <a:t>Insights</a:t>
+            </a:r>
+            <a:endParaRPr lang="pt-BR" sz="3200" dirty="0">
               <a:solidFill>
                 <a:srgbClr val="FF0000"/>
               </a:solidFill>
@@ -5538,8 +5537,8 @@
         </p:nvSpPr>
         <p:spPr>
           <a:xfrm>
-            <a:off x="129872" y="194884"/>
-            <a:ext cx="8612660" cy="369332"/>
+            <a:off x="129872" y="163353"/>
+            <a:ext cx="8612660" cy="400110"/>
           </a:xfrm>
           <a:prstGeom prst="rect">
             <a:avLst/>
@@ -5553,7 +5552,7 @@
           <a:lstStyle/>
           <a:p>
             <a:r>
-              <a:rPr lang="pt-BR" dirty="0">
+              <a:rPr lang="pt-BR" sz="2000" dirty="0">
                 <a:solidFill>
                   <a:srgbClr val="FF0000"/>
                 </a:solidFill>
@@ -5768,7 +5767,7 @@
         <p:spPr>
           <a:xfrm>
             <a:off x="129872" y="194884"/>
-            <a:ext cx="8612660" cy="369332"/>
+            <a:ext cx="8612660" cy="400110"/>
           </a:xfrm>
           <a:prstGeom prst="rect">
             <a:avLst/>
@@ -5782,7 +5781,7 @@
           <a:lstStyle/>
           <a:p>
             <a:r>
-              <a:rPr lang="pt-BR" dirty="0">
+              <a:rPr lang="pt-BR" sz="2000" dirty="0">
                 <a:solidFill>
                   <a:srgbClr val="FF0000"/>
                 </a:solidFill>
@@ -5985,8 +5984,8 @@
         </p:nvSpPr>
         <p:spPr>
           <a:xfrm>
-            <a:off x="194619" y="177284"/>
-            <a:ext cx="7034084" cy="461665"/>
+            <a:off x="194618" y="177284"/>
+            <a:ext cx="8592029" cy="584775"/>
           </a:xfrm>
           <a:prstGeom prst="rect">
             <a:avLst/>
@@ -6001,7 +6000,7 @@
           <a:p>
             <a:pPr algn="l"/>
             <a:r>
-              <a:rPr lang="pt-BR" sz="2400" dirty="0">
+              <a:rPr lang="pt-BR" sz="3200" dirty="0">
                 <a:solidFill>
                   <a:srgbClr val="FF0000"/>
                 </a:solidFill>
@@ -6224,7 +6223,7 @@
         <p:spPr>
           <a:xfrm>
             <a:off x="129872" y="194884"/>
-            <a:ext cx="8612660" cy="369332"/>
+            <a:ext cx="8612660" cy="400110"/>
           </a:xfrm>
           <a:prstGeom prst="rect">
             <a:avLst/>
@@ -6238,14 +6237,14 @@
           <a:lstStyle/>
           <a:p>
             <a:r>
-              <a:rPr lang="pt-BR" dirty="0" smtClean="0">
+              <a:rPr lang="pt-BR" sz="2000" dirty="0" smtClean="0">
                 <a:solidFill>
                   <a:srgbClr val="FF0000"/>
                 </a:solidFill>
               </a:rPr>
               <a:t>Segmentação</a:t>
             </a:r>
-            <a:endParaRPr lang="pt-BR" dirty="0">
+            <a:endParaRPr lang="pt-BR" sz="2000" dirty="0">
               <a:solidFill>
                 <a:srgbClr val="FF0000"/>
               </a:solidFill>
@@ -6268,7 +6267,7 @@
         <p:spPr>
           <a:xfrm>
             <a:off x="129872" y="959093"/>
-            <a:ext cx="11724671" cy="3693319"/>
+            <a:ext cx="11724671" cy="3970318"/>
           </a:xfrm>
           <a:prstGeom prst="rect">
             <a:avLst/>
@@ -6287,8 +6286,10 @@
             </a:r>
             <a:r>
               <a:rPr lang="pt-BR" dirty="0" smtClean="0"/>
-              <a:t>nas seguintes perguntas:</a:t>
-            </a:r>
+              <a:t>nas seguintes premissas:</a:t>
+            </a:r>
+          </a:p>
+          <a:p>
             <a:endParaRPr lang="pt-BR" dirty="0"/>
           </a:p>
           <a:p>
@@ -6297,7 +6298,7 @@
           <a:p>
             <a:r>
               <a:rPr lang="pt-BR" dirty="0" smtClean="0"/>
-              <a:t>Qual o propósito desta segmentação?</a:t>
+              <a:t>Objetivo:</a:t>
             </a:r>
           </a:p>
           <a:p>
@@ -6314,7 +6315,7 @@
             </a:r>
             <a:r>
               <a:rPr lang="pt-BR" dirty="0" smtClean="0"/>
-              <a:t>.</a:t>
+              <a:t>. Posteriormente este poderia ser um indicador de sucesso desta segmentação.</a:t>
             </a:r>
           </a:p>
           <a:p>
@@ -6326,7 +6327,7 @@
           <a:p>
             <a:r>
               <a:rPr lang="pt-BR" dirty="0" smtClean="0"/>
-              <a:t>Qual o critério de segmentação?</a:t>
+              <a:t>Critério:</a:t>
             </a:r>
           </a:p>
           <a:p>
@@ -6336,7 +6337,7 @@
             </a:r>
             <a:r>
               <a:rPr lang="pt-BR" dirty="0" smtClean="0"/>
-              <a:t>- Vemos segmentar o cliente com base no seu potencial de aumento de compra. Basicamente, queremos saber </a:t>
+              <a:t>- Vamos segmentar o cliente com base no seu potencial de aumento de compra. Basicamente, queremos saber </a:t>
             </a:r>
             <a:r>
               <a:rPr lang="pt-BR" b="1" dirty="0" smtClean="0"/>
@@ -6517,9 +6518,10 @@
               <a:buChar char="-"/>
             </a:pPr>
             <a:r>
-              <a:rPr lang="pt-BR" sz="2800" dirty="0"/>
-              <a:t>Insights</a:t>
-            </a:r>
+              <a:rPr lang="pt-BR" sz="2800" dirty="0" smtClean="0"/>
+              <a:t>Insights.</a:t>
+            </a:r>
+            <a:endParaRPr lang="pt-BR" sz="2800" dirty="0"/>
           </a:p>
           <a:p>
             <a:pPr algn="l"/>
@@ -6547,7 +6549,15 @@
             </a:pPr>
             <a:r>
               <a:rPr lang="pt-BR" sz="2800" dirty="0"/>
-              <a:t>Uma propostas de </a:t>
+              <a:t>Uma </a:t>
+            </a:r>
+            <a:r>
+              <a:rPr lang="pt-BR" sz="2800" dirty="0" smtClean="0"/>
+              <a:t>proposta </a:t>
+            </a:r>
+            <a:r>
+              <a:rPr lang="pt-BR" sz="2800" dirty="0"/>
+              <a:t>de </a:t>
             </a:r>
             <a:r>
               <a:rPr lang="pt-BR" sz="2800" dirty="0" smtClean="0"/>
@@ -6599,6 +6609,13 @@
   <p:clrMapOvr>
     <a:masterClrMapping/>
   </p:clrMapOvr>
+  <p:timing>
+    <p:tnLst>
+      <p:par>
+        <p:cTn id="1" dur="indefinite" restart="never" nodeType="tmRoot"/>
+      </p:par>
+    </p:tnLst>
+  </p:timing>
 </p:sld>
 </file>
 
@@ -6701,7 +6718,7 @@
         </p:nvSpPr>
         <p:spPr>
           <a:xfrm>
-            <a:off x="514578" y="4223338"/>
+            <a:off x="545471" y="4601710"/>
             <a:ext cx="4197200" cy="830997"/>
           </a:xfrm>
           <a:prstGeom prst="rect">
@@ -6738,7 +6755,7 @@
         <p:spPr>
           <a:xfrm>
             <a:off x="129872" y="194884"/>
-            <a:ext cx="8612660" cy="369332"/>
+            <a:ext cx="8612660" cy="400110"/>
           </a:xfrm>
           <a:prstGeom prst="rect">
             <a:avLst/>
@@ -6752,14 +6769,14 @@
           <a:lstStyle/>
           <a:p>
             <a:r>
-              <a:rPr lang="pt-BR" dirty="0" smtClean="0">
+              <a:rPr lang="pt-BR" sz="2000" dirty="0" smtClean="0">
                 <a:solidFill>
                   <a:srgbClr val="FF0000"/>
                 </a:solidFill>
               </a:rPr>
               <a:t>Segmentação – quantidade de filhos</a:t>
             </a:r>
-            <a:endParaRPr lang="pt-BR" dirty="0">
+            <a:endParaRPr lang="pt-BR" sz="2000" dirty="0">
               <a:solidFill>
                 <a:srgbClr val="FF0000"/>
               </a:solidFill>
@@ -6783,7 +6800,7 @@
         </p:blipFill>
         <p:spPr>
           <a:xfrm>
-            <a:off x="4795734" y="3537888"/>
+            <a:off x="4795734" y="3791809"/>
             <a:ext cx="6176809" cy="2626587"/>
           </a:xfrm>
           <a:prstGeom prst="rect">
@@ -6957,8 +6974,8 @@
         </p:nvSpPr>
         <p:spPr>
           <a:xfrm>
-            <a:off x="8221436" y="3737695"/>
-            <a:ext cx="1200150" cy="2226975"/>
+            <a:off x="8178778" y="3991614"/>
+            <a:ext cx="1200150" cy="2241020"/>
           </a:xfrm>
           <a:prstGeom prst="rect">
             <a:avLst/>
@@ -7011,7 +7028,7 @@
         </p:blipFill>
         <p:spPr>
           <a:xfrm>
-            <a:off x="9364231" y="2833050"/>
+            <a:off x="9378928" y="3132697"/>
             <a:ext cx="2827769" cy="571735"/>
           </a:xfrm>
           <a:prstGeom prst="rect">
@@ -7131,8 +7148,8 @@
         </p:nvSpPr>
         <p:spPr>
           <a:xfrm>
-            <a:off x="129872" y="194884"/>
-            <a:ext cx="8612660" cy="369332"/>
+            <a:off x="129872" y="163353"/>
+            <a:ext cx="8612660" cy="400110"/>
           </a:xfrm>
           <a:prstGeom prst="rect">
             <a:avLst/>
@@ -7146,14 +7163,14 @@
           <a:lstStyle/>
           <a:p>
             <a:r>
-              <a:rPr lang="pt-BR" dirty="0" smtClean="0">
+              <a:rPr lang="pt-BR" sz="2000" dirty="0" smtClean="0">
                 <a:solidFill>
                   <a:srgbClr val="FF0000"/>
                 </a:solidFill>
               </a:rPr>
               <a:t>Segmentação –  Renda</a:t>
             </a:r>
-            <a:endParaRPr lang="pt-BR" dirty="0">
+            <a:endParaRPr lang="pt-BR" sz="2000" dirty="0">
               <a:solidFill>
                 <a:srgbClr val="FF0000"/>
               </a:solidFill>
@@ -7177,8 +7194,8 @@
         </p:blipFill>
         <p:spPr>
           <a:xfrm>
-            <a:off x="2735641" y="2186481"/>
-            <a:ext cx="5838825" cy="2686050"/>
+            <a:off x="2090785" y="2186807"/>
+            <a:ext cx="6830524" cy="3142264"/>
           </a:xfrm>
           <a:prstGeom prst="rect">
             <a:avLst/>
@@ -7201,8 +7218,8 @@
         </p:blipFill>
         <p:spPr>
           <a:xfrm>
-            <a:off x="8502166" y="1875012"/>
-            <a:ext cx="2470377" cy="311795"/>
+            <a:off x="8502166" y="1801120"/>
+            <a:ext cx="3055837" cy="385688"/>
           </a:xfrm>
           <a:prstGeom prst="rect">
             <a:avLst/>
@@ -7321,8 +7338,8 @@
         </p:nvSpPr>
         <p:spPr>
           <a:xfrm>
-            <a:off x="129872" y="194884"/>
-            <a:ext cx="8612660" cy="369332"/>
+            <a:off x="129872" y="163353"/>
+            <a:ext cx="8612660" cy="400110"/>
           </a:xfrm>
           <a:prstGeom prst="rect">
             <a:avLst/>
@@ -7336,14 +7353,14 @@
           <a:lstStyle/>
           <a:p>
             <a:r>
-              <a:rPr lang="pt-BR" dirty="0" smtClean="0">
+              <a:rPr lang="pt-BR" sz="2000" dirty="0" smtClean="0">
                 <a:solidFill>
                   <a:srgbClr val="FF0000"/>
                 </a:solidFill>
               </a:rPr>
               <a:t>Segmentação</a:t>
             </a:r>
-            <a:endParaRPr lang="pt-BR" dirty="0">
+            <a:endParaRPr lang="pt-BR" sz="2000" dirty="0">
               <a:solidFill>
                 <a:srgbClr val="FF0000"/>
               </a:solidFill>
@@ -7496,8 +7513,8 @@
         </p:blipFill>
         <p:spPr>
           <a:xfrm>
-            <a:off x="5076767" y="2394929"/>
-            <a:ext cx="3752850" cy="2581275"/>
+            <a:off x="4993671" y="2474655"/>
+            <a:ext cx="4240858" cy="2916935"/>
           </a:xfrm>
           <a:prstGeom prst="rect">
             <a:avLst/>
@@ -7520,7 +7537,7 @@
         </p:blipFill>
         <p:spPr>
           <a:xfrm>
-            <a:off x="1798863" y="2744434"/>
+            <a:off x="1798863" y="2980927"/>
             <a:ext cx="1826079" cy="1715034"/>
           </a:xfrm>
           <a:prstGeom prst="rect">
@@ -7542,7 +7559,7 @@
         </p:nvSpPr>
         <p:spPr>
           <a:xfrm>
-            <a:off x="9193855" y="3167168"/>
+            <a:off x="9624779" y="3601951"/>
             <a:ext cx="2109863" cy="830997"/>
           </a:xfrm>
           <a:prstGeom prst="rect">
@@ -7578,7 +7595,7 @@
         </p:nvSpPr>
         <p:spPr>
           <a:xfrm rot="10800000">
-            <a:off x="8824625" y="3437784"/>
+            <a:off x="9234529" y="3933123"/>
             <a:ext cx="234256" cy="164167"/>
           </a:xfrm>
           <a:prstGeom prst="rightArrow">
@@ -7632,7 +7649,7 @@
         </p:nvSpPr>
         <p:spPr>
           <a:xfrm>
-            <a:off x="425685" y="4994538"/>
+            <a:off x="425685" y="5527372"/>
             <a:ext cx="4010517" cy="830997"/>
           </a:xfrm>
           <a:prstGeom prst="rect">
@@ -7686,7 +7703,7 @@
         </p:nvSpPr>
         <p:spPr>
           <a:xfrm rot="16200000">
-            <a:off x="2477646" y="4716855"/>
+            <a:off x="2512691" y="5029583"/>
             <a:ext cx="234256" cy="164167"/>
           </a:xfrm>
           <a:prstGeom prst="rightArrow">
@@ -7770,8 +7787,8 @@
         </p:nvSpPr>
         <p:spPr>
           <a:xfrm>
-            <a:off x="194619" y="177284"/>
-            <a:ext cx="7034084" cy="461665"/>
+            <a:off x="194619" y="145753"/>
+            <a:ext cx="7034084" cy="584775"/>
           </a:xfrm>
           <a:prstGeom prst="rect">
             <a:avLst/>
@@ -7785,7 +7802,7 @@
           <a:lstStyle/>
           <a:p>
             <a:r>
-              <a:rPr lang="pt-BR" sz="2400" dirty="0" smtClean="0">
+              <a:rPr lang="pt-BR" sz="3200" dirty="0" smtClean="0">
                 <a:solidFill>
                   <a:srgbClr val="FF0000"/>
                 </a:solidFill>
@@ -7793,14 +7810,14 @@
               <a:t>3. </a:t>
             </a:r>
             <a:r>
-              <a:rPr lang="pt-BR" sz="2400" dirty="0">
+              <a:rPr lang="pt-BR" sz="3200" dirty="0">
                 <a:solidFill>
                   <a:srgbClr val="FF0000"/>
                 </a:solidFill>
               </a:rPr>
               <a:t>Um modelo de classificação de clientes</a:t>
             </a:r>
-            <a:endParaRPr lang="pt-BR" sz="2400" dirty="0">
+            <a:endParaRPr lang="pt-BR" sz="3200" dirty="0">
               <a:solidFill>
                 <a:srgbClr val="FF0000"/>
               </a:solidFill>
@@ -8077,7 +8094,7 @@
         <p:spPr>
           <a:xfrm>
             <a:off x="129872" y="194884"/>
-            <a:ext cx="8612660" cy="369332"/>
+            <a:ext cx="8612660" cy="400110"/>
           </a:xfrm>
           <a:prstGeom prst="rect">
             <a:avLst/>
@@ -8091,14 +8108,14 @@
           <a:lstStyle/>
           <a:p>
             <a:r>
-              <a:rPr lang="pt-BR" dirty="0" smtClean="0">
+              <a:rPr lang="pt-BR" sz="2000" dirty="0" smtClean="0">
                 <a:solidFill>
                   <a:srgbClr val="FF0000"/>
                 </a:solidFill>
               </a:rPr>
               <a:t>Modelo de classificação</a:t>
             </a:r>
-            <a:endParaRPr lang="pt-BR" dirty="0">
+            <a:endParaRPr lang="pt-BR" sz="2000" dirty="0">
               <a:solidFill>
                 <a:srgbClr val="FF0000"/>
               </a:solidFill>
@@ -8114,8 +8131,8 @@
         </p:nvSpPr>
         <p:spPr>
           <a:xfrm>
-            <a:off x="129872" y="2123798"/>
-            <a:ext cx="4744208" cy="2308324"/>
+            <a:off x="129871" y="2123798"/>
+            <a:ext cx="7921053" cy="3046988"/>
           </a:xfrm>
           <a:prstGeom prst="rect">
             <a:avLst/>
@@ -8128,197 +8145,157 @@
           <a:lstStyle/>
           <a:p>
             <a:r>
-              <a:rPr lang="pt-BR" sz="1200" dirty="0" smtClean="0"/>
+              <a:rPr lang="pt-BR" sz="1600" dirty="0" smtClean="0"/>
               <a:t>As colunas preditoras (x) que melhor contribuíram para o modelo foram:</a:t>
             </a:r>
           </a:p>
           <a:p>
-            <a:endParaRPr lang="pt-BR" sz="1200" dirty="0"/>
-          </a:p>
-          <a:p>
-            <a:r>
-              <a:rPr lang="pt-BR" sz="1200" dirty="0" smtClean="0"/>
+            <a:endParaRPr lang="pt-BR" sz="1600" dirty="0"/>
+          </a:p>
+          <a:p>
+            <a:r>
+              <a:rPr lang="pt-BR" sz="1600" dirty="0" smtClean="0"/>
               <a:t>'</a:t>
             </a:r>
             <a:r>
-              <a:rPr lang="pt-BR" sz="1200" dirty="0" err="1" smtClean="0"/>
+              <a:rPr lang="pt-BR" sz="1600" dirty="0" err="1" smtClean="0"/>
               <a:t>Recency</a:t>
             </a:r>
             <a:r>
-              <a:rPr lang="pt-BR" sz="1200" dirty="0" smtClean="0"/>
-              <a:t>‘  - </a:t>
-            </a:r>
-            <a:r>
-              <a:rPr lang="pt-BR" sz="1200" dirty="0" err="1" smtClean="0"/>
-              <a:t>Qtde</a:t>
-            </a:r>
-            <a:r>
-              <a:rPr lang="pt-BR" sz="1200" dirty="0" smtClean="0"/>
-              <a:t> de dias desde a última compra</a:t>
-            </a:r>
-          </a:p>
-          <a:p>
-            <a:r>
-              <a:rPr lang="pt-BR" sz="1200" dirty="0" smtClean="0"/>
+              <a:rPr lang="pt-BR" sz="1600" dirty="0" smtClean="0"/>
+              <a:t>‘  - Qtde de dias desde a última compra</a:t>
+            </a:r>
+          </a:p>
+          <a:p>
+            <a:r>
+              <a:rPr lang="pt-BR" sz="1600" dirty="0" smtClean="0"/>
               <a:t>'</a:t>
             </a:r>
             <a:r>
-              <a:rPr lang="pt-BR" sz="1200" dirty="0" err="1" smtClean="0"/>
+              <a:rPr lang="pt-BR" sz="1600" dirty="0" err="1" smtClean="0"/>
               <a:t>MntTotal</a:t>
             </a:r>
             <a:r>
-              <a:rPr lang="pt-BR" sz="1200" dirty="0" smtClean="0"/>
+              <a:rPr lang="pt-BR" sz="1600" dirty="0" smtClean="0"/>
               <a:t>‘ – Receita </a:t>
             </a:r>
           </a:p>
           <a:p>
             <a:r>
-              <a:rPr lang="pt-BR" sz="1200" dirty="0" smtClean="0"/>
+              <a:rPr lang="pt-BR" sz="1600" dirty="0" smtClean="0"/>
               <a:t>'</a:t>
             </a:r>
             <a:r>
-              <a:rPr lang="pt-BR" sz="1200" dirty="0" err="1" smtClean="0"/>
+              <a:rPr lang="pt-BR" sz="1600" dirty="0" err="1" smtClean="0"/>
               <a:t>Income</a:t>
             </a:r>
             <a:r>
-              <a:rPr lang="pt-BR" sz="1200" dirty="0" smtClean="0"/>
+              <a:rPr lang="pt-BR" sz="1600" dirty="0" smtClean="0"/>
               <a:t>‘ – Renda </a:t>
             </a:r>
           </a:p>
           <a:p>
             <a:r>
-              <a:rPr lang="pt-BR" sz="1200" dirty="0" smtClean="0"/>
+              <a:rPr lang="pt-BR" sz="1600" dirty="0" smtClean="0"/>
               <a:t>'Education_2n </a:t>
             </a:r>
             <a:r>
-              <a:rPr lang="pt-BR" sz="1200" dirty="0" err="1" smtClean="0"/>
+              <a:rPr lang="pt-BR" sz="1600" dirty="0" err="1" smtClean="0"/>
               <a:t>Cycle</a:t>
             </a:r>
             <a:r>
-              <a:rPr lang="pt-BR" sz="1200" dirty="0" smtClean="0"/>
+              <a:rPr lang="pt-BR" sz="1600" dirty="0" smtClean="0"/>
               <a:t>‘</a:t>
             </a:r>
           </a:p>
           <a:p>
             <a:r>
-              <a:rPr lang="pt-BR" sz="1200" dirty="0" smtClean="0"/>
+              <a:rPr lang="pt-BR" sz="1600" dirty="0" smtClean="0"/>
               <a:t>‘</a:t>
             </a:r>
             <a:r>
-              <a:rPr lang="pt-BR" sz="1200" dirty="0" err="1" smtClean="0"/>
+              <a:rPr lang="pt-BR" sz="1600" dirty="0" err="1" smtClean="0"/>
               <a:t>Education_Master</a:t>
             </a:r>
             <a:r>
-              <a:rPr lang="pt-BR" sz="1200" dirty="0" smtClean="0"/>
-              <a:t>‘         Educação (</a:t>
-            </a:r>
-            <a:r>
-              <a:rPr lang="pt-BR" sz="1200" dirty="0" err="1" smtClean="0"/>
-              <a:t>dummy</a:t>
-            </a:r>
-            <a:r>
-              <a:rPr lang="pt-BR" sz="1200" dirty="0" smtClean="0"/>
+              <a:rPr lang="pt-BR" sz="1600" dirty="0" smtClean="0"/>
+              <a:t>‘          Educação (dummy columns)</a:t>
+            </a:r>
+          </a:p>
+          <a:p>
+            <a:r>
+              <a:rPr lang="pt-BR" sz="1600" dirty="0" smtClean="0"/>
+              <a:t>'</a:t>
+            </a:r>
+            <a:r>
+              <a:rPr lang="pt-BR" sz="1600" dirty="0" err="1" smtClean="0"/>
+              <a:t>Education_PhD</a:t>
+            </a:r>
+            <a:r>
+              <a:rPr lang="pt-BR" sz="1600" dirty="0" smtClean="0"/>
+              <a:t>'</a:t>
+            </a:r>
+          </a:p>
+          <a:p>
+            <a:r>
+              <a:rPr lang="pt-BR" sz="1600" dirty="0" smtClean="0"/>
               <a:t> </a:t>
             </a:r>
             <a:r>
-              <a:rPr lang="pt-BR" sz="1200" dirty="0" err="1" smtClean="0"/>
-              <a:t>coluns</a:t>
-            </a:r>
-            <a:r>
-              <a:rPr lang="pt-BR" sz="1200" dirty="0" smtClean="0"/>
-              <a:t>)</a:t>
-            </a:r>
-          </a:p>
-          <a:p>
-            <a:r>
-              <a:rPr lang="pt-BR" sz="1200" dirty="0" smtClean="0"/>
+              <a:rPr lang="pt-BR" sz="1600" dirty="0"/>
               <a:t>'</a:t>
             </a:r>
             <a:r>
-              <a:rPr lang="pt-BR" sz="1200" dirty="0" err="1" smtClean="0"/>
-              <a:t>Education_PhD</a:t>
-            </a:r>
-            <a:r>
-              <a:rPr lang="pt-BR" sz="1200" dirty="0" smtClean="0"/>
+              <a:rPr lang="pt-BR" sz="1600" dirty="0" err="1"/>
+              <a:t>Marital_Status_Divorced</a:t>
+            </a:r>
+            <a:r>
+              <a:rPr lang="pt-BR" sz="1600" dirty="0" smtClean="0"/>
+              <a:t>',</a:t>
+            </a:r>
+          </a:p>
+          <a:p>
+            <a:r>
+              <a:rPr lang="pt-BR" sz="1600" dirty="0" smtClean="0"/>
               <a:t>'</a:t>
             </a:r>
-          </a:p>
-          <a:p>
-            <a:r>
-              <a:rPr lang="pt-BR" sz="1200" dirty="0" smtClean="0"/>
-              <a:t> </a:t>
-            </a:r>
-            <a:r>
-              <a:rPr lang="pt-BR" sz="1200" dirty="0"/>
+            <a:r>
+              <a:rPr lang="pt-BR" sz="1600" dirty="0" err="1" smtClean="0"/>
+              <a:t>Marital_Status_Married</a:t>
+            </a:r>
+            <a:r>
+              <a:rPr lang="pt-BR" sz="1600" dirty="0" smtClean="0"/>
+              <a:t>‘         Estado civil (dummy columns)</a:t>
+            </a:r>
+          </a:p>
+          <a:p>
+            <a:r>
+              <a:rPr lang="pt-BR" sz="1600" dirty="0" smtClean="0"/>
               <a:t>'</a:t>
             </a:r>
             <a:r>
-              <a:rPr lang="pt-BR" sz="1200" dirty="0" err="1"/>
-              <a:t>Marital_Status_Divorced</a:t>
-            </a:r>
-            <a:r>
-              <a:rPr lang="pt-BR" sz="1200" dirty="0" smtClean="0"/>
-              <a:t>',</a:t>
-            </a:r>
-          </a:p>
-          <a:p>
-            <a:r>
-              <a:rPr lang="pt-BR" sz="1200" dirty="0" smtClean="0"/>
+              <a:rPr lang="pt-BR" sz="1600" dirty="0" err="1" smtClean="0"/>
+              <a:t>Marital_Status_Single</a:t>
+            </a:r>
+            <a:r>
+              <a:rPr lang="pt-BR" sz="1600" dirty="0" smtClean="0"/>
               <a:t>'</a:t>
             </a:r>
-            <a:r>
-              <a:rPr lang="pt-BR" sz="1200" dirty="0" err="1" smtClean="0"/>
-              <a:t>Marital_Status_Married</a:t>
-            </a:r>
-            <a:r>
-              <a:rPr lang="pt-BR" sz="1200" dirty="0" smtClean="0"/>
-              <a:t>‘         Estado civil (</a:t>
-            </a:r>
-            <a:r>
-              <a:rPr lang="pt-BR" sz="1200" dirty="0" err="1" smtClean="0"/>
-              <a:t>dummy</a:t>
-            </a:r>
-            <a:r>
-              <a:rPr lang="pt-BR" sz="1200" dirty="0" smtClean="0"/>
-              <a:t> </a:t>
-            </a:r>
-            <a:r>
-              <a:rPr lang="pt-BR" sz="1200" dirty="0" err="1" smtClean="0"/>
-              <a:t>columns</a:t>
-            </a:r>
-            <a:r>
-              <a:rPr lang="pt-BR" sz="1200" dirty="0" smtClean="0"/>
-              <a:t>)</a:t>
-            </a:r>
-          </a:p>
-          <a:p>
-            <a:r>
-              <a:rPr lang="pt-BR" sz="1200" dirty="0" smtClean="0"/>
+          </a:p>
+          <a:p>
+            <a:r>
+              <a:rPr lang="pt-BR" sz="1600" dirty="0" smtClean="0"/>
               <a:t>'</a:t>
             </a:r>
             <a:r>
-              <a:rPr lang="pt-BR" sz="1200" dirty="0" err="1" smtClean="0"/>
-              <a:t>Marital_Status_Single</a:t>
-            </a:r>
-            <a:r>
-              <a:rPr lang="pt-BR" sz="1200" dirty="0" smtClean="0"/>
-              <a:t>'</a:t>
-            </a:r>
-          </a:p>
-          <a:p>
-            <a:r>
-              <a:rPr lang="pt-BR" sz="1200" dirty="0" smtClean="0"/>
-              <a:t>'</a:t>
-            </a:r>
-            <a:r>
-              <a:rPr lang="pt-BR" sz="1200" dirty="0" err="1" smtClean="0"/>
+              <a:rPr lang="pt-BR" sz="1600" dirty="0" err="1" smtClean="0"/>
               <a:t>AcceptedTotalFirstFiveCmps</a:t>
             </a:r>
             <a:r>
-              <a:rPr lang="pt-BR" sz="1200" dirty="0" smtClean="0"/>
-              <a:t>‘ – Quantas campanhas o cliente respondeu</a:t>
-            </a:r>
-            <a:endParaRPr lang="pt-BR" sz="1200" dirty="0"/>
+              <a:rPr lang="pt-BR" sz="1600" dirty="0" smtClean="0"/>
+              <a:t>‘ –  Quantas campanhas o cliente respondeu</a:t>
+            </a:r>
+            <a:endParaRPr lang="pt-BR" sz="1600" dirty="0"/>
           </a:p>
         </p:txBody>
       </p:sp>
@@ -8330,8 +8307,8 @@
         </p:nvSpPr>
         <p:spPr>
           <a:xfrm>
-            <a:off x="1910443" y="3633106"/>
-            <a:ext cx="81643" cy="473527"/>
+            <a:off x="2456981" y="4101850"/>
+            <a:ext cx="54992" cy="774950"/>
           </a:xfrm>
           <a:prstGeom prst="rightBrace">
             <a:avLst/>
@@ -8373,8 +8350,8 @@
         </p:nvSpPr>
         <p:spPr>
           <a:xfrm>
-            <a:off x="1532164" y="3037114"/>
-            <a:ext cx="108857" cy="481693"/>
+            <a:off x="1984109" y="3352287"/>
+            <a:ext cx="107449" cy="749563"/>
           </a:xfrm>
           <a:prstGeom prst="rightBrace">
             <a:avLst/>
@@ -8484,8 +8461,8 @@
         </p:nvSpPr>
         <p:spPr>
           <a:xfrm>
-            <a:off x="129872" y="194884"/>
-            <a:ext cx="8612660" cy="369332"/>
+            <a:off x="129872" y="163353"/>
+            <a:ext cx="8612660" cy="400110"/>
           </a:xfrm>
           <a:prstGeom prst="rect">
             <a:avLst/>
@@ -8499,14 +8476,14 @@
           <a:lstStyle/>
           <a:p>
             <a:r>
-              <a:rPr lang="pt-BR" dirty="0" smtClean="0">
+              <a:rPr lang="pt-BR" sz="2000" dirty="0" smtClean="0">
                 <a:solidFill>
                   <a:srgbClr val="FF0000"/>
                 </a:solidFill>
               </a:rPr>
               <a:t>Modelo de classificação - resultados</a:t>
             </a:r>
-            <a:endParaRPr lang="pt-BR" dirty="0">
+            <a:endParaRPr lang="pt-BR" sz="2000" dirty="0">
               <a:solidFill>
                 <a:srgbClr val="FF0000"/>
               </a:solidFill>
@@ -8522,7 +8499,7 @@
         </p:nvSpPr>
         <p:spPr>
           <a:xfrm>
-            <a:off x="4732698" y="2895595"/>
+            <a:off x="4321912" y="2691101"/>
             <a:ext cx="1365758" cy="369332"/>
           </a:xfrm>
           <a:prstGeom prst="rect">
@@ -8685,8 +8662,8 @@
         </p:blipFill>
         <p:spPr>
           <a:xfrm>
-            <a:off x="3596302" y="3216464"/>
-            <a:ext cx="3638550" cy="2324100"/>
+            <a:off x="2774730" y="2941858"/>
+            <a:ext cx="4460121" cy="2848873"/>
           </a:xfrm>
           <a:prstGeom prst="rect">
             <a:avLst/>
@@ -8853,7 +8830,7 @@
           <a:p>
             <a:r>
               <a:rPr lang="pt-BR" sz="1600" dirty="0" smtClean="0"/>
-              <a:t>Porém, a quantidade de clientes caiu bastante (~65%).</a:t>
+              <a:t>Porém, a quantidade de clientes caiu bastante (~60%).</a:t>
             </a:r>
             <a:endParaRPr lang="pt-BR" sz="1600" dirty="0"/>
           </a:p>
@@ -8927,7 +8904,7 @@
         </p:nvSpPr>
         <p:spPr>
           <a:xfrm>
-            <a:off x="5797837" y="3319167"/>
+            <a:off x="4841395" y="3403250"/>
             <a:ext cx="6007719" cy="1754326"/>
           </a:xfrm>
           <a:prstGeom prst="rect">
@@ -8974,8 +8951,8 @@
         </p:blipFill>
         <p:spPr>
           <a:xfrm>
-            <a:off x="295955" y="2445204"/>
-            <a:ext cx="3648075" cy="3028950"/>
+            <a:off x="546389" y="2308153"/>
+            <a:ext cx="4015101" cy="3333687"/>
           </a:xfrm>
           <a:prstGeom prst="rect">
             <a:avLst/>
@@ -9113,8 +9090,8 @@
         </p:nvSpPr>
         <p:spPr>
           <a:xfrm>
-            <a:off x="129872" y="194884"/>
-            <a:ext cx="8612660" cy="369332"/>
+            <a:off x="129872" y="163353"/>
+            <a:ext cx="8612660" cy="400110"/>
           </a:xfrm>
           <a:prstGeom prst="rect">
             <a:avLst/>
@@ -9128,14 +9105,14 @@
           <a:lstStyle/>
           <a:p>
             <a:r>
-              <a:rPr lang="pt-BR" dirty="0" smtClean="0">
+              <a:rPr lang="pt-BR" sz="2000" dirty="0" smtClean="0">
                 <a:solidFill>
                   <a:srgbClr val="FF0000"/>
                 </a:solidFill>
               </a:rPr>
               <a:t>Otimização do lucro</a:t>
             </a:r>
-            <a:endParaRPr lang="pt-BR" dirty="0">
+            <a:endParaRPr lang="pt-BR" sz="2000" dirty="0">
               <a:solidFill>
                 <a:srgbClr val="FF0000"/>
               </a:solidFill>
@@ -9151,7 +9128,7 @@
         </p:nvSpPr>
         <p:spPr>
           <a:xfrm>
-            <a:off x="4964824" y="2816608"/>
+            <a:off x="4824248" y="3026815"/>
             <a:ext cx="6007719" cy="2031325"/>
           </a:xfrm>
           <a:prstGeom prst="rect">
@@ -9226,8 +9203,8 @@
         </p:blipFill>
         <p:spPr>
           <a:xfrm>
-            <a:off x="603643" y="2344474"/>
-            <a:ext cx="3705225" cy="3028950"/>
+            <a:off x="551091" y="2008142"/>
+            <a:ext cx="4273157" cy="3493223"/>
           </a:xfrm>
           <a:prstGeom prst="rect">
             <a:avLst/>
@@ -9310,8 +9287,8 @@
         </p:nvSpPr>
         <p:spPr>
           <a:xfrm>
-            <a:off x="129872" y="194884"/>
-            <a:ext cx="8612660" cy="369332"/>
+            <a:off x="129872" y="163353"/>
+            <a:ext cx="8612660" cy="400110"/>
           </a:xfrm>
           <a:prstGeom prst="rect">
             <a:avLst/>
@@ -9325,14 +9302,14 @@
           <a:lstStyle/>
           <a:p>
             <a:r>
-              <a:rPr lang="pt-BR" dirty="0" smtClean="0">
+              <a:rPr lang="pt-BR" sz="2000" dirty="0" smtClean="0">
                 <a:solidFill>
                   <a:srgbClr val="FF0000"/>
                 </a:solidFill>
               </a:rPr>
               <a:t>Otimização do lucro</a:t>
             </a:r>
-            <a:endParaRPr lang="pt-BR" dirty="0">
+            <a:endParaRPr lang="pt-BR" sz="2000" dirty="0">
               <a:solidFill>
                 <a:srgbClr val="FF0000"/>
               </a:solidFill>
@@ -9404,8 +9381,8 @@
         </p:blipFill>
         <p:spPr>
           <a:xfrm>
-            <a:off x="2255657" y="2040162"/>
-            <a:ext cx="2180545" cy="4539094"/>
+            <a:off x="2102377" y="1765738"/>
+            <a:ext cx="2375030" cy="4943939"/>
           </a:xfrm>
           <a:prstGeom prst="rect">
             <a:avLst/>
@@ -9428,8 +9405,8 @@
         </p:blipFill>
         <p:spPr>
           <a:xfrm>
-            <a:off x="4629152" y="2040162"/>
-            <a:ext cx="3965800" cy="4561631"/>
+            <a:off x="4771697" y="1762841"/>
+            <a:ext cx="4300690" cy="4946836"/>
           </a:xfrm>
           <a:prstGeom prst="rect">
             <a:avLst/>
@@ -9490,7 +9467,7 @@
         </p:blipFill>
         <p:spPr>
           <a:xfrm>
-            <a:off x="4841164" y="3151597"/>
+            <a:off x="10979205" y="6010301"/>
             <a:ext cx="1075295" cy="731201"/>
           </a:xfrm>
           <a:prstGeom prst="rect">
@@ -9512,8 +9489,8 @@
         </p:nvSpPr>
         <p:spPr>
           <a:xfrm>
-            <a:off x="4498522" y="2505266"/>
-            <a:ext cx="1959428" cy="646331"/>
+            <a:off x="4698217" y="2747005"/>
+            <a:ext cx="3047907" cy="830997"/>
           </a:xfrm>
           <a:prstGeom prst="rect">
             <a:avLst/>
@@ -9527,58 +9504,14 @@
           <a:lstStyle/>
           <a:p>
             <a:r>
-              <a:rPr lang="pt-BR" sz="3600" dirty="0" smtClean="0">
+              <a:rPr lang="pt-BR" sz="4800" dirty="0" smtClean="0">
                 <a:solidFill>
                   <a:srgbClr val="FF0000"/>
                 </a:solidFill>
               </a:rPr>
               <a:t>Dúvidas?</a:t>
             </a:r>
-            <a:endParaRPr lang="pt-BR" sz="3600" dirty="0">
-              <a:solidFill>
-                <a:srgbClr val="FF0000"/>
-              </a:solidFill>
-            </a:endParaRPr>
-          </a:p>
-        </p:txBody>
-      </p:sp>
-      <p:sp>
-        <p:nvSpPr>
-          <p:cNvPr id="6" name="CaixaDeTexto 5">
-            <a:extLst>
-              <a:ext uri="{FF2B5EF4-FFF2-40B4-BE49-F238E27FC236}">
-                <a16:creationId xmlns:a16="http://schemas.microsoft.com/office/drawing/2014/main" xmlns="" id="{FB1A0CF8-D220-44EE-A5AC-E5B5791D84CF}"/>
-              </a:ext>
-            </a:extLst>
-          </p:cNvPr>
-          <p:cNvSpPr txBox="1"/>
-          <p:nvPr/>
-        </p:nvSpPr>
-        <p:spPr>
-          <a:xfrm>
-            <a:off x="4408715" y="3797928"/>
-            <a:ext cx="2139042" cy="646331"/>
-          </a:xfrm>
-          <a:prstGeom prst="rect">
-            <a:avLst/>
-          </a:prstGeom>
-          <a:noFill/>
-        </p:spPr>
-        <p:txBody>
-          <a:bodyPr wrap="square" rtlCol="0">
-            <a:spAutoFit/>
-          </a:bodyPr>
-          <a:lstStyle/>
-          <a:p>
-            <a:r>
-              <a:rPr lang="pt-BR" sz="3600" dirty="0" smtClean="0">
-                <a:solidFill>
-                  <a:srgbClr val="FF0000"/>
-                </a:solidFill>
-              </a:rPr>
-              <a:t>Obrigado!</a:t>
-            </a:r>
-            <a:endParaRPr lang="pt-BR" sz="3600" dirty="0">
+            <a:endParaRPr lang="pt-BR" sz="4800" dirty="0">
               <a:solidFill>
                 <a:srgbClr val="FF0000"/>
               </a:solidFill>
@@ -9631,7 +9564,7 @@
         <p:spPr>
           <a:xfrm>
             <a:off x="194619" y="177284"/>
-            <a:ext cx="7034084" cy="830997"/>
+            <a:ext cx="7034084" cy="1077218"/>
           </a:xfrm>
           <a:prstGeom prst="rect">
             <a:avLst/>
@@ -9648,7 +9581,7 @@
               <a:buAutoNum type="arabicPeriod"/>
             </a:pPr>
             <a:r>
-              <a:rPr lang="pt-BR" sz="2400" dirty="0">
+              <a:rPr lang="pt-BR" sz="3200" dirty="0">
                 <a:solidFill>
                   <a:srgbClr val="FF0000"/>
                 </a:solidFill>
@@ -9660,7 +9593,7 @@
             <a:pPr marL="457200" indent="-457200" algn="l">
               <a:buAutoNum type="arabicPeriod"/>
             </a:pPr>
-            <a:endParaRPr lang="pt-BR" sz="2400" dirty="0">
+            <a:endParaRPr lang="pt-BR" sz="3200" dirty="0">
               <a:solidFill>
                 <a:srgbClr val="FF0000"/>
               </a:solidFill>
@@ -9801,6 +9734,13 @@
   <p:clrMapOvr>
     <a:masterClrMapping/>
   </p:clrMapOvr>
+  <p:timing>
+    <p:tnLst>
+      <p:par>
+        <p:cTn id="1" dur="indefinite" restart="never" nodeType="tmRoot"/>
+      </p:par>
+    </p:tnLst>
+  </p:timing>
 </p:sld>
 </file>
 
@@ -9836,7 +9776,7 @@
         <p:spPr>
           <a:xfrm>
             <a:off x="129872" y="194884"/>
-            <a:ext cx="8612660" cy="369332"/>
+            <a:ext cx="8612660" cy="400110"/>
           </a:xfrm>
           <a:prstGeom prst="rect">
             <a:avLst/>
@@ -9850,7 +9790,7 @@
           <a:lstStyle/>
           <a:p>
             <a:r>
-              <a:rPr lang="pt-BR" dirty="0">
+              <a:rPr lang="pt-BR" sz="2000" dirty="0">
                 <a:solidFill>
                   <a:srgbClr val="FF0000"/>
                 </a:solidFill>
@@ -10003,6 +9943,13 @@
   <p:clrMapOvr>
     <a:masterClrMapping/>
   </p:clrMapOvr>
+  <p:timing>
+    <p:tnLst>
+      <p:par>
+        <p:cTn id="1" dur="indefinite" restart="never" nodeType="tmRoot"/>
+      </p:par>
+    </p:tnLst>
+  </p:timing>
 </p:sld>
 </file>
 
@@ -10037,7 +9984,7 @@
         </p:nvSpPr>
         <p:spPr>
           <a:xfrm flipH="1">
-            <a:off x="4719326" y="1248932"/>
+            <a:off x="5171721" y="1758204"/>
             <a:ext cx="6996424" cy="369332"/>
           </a:xfrm>
           <a:prstGeom prst="rect">
@@ -10072,7 +10019,7 @@
         </p:nvSpPr>
         <p:spPr>
           <a:xfrm flipH="1">
-            <a:off x="4917545" y="5609068"/>
+            <a:off x="5571820" y="5448719"/>
             <a:ext cx="4896984" cy="369332"/>
           </a:xfrm>
           <a:prstGeom prst="rect">
@@ -10107,7 +10054,7 @@
         </p:nvSpPr>
         <p:spPr>
           <a:xfrm flipH="1">
-            <a:off x="4201275" y="3263644"/>
+            <a:off x="3666585" y="3544317"/>
             <a:ext cx="3010272" cy="369332"/>
           </a:xfrm>
           <a:prstGeom prst="rect">
@@ -10174,8 +10121,8 @@
         </p:nvSpPr>
         <p:spPr>
           <a:xfrm>
-            <a:off x="129872" y="194884"/>
-            <a:ext cx="8612660" cy="369332"/>
+            <a:off x="129872" y="163353"/>
+            <a:ext cx="8612660" cy="400110"/>
           </a:xfrm>
           <a:prstGeom prst="rect">
             <a:avLst/>
@@ -10189,7 +10136,7 @@
           <a:lstStyle/>
           <a:p>
             <a:r>
-              <a:rPr lang="pt-BR" dirty="0">
+              <a:rPr lang="pt-BR" sz="2000" dirty="0">
                 <a:solidFill>
                   <a:srgbClr val="FF0000"/>
                 </a:solidFill>
@@ -10221,8 +10168,8 @@
         </p:blipFill>
         <p:spPr>
           <a:xfrm>
-            <a:off x="169024" y="665102"/>
-            <a:ext cx="4484619" cy="1909049"/>
+            <a:off x="162359" y="935421"/>
+            <a:ext cx="4962739" cy="2112579"/>
           </a:xfrm>
           <a:prstGeom prst="rect">
             <a:avLst/>
@@ -10243,16 +10190,15 @@
           </p:cNvPicPr>
           <p:nvPr/>
         </p:nvPicPr>
-        <p:blipFill>
+        <p:blipFill rotWithShape="1">
           <a:blip r:embed="rId4"/>
-          <a:stretch>
-            <a:fillRect/>
-          </a:stretch>
+          <a:srcRect l="3828" b="398"/>
+          <a:stretch/>
         </p:blipFill>
         <p:spPr>
           <a:xfrm>
-            <a:off x="6997802" y="2520508"/>
-            <a:ext cx="4896985" cy="1988579"/>
+            <a:off x="6640906" y="2623853"/>
+            <a:ext cx="5406932" cy="2273968"/>
           </a:xfrm>
           <a:prstGeom prst="rect">
             <a:avLst/>
@@ -10281,8 +10227,8 @@
         </p:blipFill>
         <p:spPr>
           <a:xfrm>
-            <a:off x="129872" y="4853326"/>
-            <a:ext cx="4787673" cy="1682155"/>
+            <a:off x="129871" y="4721917"/>
+            <a:ext cx="5188363" cy="1822937"/>
           </a:xfrm>
           <a:prstGeom prst="rect">
             <a:avLst/>
@@ -10299,6 +10245,13 @@
   <p:clrMapOvr>
     <a:masterClrMapping/>
   </p:clrMapOvr>
+  <p:timing>
+    <p:tnLst>
+      <p:par>
+        <p:cTn id="1" dur="indefinite" restart="never" nodeType="tmRoot"/>
+      </p:par>
+    </p:tnLst>
+  </p:timing>
 </p:sld>
 </file>
 
@@ -10461,8 +10414,8 @@
         </p:nvSpPr>
         <p:spPr>
           <a:xfrm>
-            <a:off x="129872" y="194884"/>
-            <a:ext cx="8612660" cy="369332"/>
+            <a:off x="129872" y="163353"/>
+            <a:ext cx="8612660" cy="400110"/>
           </a:xfrm>
           <a:prstGeom prst="rect">
             <a:avLst/>
@@ -10476,7 +10429,7 @@
           <a:lstStyle/>
           <a:p>
             <a:r>
-              <a:rPr lang="pt-BR" dirty="0">
+              <a:rPr lang="pt-BR" sz="2000" dirty="0">
                 <a:solidFill>
                   <a:srgbClr val="FF0000"/>
                 </a:solidFill>
@@ -10515,9 +10468,10 @@
           <a:lstStyle/>
           <a:p>
             <a:r>
-              <a:rPr lang="pt-BR" dirty="0"/>
-              <a:t>Renda</a:t>
-            </a:r>
+              <a:rPr lang="pt-BR" dirty="0" smtClean="0"/>
+              <a:t>Renda total</a:t>
+            </a:r>
+            <a:endParaRPr lang="pt-BR" dirty="0"/>
           </a:p>
         </p:txBody>
       </p:sp>
@@ -10531,6 +10485,13 @@
   <p:clrMapOvr>
     <a:masterClrMapping/>
   </p:clrMapOvr>
+  <p:timing>
+    <p:tnLst>
+      <p:par>
+        <p:cTn id="1" dur="indefinite" restart="never" nodeType="tmRoot"/>
+      </p:par>
+    </p:tnLst>
+  </p:timing>
 </p:sld>
 </file>
 
@@ -10573,8 +10534,8 @@
         </p:blipFill>
         <p:spPr>
           <a:xfrm>
-            <a:off x="2246388" y="1856164"/>
-            <a:ext cx="6801297" cy="2438912"/>
+            <a:off x="2283872" y="1803611"/>
+            <a:ext cx="7163207" cy="2568691"/>
           </a:xfrm>
           <a:prstGeom prst="rect">
             <a:avLst/>
@@ -10704,7 +10665,7 @@
         <p:spPr>
           <a:xfrm>
             <a:off x="129872" y="194884"/>
-            <a:ext cx="8612660" cy="369332"/>
+            <a:ext cx="8612660" cy="400110"/>
           </a:xfrm>
           <a:prstGeom prst="rect">
             <a:avLst/>
@@ -10718,13 +10679,59 @@
           <a:lstStyle/>
           <a:p>
             <a:r>
-              <a:rPr lang="pt-BR" dirty="0">
+              <a:rPr lang="pt-BR" sz="2000" dirty="0">
                 <a:solidFill>
                   <a:srgbClr val="FF0000"/>
                 </a:solidFill>
               </a:rPr>
               <a:t>Relação Cliente X Empresa</a:t>
             </a:r>
+          </a:p>
+        </p:txBody>
+      </p:sp>
+      <p:sp>
+        <p:nvSpPr>
+          <p:cNvPr id="2" name="Retângulo 1"/>
+          <p:cNvSpPr/>
+          <p:nvPr/>
+        </p:nvSpPr>
+        <p:spPr>
+          <a:xfrm>
+            <a:off x="6117020" y="2754605"/>
+            <a:ext cx="252249" cy="440540"/>
+          </a:xfrm>
+          <a:prstGeom prst="rect">
+            <a:avLst/>
+          </a:prstGeom>
+          <a:solidFill>
+            <a:schemeClr val="bg1"/>
+          </a:solidFill>
+          <a:ln>
+            <a:noFill/>
+          </a:ln>
+        </p:spPr>
+        <p:style>
+          <a:lnRef idx="2">
+            <a:schemeClr val="accent1">
+              <a:shade val="50000"/>
+            </a:schemeClr>
+          </a:lnRef>
+          <a:fillRef idx="1">
+            <a:schemeClr val="accent1"/>
+          </a:fillRef>
+          <a:effectRef idx="0">
+            <a:schemeClr val="accent1"/>
+          </a:effectRef>
+          <a:fontRef idx="minor">
+            <a:schemeClr val="lt1"/>
+          </a:fontRef>
+        </p:style>
+        <p:txBody>
+          <a:bodyPr rtlCol="0" anchor="ctr"/>
+          <a:lstStyle/>
+          <a:p>
+            <a:pPr algn="ctr"/>
+            <a:endParaRPr lang="pt-BR"/>
           </a:p>
         </p:txBody>
       </p:sp>
@@ -10826,7 +10833,15 @@
           <a:p>
             <a:r>
               <a:rPr lang="pt-BR" sz="1600" dirty="0"/>
-              <a:t>torno de 12,5 compras (se não considerarmos a data do cadastro do cliente), ou seja, uma compra a cada dois meses. Quando aberto por canal, a frequência é ainda menor.</a:t>
+              <a:t>torno de 12,5 </a:t>
+            </a:r>
+            <a:r>
+              <a:rPr lang="pt-BR" sz="1600" dirty="0" smtClean="0"/>
+              <a:t>(</a:t>
+            </a:r>
+            <a:r>
+              <a:rPr lang="pt-BR" sz="1600" dirty="0"/>
+              <a:t>se não considerarmos a data do cadastro do cliente), ou seja, uma compra a cada dois meses. Quando aberto por canal, a frequência é ainda menor.</a:t>
             </a:r>
           </a:p>
           <a:p>
@@ -10858,7 +10873,7 @@
         </p:nvSpPr>
         <p:spPr>
           <a:xfrm>
-            <a:off x="129872" y="728920"/>
+            <a:off x="129872" y="686880"/>
             <a:ext cx="8612660" cy="369332"/>
           </a:xfrm>
           <a:prstGeom prst="rect">
@@ -10873,8 +10888,12 @@
           <a:lstStyle/>
           <a:p>
             <a:r>
+              <a:rPr lang="pt-BR" dirty="0" smtClean="0"/>
+              <a:t>Total de </a:t>
+            </a:r>
+            <a:r>
               <a:rPr lang="pt-BR" dirty="0"/>
-              <a:t>Número de compras</a:t>
+              <a:t>compras</a:t>
             </a:r>
           </a:p>
         </p:txBody>
@@ -10953,8 +10972,8 @@
         </p:nvSpPr>
         <p:spPr>
           <a:xfrm>
-            <a:off x="129872" y="194884"/>
-            <a:ext cx="8612660" cy="369332"/>
+            <a:off x="129872" y="131822"/>
+            <a:ext cx="8612660" cy="400110"/>
           </a:xfrm>
           <a:prstGeom prst="rect">
             <a:avLst/>
@@ -10968,7 +10987,7 @@
           <a:lstStyle/>
           <a:p>
             <a:r>
-              <a:rPr lang="pt-BR" dirty="0">
+              <a:rPr lang="pt-BR" sz="2000" dirty="0">
                 <a:solidFill>
                   <a:srgbClr val="FF0000"/>
                 </a:solidFill>
@@ -11085,7 +11104,15 @@
           <a:p>
             <a:r>
               <a:rPr lang="pt-BR" sz="1600" b="1" dirty="0"/>
-              <a:t>Qual desses canais traz mais valor para o negócio (p.ex. positiva mais produtos, alcança mais clientes, maior receita e menor custo etc.)?</a:t>
+              <a:t>Qual </a:t>
+            </a:r>
+            <a:r>
+              <a:rPr lang="pt-BR" sz="1600" b="1" dirty="0" smtClean="0"/>
+              <a:t>destes </a:t>
+            </a:r>
+            <a:r>
+              <a:rPr lang="pt-BR" sz="1600" b="1" dirty="0"/>
+              <a:t>canais traz mais valor para o negócio (p.ex. positiva mais produtos, alcança mais clientes, maior receita e menor custo etc.)?</a:t>
             </a:r>
           </a:p>
         </p:txBody>
@@ -11242,8 +11269,8 @@
         </p:blipFill>
         <p:spPr>
           <a:xfrm>
-            <a:off x="6649723" y="3987737"/>
-            <a:ext cx="4165155" cy="2736233"/>
+            <a:off x="6397218" y="3769887"/>
+            <a:ext cx="4575325" cy="3005688"/>
           </a:xfrm>
           <a:prstGeom prst="rect">
             <a:avLst/>
@@ -11265,7 +11292,7 @@
         <p:spPr>
           <a:xfrm>
             <a:off x="129872" y="194884"/>
-            <a:ext cx="8612660" cy="369332"/>
+            <a:ext cx="8612660" cy="400110"/>
           </a:xfrm>
           <a:prstGeom prst="rect">
             <a:avLst/>
@@ -11279,7 +11306,7 @@
           <a:lstStyle/>
           <a:p>
             <a:r>
-              <a:rPr lang="pt-BR" dirty="0">
+              <a:rPr lang="pt-BR" sz="2000" dirty="0">
                 <a:solidFill>
                   <a:srgbClr val="FF0000"/>
                 </a:solidFill>

</xml_diff>